<commit_message>
more documentation on TimingSegment in wavgen
</commit_message>
<xml_diff>
--- a/Documentation_for_wavgen.pptx
+++ b/Documentation_for_wavgen.pptx
@@ -12,6 +12,7 @@
     <p:sldId id="262" r:id="rId6"/>
     <p:sldId id="261" r:id="rId7"/>
     <p:sldId id="258" r:id="rId8"/>
+    <p:sldId id="263" r:id="rId9"/>
   </p:sldIdLst>
   <p:sldSz cx="12192000" cy="6858000"/>
   <p:notesSz cx="6858000" cy="9144000"/>
@@ -110,6 +111,11 @@
       </a:defRPr>
     </a:lvl9pPr>
   </p:defaultTextStyle>
+  <p:extLst>
+    <p:ext uri="{EFAFB233-063F-42B5-8137-9DF3F51BA10A}">
+      <p15:sldGuideLst xmlns:p15="http://schemas.microsoft.com/office/powerpoint/2012/main"/>
+    </p:ext>
+  </p:extLst>
 </p:presentation>
 </file>
 
@@ -244,7 +250,7 @@
           <a:p>
             <a:fld id="{91C03662-DB08-574B-9401-5C5FECED7763}" type="datetimeFigureOut">
               <a:rPr lang="en-US" smtClean="0"/>
-              <a:t>3/20/18</a:t>
+              <a:t>3/23/18</a:t>
             </a:fld>
             <a:endParaRPr lang="en-US"/>
           </a:p>
@@ -414,7 +420,7 @@
           <a:p>
             <a:fld id="{91C03662-DB08-574B-9401-5C5FECED7763}" type="datetimeFigureOut">
               <a:rPr lang="en-US" smtClean="0"/>
-              <a:t>3/20/18</a:t>
+              <a:t>3/23/18</a:t>
             </a:fld>
             <a:endParaRPr lang="en-US"/>
           </a:p>
@@ -594,7 +600,7 @@
           <a:p>
             <a:fld id="{91C03662-DB08-574B-9401-5C5FECED7763}" type="datetimeFigureOut">
               <a:rPr lang="en-US" smtClean="0"/>
-              <a:t>3/20/18</a:t>
+              <a:t>3/23/18</a:t>
             </a:fld>
             <a:endParaRPr lang="en-US"/>
           </a:p>
@@ -764,7 +770,7 @@
           <a:p>
             <a:fld id="{91C03662-DB08-574B-9401-5C5FECED7763}" type="datetimeFigureOut">
               <a:rPr lang="en-US" smtClean="0"/>
-              <a:t>3/20/18</a:t>
+              <a:t>3/23/18</a:t>
             </a:fld>
             <a:endParaRPr lang="en-US"/>
           </a:p>
@@ -1010,7 +1016,7 @@
           <a:p>
             <a:fld id="{91C03662-DB08-574B-9401-5C5FECED7763}" type="datetimeFigureOut">
               <a:rPr lang="en-US" smtClean="0"/>
-              <a:t>3/20/18</a:t>
+              <a:t>3/23/18</a:t>
             </a:fld>
             <a:endParaRPr lang="en-US"/>
           </a:p>
@@ -1242,7 +1248,7 @@
           <a:p>
             <a:fld id="{91C03662-DB08-574B-9401-5C5FECED7763}" type="datetimeFigureOut">
               <a:rPr lang="en-US" smtClean="0"/>
-              <a:t>3/20/18</a:t>
+              <a:t>3/23/18</a:t>
             </a:fld>
             <a:endParaRPr lang="en-US"/>
           </a:p>
@@ -1609,7 +1615,7 @@
           <a:p>
             <a:fld id="{91C03662-DB08-574B-9401-5C5FECED7763}" type="datetimeFigureOut">
               <a:rPr lang="en-US" smtClean="0"/>
-              <a:t>3/20/18</a:t>
+              <a:t>3/23/18</a:t>
             </a:fld>
             <a:endParaRPr lang="en-US"/>
           </a:p>
@@ -1727,7 +1733,7 @@
           <a:p>
             <a:fld id="{91C03662-DB08-574B-9401-5C5FECED7763}" type="datetimeFigureOut">
               <a:rPr lang="en-US" smtClean="0"/>
-              <a:t>3/20/18</a:t>
+              <a:t>3/23/18</a:t>
             </a:fld>
             <a:endParaRPr lang="en-US"/>
           </a:p>
@@ -1822,7 +1828,7 @@
           <a:p>
             <a:fld id="{91C03662-DB08-574B-9401-5C5FECED7763}" type="datetimeFigureOut">
               <a:rPr lang="en-US" smtClean="0"/>
-              <a:t>3/20/18</a:t>
+              <a:t>3/23/18</a:t>
             </a:fld>
             <a:endParaRPr lang="en-US"/>
           </a:p>
@@ -2099,7 +2105,7 @@
           <a:p>
             <a:fld id="{91C03662-DB08-574B-9401-5C5FECED7763}" type="datetimeFigureOut">
               <a:rPr lang="en-US" smtClean="0"/>
-              <a:t>3/20/18</a:t>
+              <a:t>3/23/18</a:t>
             </a:fld>
             <a:endParaRPr lang="en-US"/>
           </a:p>
@@ -2352,7 +2358,7 @@
           <a:p>
             <a:fld id="{91C03662-DB08-574B-9401-5C5FECED7763}" type="datetimeFigureOut">
               <a:rPr lang="en-US" smtClean="0"/>
-              <a:t>3/20/18</a:t>
+              <a:t>3/23/18</a:t>
             </a:fld>
             <a:endParaRPr lang="en-US"/>
           </a:p>
@@ -2565,7 +2571,7 @@
           <a:p>
             <a:fld id="{91C03662-DB08-574B-9401-5C5FECED7763}" type="datetimeFigureOut">
               <a:rPr lang="en-US" smtClean="0"/>
-              <a:t>3/20/18</a:t>
+              <a:t>3/23/18</a:t>
             </a:fld>
             <a:endParaRPr lang="en-US"/>
           </a:p>
@@ -3997,7 +4003,6 @@
               <a:rPr lang="en-US" dirty="0" smtClean="0"/>
               <a:t>Comment, blank or .mod file</a:t>
             </a:r>
-            <a:endParaRPr lang="en-US" dirty="0" smtClean="0"/>
           </a:p>
         </p:txBody>
       </p:sp>
@@ -4040,7 +4045,6 @@
               <a:rPr lang="en-US" dirty="0" smtClean="0"/>
               <a:t>Signals filename</a:t>
             </a:r>
-            <a:endParaRPr lang="en-US" dirty="0" smtClean="0"/>
           </a:p>
         </p:txBody>
       </p:sp>
@@ -4099,11 +4103,6 @@
               </a:rPr>
               <a:t>Constants</a:t>
             </a:r>
-            <a:endParaRPr lang="en-US" dirty="0" smtClean="0">
-              <a:solidFill>
-                <a:schemeClr val="accent4"/>
-              </a:solidFill>
-            </a:endParaRPr>
           </a:p>
         </p:txBody>
       </p:sp>
@@ -4189,7 +4188,6 @@
               <a:rPr lang="en-US" sz="1600" dirty="0" smtClean="0"/>
               <a:t>Sequence or waveform body line (all other lines)</a:t>
             </a:r>
-            <a:endParaRPr lang="en-US" sz="1600" dirty="0" smtClean="0"/>
           </a:p>
         </p:txBody>
       </p:sp>
@@ -5198,7 +5196,6 @@
               <a:rPr lang="en-US" sz="1600" dirty="0" smtClean="0"/>
               <a:t>= “waveform”</a:t>
             </a:r>
-            <a:endParaRPr lang="en-US" sz="1600" dirty="0" smtClean="0"/>
           </a:p>
         </p:txBody>
       </p:sp>
@@ -5257,7 +5254,6 @@
               <a:rPr lang="en-US" sz="1600" dirty="0" smtClean="0"/>
               <a:t>= “sequence”</a:t>
             </a:r>
-            <a:endParaRPr lang="en-US" sz="1600" dirty="0" smtClean="0"/>
           </a:p>
         </p:txBody>
       </p:sp>
@@ -5554,11 +5550,6 @@
               </a:rPr>
               <a:t>Time &lt;string&gt;</a:t>
             </a:r>
-            <a:endParaRPr lang="en-US" sz="1600" dirty="0" smtClean="0">
-              <a:solidFill>
-                <a:schemeClr val="bg1"/>
-              </a:solidFill>
-            </a:endParaRPr>
           </a:p>
         </p:txBody>
       </p:sp>
@@ -6867,7 +6858,12 @@
             <p:ph idx="1"/>
           </p:nvPr>
         </p:nvSpPr>
-        <p:spPr/>
+        <p:spPr>
+          <a:xfrm>
+            <a:off x="559526" y="1503407"/>
+            <a:ext cx="6396443" cy="5115601"/>
+          </a:xfrm>
+        </p:spPr>
         <p:txBody>
           <a:bodyPr>
             <a:normAutofit fontScale="77500" lnSpcReduction="20000"/>
@@ -7018,6 +7014,1625 @@
           </a:p>
         </p:txBody>
       </p:sp>
+      <p:graphicFrame>
+        <p:nvGraphicFramePr>
+          <p:cNvPr id="4" name="Table 3"/>
+          <p:cNvGraphicFramePr>
+            <a:graphicFrameLocks noGrp="1"/>
+          </p:cNvGraphicFramePr>
+          <p:nvPr>
+            <p:extLst>
+              <p:ext uri="{D42A27DB-BD31-4B8C-83A1-F6EECF244321}">
+                <p14:modId xmlns:p14="http://schemas.microsoft.com/office/powerpoint/2010/main" val="1662312298"/>
+              </p:ext>
+            </p:extLst>
+          </p:nvPr>
+        </p:nvGraphicFramePr>
+        <p:xfrm>
+          <a:off x="7158439" y="1027906"/>
+          <a:ext cx="4397831" cy="2926080"/>
+        </p:xfrm>
+        <a:graphic>
+          <a:graphicData uri="http://schemas.openxmlformats.org/drawingml/2006/table">
+            <a:tbl>
+              <a:tblPr firstCol="1" bandCol="1">
+                <a:tableStyleId>{5C22544A-7EE6-4342-B048-85BDC9FD1C3A}</a:tableStyleId>
+              </a:tblPr>
+              <a:tblGrid>
+                <a:gridCol w="584481"/>
+                <a:gridCol w="381335"/>
+                <a:gridCol w="381335"/>
+                <a:gridCol w="381335"/>
+                <a:gridCol w="381335"/>
+                <a:gridCol w="381335"/>
+                <a:gridCol w="381335"/>
+                <a:gridCol w="381335"/>
+                <a:gridCol w="381335"/>
+                <a:gridCol w="381335"/>
+                <a:gridCol w="381335"/>
+              </a:tblGrid>
+              <a:tr h="361369">
+                <a:tc>
+                  <a:txBody>
+                    <a:bodyPr/>
+                    <a:lstStyle/>
+                    <a:p>
+                      <a:r>
+                        <a:rPr lang="en-US" dirty="0" smtClean="0"/>
+                        <a:t>000</a:t>
+                      </a:r>
+                      <a:endParaRPr lang="en-US" dirty="0"/>
+                    </a:p>
+                  </a:txBody>
+                  <a:tcPr/>
+                </a:tc>
+                <a:tc>
+                  <a:txBody>
+                    <a:bodyPr/>
+                    <a:lstStyle/>
+                    <a:p>
+                      <a:r>
+                        <a:rPr lang="en-US" sz="1050" dirty="0" smtClean="0"/>
+                        <a:t>0</a:t>
+                      </a:r>
+                      <a:endParaRPr lang="en-US" sz="1050" dirty="0"/>
+                    </a:p>
+                  </a:txBody>
+                  <a:tcPr/>
+                </a:tc>
+                <a:tc>
+                  <a:txBody>
+                    <a:bodyPr/>
+                    <a:lstStyle/>
+                    <a:p>
+                      <a:r>
+                        <a:rPr lang="en-US" sz="1050" dirty="0" smtClean="0"/>
+                        <a:t>0</a:t>
+                      </a:r>
+                      <a:endParaRPr lang="en-US" sz="1050" dirty="0"/>
+                    </a:p>
+                  </a:txBody>
+                  <a:tcPr/>
+                </a:tc>
+                <a:tc>
+                  <a:txBody>
+                    <a:bodyPr/>
+                    <a:lstStyle/>
+                    <a:p>
+                      <a:r>
+                        <a:rPr lang="en-US" sz="1050" dirty="0" smtClean="0"/>
+                        <a:t>0</a:t>
+                      </a:r>
+                      <a:endParaRPr lang="en-US" sz="1050" dirty="0"/>
+                    </a:p>
+                  </a:txBody>
+                  <a:tcPr/>
+                </a:tc>
+                <a:tc>
+                  <a:txBody>
+                    <a:bodyPr/>
+                    <a:lstStyle/>
+                    <a:p>
+                      <a:r>
+                        <a:rPr lang="en-US" sz="1050" dirty="0" smtClean="0"/>
+                        <a:t>0</a:t>
+                      </a:r>
+                      <a:endParaRPr lang="en-US" sz="1050" dirty="0"/>
+                    </a:p>
+                  </a:txBody>
+                  <a:tcPr/>
+                </a:tc>
+                <a:tc>
+                  <a:txBody>
+                    <a:bodyPr/>
+                    <a:lstStyle/>
+                    <a:p>
+                      <a:r>
+                        <a:rPr lang="en-US" sz="1050" dirty="0" smtClean="0"/>
+                        <a:t>0</a:t>
+                      </a:r>
+                      <a:endParaRPr lang="en-US" sz="1050" dirty="0"/>
+                    </a:p>
+                  </a:txBody>
+                  <a:tcPr/>
+                </a:tc>
+                <a:tc>
+                  <a:txBody>
+                    <a:bodyPr/>
+                    <a:lstStyle/>
+                    <a:p>
+                      <a:r>
+                        <a:rPr lang="en-US" sz="1050" dirty="0" smtClean="0"/>
+                        <a:t>0</a:t>
+                      </a:r>
+                      <a:endParaRPr lang="en-US" sz="1050" dirty="0"/>
+                    </a:p>
+                  </a:txBody>
+                  <a:tcPr/>
+                </a:tc>
+                <a:tc>
+                  <a:txBody>
+                    <a:bodyPr/>
+                    <a:lstStyle/>
+                    <a:p>
+                      <a:r>
+                        <a:rPr lang="en-US" sz="1050" dirty="0" smtClean="0"/>
+                        <a:t>0</a:t>
+                      </a:r>
+                      <a:endParaRPr lang="en-US" sz="1050" dirty="0"/>
+                    </a:p>
+                  </a:txBody>
+                  <a:tcPr/>
+                </a:tc>
+                <a:tc>
+                  <a:txBody>
+                    <a:bodyPr/>
+                    <a:lstStyle/>
+                    <a:p>
+                      <a:r>
+                        <a:rPr lang="en-US" sz="1050" dirty="0" smtClean="0"/>
+                        <a:t>0</a:t>
+                      </a:r>
+                      <a:endParaRPr lang="en-US" sz="1050" dirty="0"/>
+                    </a:p>
+                  </a:txBody>
+                  <a:tcPr/>
+                </a:tc>
+                <a:tc>
+                  <a:txBody>
+                    <a:bodyPr/>
+                    <a:lstStyle/>
+                    <a:p>
+                      <a:r>
+                        <a:rPr lang="en-US" sz="1050" dirty="0" smtClean="0"/>
+                        <a:t>0</a:t>
+                      </a:r>
+                      <a:endParaRPr lang="en-US" sz="1050" dirty="0"/>
+                    </a:p>
+                  </a:txBody>
+                  <a:tcPr/>
+                </a:tc>
+                <a:tc>
+                  <a:txBody>
+                    <a:bodyPr/>
+                    <a:lstStyle/>
+                    <a:p>
+                      <a:r>
+                        <a:rPr lang="en-US" sz="1050" dirty="0" smtClean="0"/>
+                        <a:t>0</a:t>
+                      </a:r>
+                      <a:endParaRPr lang="en-US" sz="1050" dirty="0"/>
+                    </a:p>
+                  </a:txBody>
+                  <a:tcPr/>
+                </a:tc>
+              </a:tr>
+              <a:tr h="361369">
+                <a:tc>
+                  <a:txBody>
+                    <a:bodyPr/>
+                    <a:lstStyle/>
+                    <a:p>
+                      <a:r>
+                        <a:rPr lang="en-US" dirty="0" smtClean="0"/>
+                        <a:t>001</a:t>
+                      </a:r>
+                    </a:p>
+                  </a:txBody>
+                  <a:tcPr/>
+                </a:tc>
+                <a:tc>
+                  <a:txBody>
+                    <a:bodyPr/>
+                    <a:lstStyle/>
+                    <a:p>
+                      <a:r>
+                        <a:rPr lang="en-US" sz="1050" dirty="0" smtClean="0"/>
+                        <a:t>1</a:t>
+                      </a:r>
+                      <a:endParaRPr lang="en-US" sz="1050" dirty="0"/>
+                    </a:p>
+                  </a:txBody>
+                  <a:tcPr/>
+                </a:tc>
+                <a:tc>
+                  <a:txBody>
+                    <a:bodyPr/>
+                    <a:lstStyle/>
+                    <a:p>
+                      <a:r>
+                        <a:rPr lang="en-US" sz="1050" dirty="0" smtClean="0"/>
+                        <a:t>1</a:t>
+                      </a:r>
+                      <a:endParaRPr lang="en-US" sz="1050" dirty="0"/>
+                    </a:p>
+                  </a:txBody>
+                  <a:tcPr/>
+                </a:tc>
+                <a:tc>
+                  <a:txBody>
+                    <a:bodyPr/>
+                    <a:lstStyle/>
+                    <a:p>
+                      <a:r>
+                        <a:rPr lang="en-US" sz="1050" dirty="0" smtClean="0"/>
+                        <a:t>0</a:t>
+                      </a:r>
+                      <a:endParaRPr lang="en-US" sz="1050" dirty="0"/>
+                    </a:p>
+                  </a:txBody>
+                  <a:tcPr/>
+                </a:tc>
+                <a:tc>
+                  <a:txBody>
+                    <a:bodyPr/>
+                    <a:lstStyle/>
+                    <a:p>
+                      <a:r>
+                        <a:rPr lang="en-US" sz="1050" dirty="0" smtClean="0"/>
+                        <a:t>1</a:t>
+                      </a:r>
+                      <a:endParaRPr lang="en-US" sz="1050" dirty="0"/>
+                    </a:p>
+                  </a:txBody>
+                  <a:tcPr/>
+                </a:tc>
+                <a:tc>
+                  <a:txBody>
+                    <a:bodyPr/>
+                    <a:lstStyle/>
+                    <a:p>
+                      <a:r>
+                        <a:rPr lang="en-US" sz="1050" dirty="0" smtClean="0"/>
+                        <a:t>0</a:t>
+                      </a:r>
+                      <a:endParaRPr lang="en-US" sz="1050" dirty="0"/>
+                    </a:p>
+                  </a:txBody>
+                  <a:tcPr/>
+                </a:tc>
+                <a:tc>
+                  <a:txBody>
+                    <a:bodyPr/>
+                    <a:lstStyle/>
+                    <a:p>
+                      <a:r>
+                        <a:rPr lang="en-US" sz="1050" dirty="0" smtClean="0"/>
+                        <a:t>0</a:t>
+                      </a:r>
+                      <a:endParaRPr lang="en-US" sz="1050" dirty="0"/>
+                    </a:p>
+                  </a:txBody>
+                  <a:tcPr/>
+                </a:tc>
+                <a:tc>
+                  <a:txBody>
+                    <a:bodyPr/>
+                    <a:lstStyle/>
+                    <a:p>
+                      <a:r>
+                        <a:rPr lang="en-US" sz="1050" dirty="0" smtClean="0"/>
+                        <a:t>0</a:t>
+                      </a:r>
+                      <a:endParaRPr lang="en-US" sz="1050" dirty="0"/>
+                    </a:p>
+                  </a:txBody>
+                  <a:tcPr/>
+                </a:tc>
+                <a:tc>
+                  <a:txBody>
+                    <a:bodyPr/>
+                    <a:lstStyle/>
+                    <a:p>
+                      <a:r>
+                        <a:rPr lang="en-US" sz="1050" dirty="0" smtClean="0"/>
+                        <a:t>0</a:t>
+                      </a:r>
+                      <a:endParaRPr lang="en-US" sz="1050" dirty="0"/>
+                    </a:p>
+                  </a:txBody>
+                  <a:tcPr/>
+                </a:tc>
+                <a:tc>
+                  <a:txBody>
+                    <a:bodyPr/>
+                    <a:lstStyle/>
+                    <a:p>
+                      <a:r>
+                        <a:rPr lang="en-US" sz="1050" dirty="0" smtClean="0"/>
+                        <a:t>2.3</a:t>
+                      </a:r>
+                      <a:endParaRPr lang="en-US" sz="1050" dirty="0"/>
+                    </a:p>
+                  </a:txBody>
+                  <a:tcPr/>
+                </a:tc>
+                <a:tc>
+                  <a:txBody>
+                    <a:bodyPr/>
+                    <a:lstStyle/>
+                    <a:p>
+                      <a:r>
+                        <a:rPr lang="en-US" sz="1050" dirty="0" smtClean="0"/>
+                        <a:t>1</a:t>
+                      </a:r>
+                      <a:endParaRPr lang="en-US" sz="1050" dirty="0"/>
+                    </a:p>
+                  </a:txBody>
+                  <a:tcPr/>
+                </a:tc>
+              </a:tr>
+              <a:tr h="361369">
+                <a:tc>
+                  <a:txBody>
+                    <a:bodyPr/>
+                    <a:lstStyle/>
+                    <a:p>
+                      <a:r>
+                        <a:rPr lang="en-US" dirty="0" smtClean="0"/>
+                        <a:t>002</a:t>
+                      </a:r>
+                    </a:p>
+                  </a:txBody>
+                  <a:tcPr/>
+                </a:tc>
+                <a:tc>
+                  <a:txBody>
+                    <a:bodyPr/>
+                    <a:lstStyle/>
+                    <a:p>
+                      <a:r>
+                        <a:rPr lang="en-US" sz="1050" dirty="0" smtClean="0"/>
+                        <a:t>0</a:t>
+                      </a:r>
+                      <a:endParaRPr lang="en-US" sz="1050" dirty="0"/>
+                    </a:p>
+                  </a:txBody>
+                  <a:tcPr/>
+                </a:tc>
+                <a:tc>
+                  <a:txBody>
+                    <a:bodyPr/>
+                    <a:lstStyle/>
+                    <a:p>
+                      <a:r>
+                        <a:rPr lang="en-US" sz="1050" dirty="0" smtClean="0"/>
+                        <a:t>1</a:t>
+                      </a:r>
+                      <a:endParaRPr lang="en-US" sz="1050" dirty="0"/>
+                    </a:p>
+                  </a:txBody>
+                  <a:tcPr/>
+                </a:tc>
+                <a:tc>
+                  <a:txBody>
+                    <a:bodyPr/>
+                    <a:lstStyle/>
+                    <a:p>
+                      <a:r>
+                        <a:rPr lang="en-US" sz="1050" dirty="0" smtClean="0"/>
+                        <a:t>1</a:t>
+                      </a:r>
+                      <a:endParaRPr lang="en-US" sz="1050" dirty="0"/>
+                    </a:p>
+                  </a:txBody>
+                  <a:tcPr/>
+                </a:tc>
+                <a:tc>
+                  <a:txBody>
+                    <a:bodyPr/>
+                    <a:lstStyle/>
+                    <a:p>
+                      <a:r>
+                        <a:rPr lang="en-US" sz="1050" dirty="0" smtClean="0"/>
+                        <a:t>1</a:t>
+                      </a:r>
+                      <a:endParaRPr lang="en-US" sz="1050" dirty="0"/>
+                    </a:p>
+                  </a:txBody>
+                  <a:tcPr/>
+                </a:tc>
+                <a:tc>
+                  <a:txBody>
+                    <a:bodyPr/>
+                    <a:lstStyle/>
+                    <a:p>
+                      <a:r>
+                        <a:rPr lang="en-US" sz="1050" dirty="0" smtClean="0"/>
+                        <a:t>0</a:t>
+                      </a:r>
+                      <a:endParaRPr lang="en-US" sz="1050" dirty="0"/>
+                    </a:p>
+                  </a:txBody>
+                  <a:tcPr/>
+                </a:tc>
+                <a:tc>
+                  <a:txBody>
+                    <a:bodyPr/>
+                    <a:lstStyle/>
+                    <a:p>
+                      <a:r>
+                        <a:rPr lang="en-US" sz="1050" dirty="0" smtClean="0"/>
+                        <a:t>0</a:t>
+                      </a:r>
+                      <a:endParaRPr lang="en-US" sz="1050" dirty="0"/>
+                    </a:p>
+                  </a:txBody>
+                  <a:tcPr/>
+                </a:tc>
+                <a:tc>
+                  <a:txBody>
+                    <a:bodyPr/>
+                    <a:lstStyle/>
+                    <a:p>
+                      <a:r>
+                        <a:rPr lang="en-US" sz="1050" dirty="0" smtClean="0"/>
+                        <a:t>0</a:t>
+                      </a:r>
+                      <a:endParaRPr lang="en-US" sz="1050" dirty="0"/>
+                    </a:p>
+                  </a:txBody>
+                  <a:tcPr/>
+                </a:tc>
+                <a:tc>
+                  <a:txBody>
+                    <a:bodyPr/>
+                    <a:lstStyle/>
+                    <a:p>
+                      <a:r>
+                        <a:rPr lang="en-US" sz="1050" dirty="0" smtClean="0"/>
+                        <a:t>0</a:t>
+                      </a:r>
+                      <a:endParaRPr lang="en-US" sz="1050" dirty="0"/>
+                    </a:p>
+                  </a:txBody>
+                  <a:tcPr/>
+                </a:tc>
+                <a:tc>
+                  <a:txBody>
+                    <a:bodyPr/>
+                    <a:lstStyle/>
+                    <a:p>
+                      <a:r>
+                        <a:rPr lang="en-US" sz="1050" dirty="0" smtClean="0"/>
+                        <a:t>0</a:t>
+                      </a:r>
+                      <a:endParaRPr lang="en-US" sz="1050" dirty="0"/>
+                    </a:p>
+                  </a:txBody>
+                  <a:tcPr/>
+                </a:tc>
+                <a:tc>
+                  <a:txBody>
+                    <a:bodyPr/>
+                    <a:lstStyle/>
+                    <a:p>
+                      <a:r>
+                        <a:rPr lang="en-US" sz="1050" dirty="0" smtClean="0"/>
+                        <a:t>1</a:t>
+                      </a:r>
+                      <a:endParaRPr lang="en-US" sz="1050" dirty="0"/>
+                    </a:p>
+                  </a:txBody>
+                  <a:tcPr/>
+                </a:tc>
+              </a:tr>
+              <a:tr h="361369">
+                <a:tc>
+                  <a:txBody>
+                    <a:bodyPr/>
+                    <a:lstStyle/>
+                    <a:p>
+                      <a:r>
+                        <a:rPr lang="en-US" dirty="0" smtClean="0"/>
+                        <a:t>003</a:t>
+                      </a:r>
+                      <a:endParaRPr lang="en-US" dirty="0"/>
+                    </a:p>
+                  </a:txBody>
+                  <a:tcPr/>
+                </a:tc>
+                <a:tc>
+                  <a:txBody>
+                    <a:bodyPr/>
+                    <a:lstStyle/>
+                    <a:p>
+                      <a:endParaRPr lang="en-US" sz="1050"/>
+                    </a:p>
+                  </a:txBody>
+                  <a:tcPr/>
+                </a:tc>
+                <a:tc>
+                  <a:txBody>
+                    <a:bodyPr/>
+                    <a:lstStyle/>
+                    <a:p>
+                      <a:endParaRPr lang="en-US" sz="1050"/>
+                    </a:p>
+                  </a:txBody>
+                  <a:tcPr/>
+                </a:tc>
+                <a:tc>
+                  <a:txBody>
+                    <a:bodyPr/>
+                    <a:lstStyle/>
+                    <a:p>
+                      <a:endParaRPr lang="en-US" sz="1050"/>
+                    </a:p>
+                  </a:txBody>
+                  <a:tcPr/>
+                </a:tc>
+                <a:tc>
+                  <a:txBody>
+                    <a:bodyPr/>
+                    <a:lstStyle/>
+                    <a:p>
+                      <a:endParaRPr lang="en-US" sz="1050"/>
+                    </a:p>
+                  </a:txBody>
+                  <a:tcPr/>
+                </a:tc>
+                <a:tc>
+                  <a:txBody>
+                    <a:bodyPr/>
+                    <a:lstStyle/>
+                    <a:p>
+                      <a:endParaRPr lang="en-US" sz="1050" dirty="0"/>
+                    </a:p>
+                  </a:txBody>
+                  <a:tcPr/>
+                </a:tc>
+                <a:tc>
+                  <a:txBody>
+                    <a:bodyPr/>
+                    <a:lstStyle/>
+                    <a:p>
+                      <a:endParaRPr lang="en-US" sz="1050"/>
+                    </a:p>
+                  </a:txBody>
+                  <a:tcPr/>
+                </a:tc>
+                <a:tc>
+                  <a:txBody>
+                    <a:bodyPr/>
+                    <a:lstStyle/>
+                    <a:p>
+                      <a:endParaRPr lang="en-US" sz="1050"/>
+                    </a:p>
+                  </a:txBody>
+                  <a:tcPr/>
+                </a:tc>
+                <a:tc>
+                  <a:txBody>
+                    <a:bodyPr/>
+                    <a:lstStyle/>
+                    <a:p>
+                      <a:endParaRPr lang="en-US" sz="1050"/>
+                    </a:p>
+                  </a:txBody>
+                  <a:tcPr/>
+                </a:tc>
+                <a:tc>
+                  <a:txBody>
+                    <a:bodyPr/>
+                    <a:lstStyle/>
+                    <a:p>
+                      <a:endParaRPr lang="en-US" sz="1050"/>
+                    </a:p>
+                  </a:txBody>
+                  <a:tcPr/>
+                </a:tc>
+                <a:tc>
+                  <a:txBody>
+                    <a:bodyPr/>
+                    <a:lstStyle/>
+                    <a:p>
+                      <a:endParaRPr lang="en-US" sz="1050"/>
+                    </a:p>
+                  </a:txBody>
+                  <a:tcPr/>
+                </a:tc>
+              </a:tr>
+              <a:tr h="361369">
+                <a:tc>
+                  <a:txBody>
+                    <a:bodyPr/>
+                    <a:lstStyle/>
+                    <a:p>
+                      <a:r>
+                        <a:rPr lang="en-US" dirty="0" smtClean="0"/>
+                        <a:t>004</a:t>
+                      </a:r>
+                      <a:endParaRPr lang="en-US" dirty="0"/>
+                    </a:p>
+                  </a:txBody>
+                  <a:tcPr/>
+                </a:tc>
+                <a:tc>
+                  <a:txBody>
+                    <a:bodyPr/>
+                    <a:lstStyle/>
+                    <a:p>
+                      <a:endParaRPr lang="en-US" sz="1050"/>
+                    </a:p>
+                  </a:txBody>
+                  <a:tcPr/>
+                </a:tc>
+                <a:tc>
+                  <a:txBody>
+                    <a:bodyPr/>
+                    <a:lstStyle/>
+                    <a:p>
+                      <a:endParaRPr lang="en-US" sz="1050"/>
+                    </a:p>
+                  </a:txBody>
+                  <a:tcPr/>
+                </a:tc>
+                <a:tc>
+                  <a:txBody>
+                    <a:bodyPr/>
+                    <a:lstStyle/>
+                    <a:p>
+                      <a:endParaRPr lang="en-US" sz="1050"/>
+                    </a:p>
+                  </a:txBody>
+                  <a:tcPr/>
+                </a:tc>
+                <a:tc>
+                  <a:txBody>
+                    <a:bodyPr/>
+                    <a:lstStyle/>
+                    <a:p>
+                      <a:endParaRPr lang="en-US" sz="1050"/>
+                    </a:p>
+                  </a:txBody>
+                  <a:tcPr/>
+                </a:tc>
+                <a:tc>
+                  <a:txBody>
+                    <a:bodyPr/>
+                    <a:lstStyle/>
+                    <a:p>
+                      <a:endParaRPr lang="en-US" sz="1050" dirty="0"/>
+                    </a:p>
+                  </a:txBody>
+                  <a:tcPr/>
+                </a:tc>
+                <a:tc>
+                  <a:txBody>
+                    <a:bodyPr/>
+                    <a:lstStyle/>
+                    <a:p>
+                      <a:endParaRPr lang="en-US" sz="1050" dirty="0"/>
+                    </a:p>
+                  </a:txBody>
+                  <a:tcPr/>
+                </a:tc>
+                <a:tc>
+                  <a:txBody>
+                    <a:bodyPr/>
+                    <a:lstStyle/>
+                    <a:p>
+                      <a:endParaRPr lang="en-US" sz="1050"/>
+                    </a:p>
+                  </a:txBody>
+                  <a:tcPr/>
+                </a:tc>
+                <a:tc>
+                  <a:txBody>
+                    <a:bodyPr/>
+                    <a:lstStyle/>
+                    <a:p>
+                      <a:endParaRPr lang="en-US" sz="1050"/>
+                    </a:p>
+                  </a:txBody>
+                  <a:tcPr/>
+                </a:tc>
+                <a:tc>
+                  <a:txBody>
+                    <a:bodyPr/>
+                    <a:lstStyle/>
+                    <a:p>
+                      <a:endParaRPr lang="en-US" sz="1050"/>
+                    </a:p>
+                  </a:txBody>
+                  <a:tcPr/>
+                </a:tc>
+                <a:tc>
+                  <a:txBody>
+                    <a:bodyPr/>
+                    <a:lstStyle/>
+                    <a:p>
+                      <a:endParaRPr lang="en-US" sz="1050"/>
+                    </a:p>
+                  </a:txBody>
+                  <a:tcPr/>
+                </a:tc>
+              </a:tr>
+              <a:tr h="361369">
+                <a:tc>
+                  <a:txBody>
+                    <a:bodyPr/>
+                    <a:lstStyle/>
+                    <a:p>
+                      <a:r>
+                        <a:rPr lang="en-US" dirty="0" smtClean="0"/>
+                        <a:t>005</a:t>
+                      </a:r>
+                      <a:endParaRPr lang="en-US" dirty="0"/>
+                    </a:p>
+                  </a:txBody>
+                  <a:tcPr/>
+                </a:tc>
+                <a:tc>
+                  <a:txBody>
+                    <a:bodyPr/>
+                    <a:lstStyle/>
+                    <a:p>
+                      <a:endParaRPr lang="en-US" sz="1050"/>
+                    </a:p>
+                  </a:txBody>
+                  <a:tcPr/>
+                </a:tc>
+                <a:tc>
+                  <a:txBody>
+                    <a:bodyPr/>
+                    <a:lstStyle/>
+                    <a:p>
+                      <a:endParaRPr lang="en-US" sz="1050"/>
+                    </a:p>
+                  </a:txBody>
+                  <a:tcPr/>
+                </a:tc>
+                <a:tc>
+                  <a:txBody>
+                    <a:bodyPr/>
+                    <a:lstStyle/>
+                    <a:p>
+                      <a:endParaRPr lang="en-US" sz="1050"/>
+                    </a:p>
+                  </a:txBody>
+                  <a:tcPr/>
+                </a:tc>
+                <a:tc>
+                  <a:txBody>
+                    <a:bodyPr/>
+                    <a:lstStyle/>
+                    <a:p>
+                      <a:endParaRPr lang="en-US" sz="1050"/>
+                    </a:p>
+                  </a:txBody>
+                  <a:tcPr/>
+                </a:tc>
+                <a:tc>
+                  <a:txBody>
+                    <a:bodyPr/>
+                    <a:lstStyle/>
+                    <a:p>
+                      <a:endParaRPr lang="en-US" sz="1050"/>
+                    </a:p>
+                  </a:txBody>
+                  <a:tcPr/>
+                </a:tc>
+                <a:tc>
+                  <a:txBody>
+                    <a:bodyPr/>
+                    <a:lstStyle/>
+                    <a:p>
+                      <a:endParaRPr lang="en-US" sz="1050"/>
+                    </a:p>
+                  </a:txBody>
+                  <a:tcPr/>
+                </a:tc>
+                <a:tc>
+                  <a:txBody>
+                    <a:bodyPr/>
+                    <a:lstStyle/>
+                    <a:p>
+                      <a:endParaRPr lang="en-US" sz="1050" dirty="0"/>
+                    </a:p>
+                  </a:txBody>
+                  <a:tcPr/>
+                </a:tc>
+                <a:tc>
+                  <a:txBody>
+                    <a:bodyPr/>
+                    <a:lstStyle/>
+                    <a:p>
+                      <a:endParaRPr lang="en-US" sz="1050"/>
+                    </a:p>
+                  </a:txBody>
+                  <a:tcPr/>
+                </a:tc>
+                <a:tc>
+                  <a:txBody>
+                    <a:bodyPr/>
+                    <a:lstStyle/>
+                    <a:p>
+                      <a:endParaRPr lang="en-US" sz="1050"/>
+                    </a:p>
+                  </a:txBody>
+                  <a:tcPr/>
+                </a:tc>
+                <a:tc>
+                  <a:txBody>
+                    <a:bodyPr/>
+                    <a:lstStyle/>
+                    <a:p>
+                      <a:endParaRPr lang="en-US" sz="1050"/>
+                    </a:p>
+                  </a:txBody>
+                  <a:tcPr/>
+                </a:tc>
+              </a:tr>
+              <a:tr h="361369">
+                <a:tc>
+                  <a:txBody>
+                    <a:bodyPr/>
+                    <a:lstStyle/>
+                    <a:p>
+                      <a:r>
+                        <a:rPr lang="en-US" dirty="0" smtClean="0"/>
+                        <a:t>006</a:t>
+                      </a:r>
+                      <a:endParaRPr lang="en-US" dirty="0"/>
+                    </a:p>
+                  </a:txBody>
+                  <a:tcPr/>
+                </a:tc>
+                <a:tc>
+                  <a:txBody>
+                    <a:bodyPr/>
+                    <a:lstStyle/>
+                    <a:p>
+                      <a:endParaRPr lang="en-US" sz="1050"/>
+                    </a:p>
+                  </a:txBody>
+                  <a:tcPr/>
+                </a:tc>
+                <a:tc>
+                  <a:txBody>
+                    <a:bodyPr/>
+                    <a:lstStyle/>
+                    <a:p>
+                      <a:endParaRPr lang="en-US" sz="1050"/>
+                    </a:p>
+                  </a:txBody>
+                  <a:tcPr/>
+                </a:tc>
+                <a:tc>
+                  <a:txBody>
+                    <a:bodyPr/>
+                    <a:lstStyle/>
+                    <a:p>
+                      <a:endParaRPr lang="en-US" sz="1050"/>
+                    </a:p>
+                  </a:txBody>
+                  <a:tcPr/>
+                </a:tc>
+                <a:tc>
+                  <a:txBody>
+                    <a:bodyPr/>
+                    <a:lstStyle/>
+                    <a:p>
+                      <a:endParaRPr lang="en-US" sz="1050"/>
+                    </a:p>
+                  </a:txBody>
+                  <a:tcPr/>
+                </a:tc>
+                <a:tc>
+                  <a:txBody>
+                    <a:bodyPr/>
+                    <a:lstStyle/>
+                    <a:p>
+                      <a:endParaRPr lang="en-US" sz="1050"/>
+                    </a:p>
+                  </a:txBody>
+                  <a:tcPr/>
+                </a:tc>
+                <a:tc>
+                  <a:txBody>
+                    <a:bodyPr/>
+                    <a:lstStyle/>
+                    <a:p>
+                      <a:endParaRPr lang="en-US" sz="1050"/>
+                    </a:p>
+                  </a:txBody>
+                  <a:tcPr/>
+                </a:tc>
+                <a:tc>
+                  <a:txBody>
+                    <a:bodyPr/>
+                    <a:lstStyle/>
+                    <a:p>
+                      <a:endParaRPr lang="en-US" sz="1050" dirty="0"/>
+                    </a:p>
+                  </a:txBody>
+                  <a:tcPr/>
+                </a:tc>
+                <a:tc>
+                  <a:txBody>
+                    <a:bodyPr/>
+                    <a:lstStyle/>
+                    <a:p>
+                      <a:endParaRPr lang="en-US" sz="1050" dirty="0"/>
+                    </a:p>
+                  </a:txBody>
+                  <a:tcPr/>
+                </a:tc>
+                <a:tc>
+                  <a:txBody>
+                    <a:bodyPr/>
+                    <a:lstStyle/>
+                    <a:p>
+                      <a:endParaRPr lang="en-US" sz="1050"/>
+                    </a:p>
+                  </a:txBody>
+                  <a:tcPr/>
+                </a:tc>
+                <a:tc>
+                  <a:txBody>
+                    <a:bodyPr/>
+                    <a:lstStyle/>
+                    <a:p>
+                      <a:endParaRPr lang="en-US" sz="1050"/>
+                    </a:p>
+                  </a:txBody>
+                  <a:tcPr/>
+                </a:tc>
+              </a:tr>
+              <a:tr h="361369">
+                <a:tc>
+                  <a:txBody>
+                    <a:bodyPr/>
+                    <a:lstStyle/>
+                    <a:p>
+                      <a:r>
+                        <a:rPr lang="en-US" dirty="0" err="1" smtClean="0"/>
+                        <a:t>etc</a:t>
+                      </a:r>
+                      <a:endParaRPr lang="en-US" dirty="0"/>
+                    </a:p>
+                  </a:txBody>
+                  <a:tcPr/>
+                </a:tc>
+                <a:tc>
+                  <a:txBody>
+                    <a:bodyPr/>
+                    <a:lstStyle/>
+                    <a:p>
+                      <a:endParaRPr lang="en-US" sz="1050"/>
+                    </a:p>
+                  </a:txBody>
+                  <a:tcPr/>
+                </a:tc>
+                <a:tc>
+                  <a:txBody>
+                    <a:bodyPr/>
+                    <a:lstStyle/>
+                    <a:p>
+                      <a:endParaRPr lang="en-US" sz="1050"/>
+                    </a:p>
+                  </a:txBody>
+                  <a:tcPr/>
+                </a:tc>
+                <a:tc>
+                  <a:txBody>
+                    <a:bodyPr/>
+                    <a:lstStyle/>
+                    <a:p>
+                      <a:endParaRPr lang="en-US" sz="1050"/>
+                    </a:p>
+                  </a:txBody>
+                  <a:tcPr/>
+                </a:tc>
+                <a:tc>
+                  <a:txBody>
+                    <a:bodyPr/>
+                    <a:lstStyle/>
+                    <a:p>
+                      <a:endParaRPr lang="en-US" sz="1050"/>
+                    </a:p>
+                  </a:txBody>
+                  <a:tcPr/>
+                </a:tc>
+                <a:tc>
+                  <a:txBody>
+                    <a:bodyPr/>
+                    <a:lstStyle/>
+                    <a:p>
+                      <a:endParaRPr lang="en-US" sz="1050"/>
+                    </a:p>
+                  </a:txBody>
+                  <a:tcPr/>
+                </a:tc>
+                <a:tc>
+                  <a:txBody>
+                    <a:bodyPr/>
+                    <a:lstStyle/>
+                    <a:p>
+                      <a:endParaRPr lang="en-US" sz="1050"/>
+                    </a:p>
+                  </a:txBody>
+                  <a:tcPr/>
+                </a:tc>
+                <a:tc>
+                  <a:txBody>
+                    <a:bodyPr/>
+                    <a:lstStyle/>
+                    <a:p>
+                      <a:endParaRPr lang="en-US" sz="1050"/>
+                    </a:p>
+                  </a:txBody>
+                  <a:tcPr/>
+                </a:tc>
+                <a:tc>
+                  <a:txBody>
+                    <a:bodyPr/>
+                    <a:lstStyle/>
+                    <a:p>
+                      <a:endParaRPr lang="en-US" sz="1050" dirty="0"/>
+                    </a:p>
+                  </a:txBody>
+                  <a:tcPr/>
+                </a:tc>
+                <a:tc>
+                  <a:txBody>
+                    <a:bodyPr/>
+                    <a:lstStyle/>
+                    <a:p>
+                      <a:endParaRPr lang="en-US" sz="1050" dirty="0"/>
+                    </a:p>
+                  </a:txBody>
+                  <a:tcPr/>
+                </a:tc>
+                <a:tc>
+                  <a:txBody>
+                    <a:bodyPr/>
+                    <a:lstStyle/>
+                    <a:p>
+                      <a:endParaRPr lang="en-US" sz="1050" dirty="0"/>
+                    </a:p>
+                  </a:txBody>
+                  <a:tcPr/>
+                </a:tc>
+              </a:tr>
+            </a:tbl>
+          </a:graphicData>
+        </a:graphic>
+      </p:graphicFrame>
+      <p:sp>
+        <p:nvSpPr>
+          <p:cNvPr id="5" name="TextBox 4"/>
+          <p:cNvSpPr txBox="1"/>
+          <p:nvPr/>
+        </p:nvSpPr>
+        <p:spPr>
+          <a:xfrm>
+            <a:off x="7785463" y="495018"/>
+            <a:ext cx="1184491" cy="369332"/>
+          </a:xfrm>
+          <a:prstGeom prst="rect">
+            <a:avLst/>
+          </a:prstGeom>
+          <a:noFill/>
+        </p:spPr>
+        <p:txBody>
+          <a:bodyPr wrap="none" rtlCol="0">
+            <a:spAutoFit/>
+          </a:bodyPr>
+          <a:lstStyle/>
+          <a:p>
+            <a:r>
+              <a:rPr lang="en-US" smtClean="0"/>
+              <a:t>driver DAC</a:t>
+            </a:r>
+            <a:endParaRPr lang="en-US"/>
+          </a:p>
+        </p:txBody>
+      </p:sp>
+      <p:sp>
+        <p:nvSpPr>
+          <p:cNvPr id="6" name="TextBox 5"/>
+          <p:cNvSpPr txBox="1"/>
+          <p:nvPr/>
+        </p:nvSpPr>
+        <p:spPr>
+          <a:xfrm>
+            <a:off x="9444439" y="495018"/>
+            <a:ext cx="1184491" cy="369332"/>
+          </a:xfrm>
+          <a:prstGeom prst="rect">
+            <a:avLst/>
+          </a:prstGeom>
+          <a:noFill/>
+        </p:spPr>
+        <p:txBody>
+          <a:bodyPr wrap="none" rtlCol="0">
+            <a:spAutoFit/>
+          </a:bodyPr>
+          <a:lstStyle/>
+          <a:p>
+            <a:r>
+              <a:rPr lang="en-US" smtClean="0"/>
+              <a:t>driver DAC</a:t>
+            </a:r>
+            <a:endParaRPr lang="en-US"/>
+          </a:p>
+        </p:txBody>
+      </p:sp>
+      <p:sp>
+        <p:nvSpPr>
+          <p:cNvPr id="7" name="TextBox 6"/>
+          <p:cNvSpPr txBox="1"/>
+          <p:nvPr/>
+        </p:nvSpPr>
+        <p:spPr>
+          <a:xfrm>
+            <a:off x="10813912" y="495018"/>
+            <a:ext cx="579005" cy="369332"/>
+          </a:xfrm>
+          <a:prstGeom prst="rect">
+            <a:avLst/>
+          </a:prstGeom>
+          <a:noFill/>
+        </p:spPr>
+        <p:txBody>
+          <a:bodyPr wrap="none" rtlCol="0">
+            <a:spAutoFit/>
+          </a:bodyPr>
+          <a:lstStyle/>
+          <a:p>
+            <a:r>
+              <a:rPr lang="en-US" smtClean="0"/>
+              <a:t>DAC</a:t>
+            </a:r>
+            <a:endParaRPr lang="en-US"/>
+          </a:p>
+        </p:txBody>
+      </p:sp>
+      <p:sp>
+        <p:nvSpPr>
+          <p:cNvPr id="8" name="TextBox 7"/>
+          <p:cNvSpPr txBox="1"/>
+          <p:nvPr/>
+        </p:nvSpPr>
+        <p:spPr>
+          <a:xfrm rot="16200000">
+            <a:off x="7661915" y="2637671"/>
+            <a:ext cx="1256210" cy="369332"/>
+          </a:xfrm>
+          <a:prstGeom prst="rect">
+            <a:avLst/>
+          </a:prstGeom>
+          <a:noFill/>
+        </p:spPr>
+        <p:txBody>
+          <a:bodyPr wrap="square" rtlCol="0">
+            <a:spAutoFit/>
+          </a:bodyPr>
+          <a:lstStyle/>
+          <a:p>
+            <a:r>
+              <a:rPr lang="en-US" dirty="0" smtClean="0"/>
+              <a:t>change flag</a:t>
+            </a:r>
+            <a:endParaRPr lang="en-US" dirty="0"/>
+          </a:p>
+        </p:txBody>
+      </p:sp>
+      <p:sp>
+        <p:nvSpPr>
+          <p:cNvPr id="9" name="TextBox 8"/>
+          <p:cNvSpPr txBox="1"/>
+          <p:nvPr/>
+        </p:nvSpPr>
+        <p:spPr>
+          <a:xfrm rot="16200000">
+            <a:off x="7550331" y="2369312"/>
+            <a:ext cx="686406" cy="369332"/>
+          </a:xfrm>
+          <a:prstGeom prst="rect">
+            <a:avLst/>
+          </a:prstGeom>
+          <a:noFill/>
+        </p:spPr>
+        <p:txBody>
+          <a:bodyPr wrap="none" rtlCol="0">
+            <a:spAutoFit/>
+          </a:bodyPr>
+          <a:lstStyle/>
+          <a:p>
+            <a:r>
+              <a:rPr lang="en-US" dirty="0" smtClean="0"/>
+              <a:t>value</a:t>
+            </a:r>
+            <a:endParaRPr lang="en-US" dirty="0"/>
+          </a:p>
+        </p:txBody>
+      </p:sp>
+      <p:sp>
+        <p:nvSpPr>
+          <p:cNvPr id="10" name="TextBox 9"/>
+          <p:cNvSpPr txBox="1"/>
+          <p:nvPr/>
+        </p:nvSpPr>
+        <p:spPr>
+          <a:xfrm rot="16200000">
+            <a:off x="8099240" y="2568821"/>
+            <a:ext cx="1118511" cy="369332"/>
+          </a:xfrm>
+          <a:prstGeom prst="rect">
+            <a:avLst/>
+          </a:prstGeom>
+          <a:noFill/>
+        </p:spPr>
+        <p:txBody>
+          <a:bodyPr wrap="none" rtlCol="0">
+            <a:spAutoFit/>
+          </a:bodyPr>
+          <a:lstStyle/>
+          <a:p>
+            <a:r>
+              <a:rPr lang="en-US" dirty="0" smtClean="0"/>
+              <a:t>“fast” flag</a:t>
+            </a:r>
+            <a:endParaRPr lang="en-US" dirty="0"/>
+          </a:p>
+        </p:txBody>
+      </p:sp>
+      <p:sp>
+        <p:nvSpPr>
+          <p:cNvPr id="12" name="TextBox 11"/>
+          <p:cNvSpPr txBox="1"/>
+          <p:nvPr/>
+        </p:nvSpPr>
+        <p:spPr>
+          <a:xfrm rot="16200000">
+            <a:off x="9065624" y="2359958"/>
+            <a:ext cx="686406" cy="369332"/>
+          </a:xfrm>
+          <a:prstGeom prst="rect">
+            <a:avLst/>
+          </a:prstGeom>
+          <a:noFill/>
+        </p:spPr>
+        <p:txBody>
+          <a:bodyPr wrap="none" rtlCol="0">
+            <a:spAutoFit/>
+          </a:bodyPr>
+          <a:lstStyle/>
+          <a:p>
+            <a:r>
+              <a:rPr lang="en-US" dirty="0" smtClean="0"/>
+              <a:t>value</a:t>
+            </a:r>
+            <a:endParaRPr lang="en-US" dirty="0"/>
+          </a:p>
+        </p:txBody>
+      </p:sp>
+      <p:sp>
+        <p:nvSpPr>
+          <p:cNvPr id="14" name="TextBox 13"/>
+          <p:cNvSpPr txBox="1"/>
+          <p:nvPr/>
+        </p:nvSpPr>
+        <p:spPr>
+          <a:xfrm rot="16200000">
+            <a:off x="10620597" y="2347835"/>
+            <a:ext cx="686406" cy="369332"/>
+          </a:xfrm>
+          <a:prstGeom prst="rect">
+            <a:avLst/>
+          </a:prstGeom>
+          <a:noFill/>
+        </p:spPr>
+        <p:txBody>
+          <a:bodyPr wrap="none" rtlCol="0">
+            <a:spAutoFit/>
+          </a:bodyPr>
+          <a:lstStyle/>
+          <a:p>
+            <a:r>
+              <a:rPr lang="en-US" dirty="0" smtClean="0"/>
+              <a:t>value</a:t>
+            </a:r>
+            <a:endParaRPr lang="en-US" dirty="0"/>
+          </a:p>
+        </p:txBody>
+      </p:sp>
+      <p:sp>
+        <p:nvSpPr>
+          <p:cNvPr id="15" name="TextBox 14"/>
+          <p:cNvSpPr txBox="1"/>
+          <p:nvPr/>
+        </p:nvSpPr>
+        <p:spPr>
+          <a:xfrm rot="16200000">
+            <a:off x="8423916" y="2637671"/>
+            <a:ext cx="1256210" cy="369332"/>
+          </a:xfrm>
+          <a:prstGeom prst="rect">
+            <a:avLst/>
+          </a:prstGeom>
+          <a:noFill/>
+        </p:spPr>
+        <p:txBody>
+          <a:bodyPr wrap="square" rtlCol="0">
+            <a:spAutoFit/>
+          </a:bodyPr>
+          <a:lstStyle/>
+          <a:p>
+            <a:r>
+              <a:rPr lang="en-US" dirty="0" smtClean="0"/>
+              <a:t>change flag</a:t>
+            </a:r>
+            <a:endParaRPr lang="en-US" dirty="0"/>
+          </a:p>
+        </p:txBody>
+      </p:sp>
+      <p:sp>
+        <p:nvSpPr>
+          <p:cNvPr id="16" name="TextBox 15"/>
+          <p:cNvSpPr txBox="1"/>
+          <p:nvPr/>
+        </p:nvSpPr>
+        <p:spPr>
+          <a:xfrm rot="16200000">
+            <a:off x="9185917" y="2637671"/>
+            <a:ext cx="1256210" cy="369332"/>
+          </a:xfrm>
+          <a:prstGeom prst="rect">
+            <a:avLst/>
+          </a:prstGeom>
+          <a:noFill/>
+        </p:spPr>
+        <p:txBody>
+          <a:bodyPr wrap="square" rtlCol="0">
+            <a:spAutoFit/>
+          </a:bodyPr>
+          <a:lstStyle/>
+          <a:p>
+            <a:r>
+              <a:rPr lang="en-US" dirty="0" smtClean="0"/>
+              <a:t>change flag</a:t>
+            </a:r>
+            <a:endParaRPr lang="en-US" dirty="0"/>
+          </a:p>
+        </p:txBody>
+      </p:sp>
+      <p:sp>
+        <p:nvSpPr>
+          <p:cNvPr id="17" name="TextBox 16"/>
+          <p:cNvSpPr txBox="1"/>
+          <p:nvPr/>
+        </p:nvSpPr>
+        <p:spPr>
+          <a:xfrm rot="16200000">
+            <a:off x="9947918" y="2637671"/>
+            <a:ext cx="1256210" cy="369332"/>
+          </a:xfrm>
+          <a:prstGeom prst="rect">
+            <a:avLst/>
+          </a:prstGeom>
+          <a:noFill/>
+        </p:spPr>
+        <p:txBody>
+          <a:bodyPr wrap="square" rtlCol="0">
+            <a:spAutoFit/>
+          </a:bodyPr>
+          <a:lstStyle/>
+          <a:p>
+            <a:r>
+              <a:rPr lang="en-US" dirty="0" smtClean="0"/>
+              <a:t>change flag</a:t>
+            </a:r>
+            <a:endParaRPr lang="en-US" dirty="0"/>
+          </a:p>
+        </p:txBody>
+      </p:sp>
+      <p:sp>
+        <p:nvSpPr>
+          <p:cNvPr id="18" name="TextBox 17"/>
+          <p:cNvSpPr txBox="1"/>
+          <p:nvPr/>
+        </p:nvSpPr>
+        <p:spPr>
+          <a:xfrm rot="16200000">
+            <a:off x="10709919" y="2637671"/>
+            <a:ext cx="1256210" cy="369332"/>
+          </a:xfrm>
+          <a:prstGeom prst="rect">
+            <a:avLst/>
+          </a:prstGeom>
+          <a:noFill/>
+        </p:spPr>
+        <p:txBody>
+          <a:bodyPr wrap="square" rtlCol="0">
+            <a:spAutoFit/>
+          </a:bodyPr>
+          <a:lstStyle/>
+          <a:p>
+            <a:r>
+              <a:rPr lang="en-US" dirty="0" smtClean="0"/>
+              <a:t>change flag</a:t>
+            </a:r>
+            <a:endParaRPr lang="en-US" dirty="0"/>
+          </a:p>
+        </p:txBody>
+      </p:sp>
+      <p:sp>
+        <p:nvSpPr>
+          <p:cNvPr id="19" name="TextBox 18"/>
+          <p:cNvSpPr txBox="1"/>
+          <p:nvPr/>
+        </p:nvSpPr>
+        <p:spPr>
+          <a:xfrm rot="16200000">
+            <a:off x="9644990" y="2568819"/>
+            <a:ext cx="1118511" cy="369332"/>
+          </a:xfrm>
+          <a:prstGeom prst="rect">
+            <a:avLst/>
+          </a:prstGeom>
+          <a:noFill/>
+        </p:spPr>
+        <p:txBody>
+          <a:bodyPr wrap="none" rtlCol="0">
+            <a:spAutoFit/>
+          </a:bodyPr>
+          <a:lstStyle/>
+          <a:p>
+            <a:r>
+              <a:rPr lang="en-US" dirty="0" smtClean="0"/>
+              <a:t>“fast” flag</a:t>
+            </a:r>
+            <a:endParaRPr lang="en-US" dirty="0"/>
+          </a:p>
+        </p:txBody>
+      </p:sp>
+      <p:cxnSp>
+        <p:nvCxnSpPr>
+          <p:cNvPr id="21" name="Straight Connector 20"/>
+          <p:cNvCxnSpPr/>
+          <p:nvPr/>
+        </p:nvCxnSpPr>
+        <p:spPr>
+          <a:xfrm flipV="1">
+            <a:off x="7785463" y="862792"/>
+            <a:ext cx="1438698" cy="8747"/>
+          </a:xfrm>
+          <a:prstGeom prst="line">
+            <a:avLst/>
+          </a:prstGeom>
+          <a:ln w="38100"/>
+        </p:spPr>
+        <p:style>
+          <a:lnRef idx="1">
+            <a:schemeClr val="accent1"/>
+          </a:lnRef>
+          <a:fillRef idx="0">
+            <a:schemeClr val="accent1"/>
+          </a:fillRef>
+          <a:effectRef idx="0">
+            <a:schemeClr val="accent1"/>
+          </a:effectRef>
+          <a:fontRef idx="minor">
+            <a:schemeClr val="tx1"/>
+          </a:fontRef>
+        </p:style>
+      </p:cxnSp>
+      <p:sp>
+        <p:nvSpPr>
+          <p:cNvPr id="22" name="Title 1"/>
+          <p:cNvSpPr txBox="1">
+            <a:spLocks/>
+          </p:cNvSpPr>
+          <p:nvPr/>
+        </p:nvSpPr>
+        <p:spPr>
+          <a:xfrm>
+            <a:off x="822424" y="365124"/>
+            <a:ext cx="10515600" cy="1325563"/>
+          </a:xfrm>
+          <a:prstGeom prst="rect">
+            <a:avLst/>
+          </a:prstGeom>
+        </p:spPr>
+        <p:txBody>
+          <a:bodyPr vert="horz" lIns="91440" tIns="45720" rIns="91440" bIns="45720" rtlCol="0" anchor="ctr">
+            <a:normAutofit/>
+          </a:bodyPr>
+          <a:lstStyle>
+            <a:lvl1pPr algn="l" defTabSz="914400" rtl="0" eaLnBrk="1" latinLnBrk="0" hangingPunct="1">
+              <a:lnSpc>
+                <a:spcPct val="90000"/>
+              </a:lnSpc>
+              <a:spcBef>
+                <a:spcPct val="0"/>
+              </a:spcBef>
+              <a:buNone/>
+              <a:defRPr sz="4400" kern="1200">
+                <a:solidFill>
+                  <a:schemeClr val="tx1"/>
+                </a:solidFill>
+                <a:latin typeface="+mj-lt"/>
+                <a:ea typeface="+mj-ea"/>
+                <a:cs typeface="+mj-cs"/>
+              </a:defRPr>
+            </a:lvl1pPr>
+          </a:lstStyle>
+          <a:p>
+            <a:r>
+              <a:rPr lang="en-US" smtClean="0"/>
+              <a:t>UniqueStateArr</a:t>
+            </a:r>
+            <a:endParaRPr lang="en-US" dirty="0"/>
+          </a:p>
+        </p:txBody>
+      </p:sp>
+      <p:cxnSp>
+        <p:nvCxnSpPr>
+          <p:cNvPr id="23" name="Straight Connector 22"/>
+          <p:cNvCxnSpPr/>
+          <p:nvPr/>
+        </p:nvCxnSpPr>
+        <p:spPr>
+          <a:xfrm>
+            <a:off x="10836921" y="862791"/>
+            <a:ext cx="685769" cy="1559"/>
+          </a:xfrm>
+          <a:prstGeom prst="line">
+            <a:avLst/>
+          </a:prstGeom>
+          <a:ln w="38100"/>
+        </p:spPr>
+        <p:style>
+          <a:lnRef idx="1">
+            <a:schemeClr val="accent1"/>
+          </a:lnRef>
+          <a:fillRef idx="0">
+            <a:schemeClr val="accent1"/>
+          </a:fillRef>
+          <a:effectRef idx="0">
+            <a:schemeClr val="accent1"/>
+          </a:effectRef>
+          <a:fontRef idx="minor">
+            <a:schemeClr val="tx1"/>
+          </a:fontRef>
+        </p:style>
+      </p:cxnSp>
+      <p:cxnSp>
+        <p:nvCxnSpPr>
+          <p:cNvPr id="24" name="Straight Connector 23"/>
+          <p:cNvCxnSpPr/>
+          <p:nvPr/>
+        </p:nvCxnSpPr>
+        <p:spPr>
+          <a:xfrm flipV="1">
+            <a:off x="9350306" y="862791"/>
+            <a:ext cx="1333833" cy="1560"/>
+          </a:xfrm>
+          <a:prstGeom prst="line">
+            <a:avLst/>
+          </a:prstGeom>
+          <a:ln w="38100"/>
+        </p:spPr>
+        <p:style>
+          <a:lnRef idx="1">
+            <a:schemeClr val="accent1"/>
+          </a:lnRef>
+          <a:fillRef idx="0">
+            <a:schemeClr val="accent1"/>
+          </a:fillRef>
+          <a:effectRef idx="0">
+            <a:schemeClr val="accent1"/>
+          </a:effectRef>
+          <a:fontRef idx="minor">
+            <a:schemeClr val="tx1"/>
+          </a:fontRef>
+        </p:style>
+      </p:cxnSp>
     </p:spTree>
     <p:extLst>
       <p:ext uri="{BB962C8B-B14F-4D97-AF65-F5344CB8AC3E}">
@@ -7103,13 +8718,13 @@
         </p:nvSpPr>
         <p:spPr>
           <a:xfrm>
-            <a:off x="838200" y="1825625"/>
-            <a:ext cx="9716589" cy="4351338"/>
+            <a:off x="735169" y="1194559"/>
+            <a:ext cx="9716589" cy="5032375"/>
           </a:xfrm>
         </p:spPr>
         <p:txBody>
           <a:bodyPr>
-            <a:normAutofit fontScale="55000" lnSpcReduction="20000"/>
+            <a:normAutofit fontScale="70000" lnSpcReduction="20000"/>
           </a:bodyPr>
           <a:lstStyle/>
           <a:p>
@@ -7157,11 +8772,7 @@
             <a:pPr lvl="2"/>
             <a:r>
               <a:rPr lang="en-US" b="1" dirty="0" err="1" smtClean="0"/>
-              <a:t>e</a:t>
-            </a:r>
-            <a:r>
-              <a:rPr lang="en-US" b="1" dirty="0" err="1" smtClean="0"/>
-              <a:t>ndline</a:t>
+              <a:t>endline</a:t>
             </a:r>
             <a:r>
               <a:rPr lang="en-US" dirty="0" smtClean="0"/>
@@ -7185,11 +8796,7 @@
             <a:pPr lvl="2"/>
             <a:r>
               <a:rPr lang="en-US" b="1" dirty="0" smtClean="0"/>
-              <a:t>l</a:t>
-            </a:r>
-            <a:r>
-              <a:rPr lang="en-US" b="1" dirty="0" smtClean="0"/>
-              <a:t>abel</a:t>
+              <a:t>label</a:t>
             </a:r>
             <a:r>
               <a:rPr lang="en-US" dirty="0" smtClean="0"/>
@@ -7274,7 +8881,6 @@
               <a:rPr lang="en-US" dirty="0" smtClean="0"/>
               <a:t> will overwrite Catalog entries without complaining.</a:t>
             </a:r>
-            <a:endParaRPr lang="en-US" dirty="0" smtClean="0"/>
           </a:p>
           <a:p>
             <a:pPr lvl="2"/>
@@ -7351,7 +8957,6 @@
               <a:rPr lang="en-US" dirty="0" smtClean="0"/>
               <a:t>.</a:t>
             </a:r>
-            <a:endParaRPr lang="en-US" dirty="0" smtClean="0"/>
           </a:p>
           <a:p>
             <a:pPr lvl="2"/>
@@ -7569,13 +9174,8 @@
             </a:r>
             <a:r>
               <a:rPr lang="en-US" dirty="0" smtClean="0"/>
-              <a:t> and values.  </a:t>
-            </a:r>
-            <a:r>
-              <a:rPr lang="en-US" dirty="0" smtClean="0"/>
-              <a:t>Used to track decrementing counters for time calculations and plotting</a:t>
-            </a:r>
-            <a:endParaRPr lang="en-US" dirty="0" smtClean="0"/>
+              <a:t> and values.  Used to track decrementing counters for time calculations and plotting</a:t>
+            </a:r>
           </a:p>
           <a:p>
             <a:pPr lvl="2"/>
@@ -7663,7 +9263,7 @@
               <a:t>TimingSegment</a:t>
             </a:r>
             <a:r>
-              <a:rPr lang="en-US" smtClean="0">
+              <a:rPr lang="en-US" dirty="0" smtClean="0">
                 <a:solidFill>
                   <a:schemeClr val="accent6"/>
                 </a:solidFill>
@@ -7682,6 +9282,507 @@
     <p:extLst>
       <p:ext uri="{BB962C8B-B14F-4D97-AF65-F5344CB8AC3E}">
         <p14:creationId xmlns:p14="http://schemas.microsoft.com/office/powerpoint/2010/main" val="1205396784"/>
+      </p:ext>
+    </p:extLst>
+  </p:cSld>
+  <p:clrMapOvr>
+    <a:masterClrMapping/>
+  </p:clrMapOvr>
+  <p:timing>
+    <p:tnLst>
+      <p:par>
+        <p:cTn id="1" dur="indefinite" restart="never" nodeType="tmRoot"/>
+      </p:par>
+    </p:tnLst>
+  </p:timing>
+</p:sld>
+</file>
+
+<file path=ppt/slides/slide8.xml><?xml version="1.0" encoding="utf-8"?>
+<p:sld xmlns:a="http://schemas.openxmlformats.org/drawingml/2006/main" xmlns:r="http://schemas.openxmlformats.org/officeDocument/2006/relationships" xmlns:p="http://schemas.openxmlformats.org/presentationml/2006/main">
+  <p:cSld>
+    <p:spTree>
+      <p:nvGrpSpPr>
+        <p:cNvPr id="1" name=""/>
+        <p:cNvGrpSpPr/>
+        <p:nvPr/>
+      </p:nvGrpSpPr>
+      <p:grpSpPr>
+        <a:xfrm>
+          <a:off x="0" y="0"/>
+          <a:ext cx="0" cy="0"/>
+          <a:chOff x="0" y="0"/>
+          <a:chExt cx="0" cy="0"/>
+        </a:xfrm>
+      </p:grpSpPr>
+      <p:sp>
+        <p:nvSpPr>
+          <p:cNvPr id="2" name="Title 1"/>
+          <p:cNvSpPr>
+            <a:spLocks noGrp="1"/>
+          </p:cNvSpPr>
+          <p:nvPr>
+            <p:ph type="title"/>
+          </p:nvPr>
+        </p:nvSpPr>
+        <p:spPr>
+          <a:xfrm>
+            <a:off x="0" y="0"/>
+            <a:ext cx="4920343" cy="810532"/>
+          </a:xfrm>
+        </p:spPr>
+        <p:txBody>
+          <a:bodyPr/>
+          <a:lstStyle/>
+          <a:p>
+            <a:r>
+              <a:rPr lang="en-US" dirty="0"/>
+              <a:t>c</a:t>
+            </a:r>
+            <a:r>
+              <a:rPr lang="en-US" smtClean="0"/>
+              <a:t>lass </a:t>
+            </a:r>
+            <a:r>
+              <a:rPr lang="en-US" dirty="0" err="1" smtClean="0"/>
+              <a:t>TimingSegment</a:t>
+            </a:r>
+            <a:endParaRPr lang="en-US" dirty="0"/>
+          </a:p>
+        </p:txBody>
+      </p:sp>
+      <p:sp>
+        <p:nvSpPr>
+          <p:cNvPr id="3" name="Content Placeholder 2"/>
+          <p:cNvSpPr>
+            <a:spLocks noGrp="1"/>
+          </p:cNvSpPr>
+          <p:nvPr>
+            <p:ph idx="1"/>
+          </p:nvPr>
+        </p:nvSpPr>
+        <p:spPr>
+          <a:xfrm>
+            <a:off x="735169" y="1194559"/>
+            <a:ext cx="9716589" cy="5032375"/>
+          </a:xfrm>
+        </p:spPr>
+        <p:txBody>
+          <a:bodyPr>
+            <a:normAutofit/>
+          </a:bodyPr>
+          <a:lstStyle/>
+          <a:p>
+            <a:r>
+              <a:rPr lang="en-US" dirty="0" smtClean="0"/>
+              <a:t>Methods</a:t>
+            </a:r>
+            <a:r>
+              <a:rPr lang="en-US" dirty="0" smtClean="0"/>
+              <a:t>:</a:t>
+            </a:r>
+          </a:p>
+          <a:p>
+            <a:pPr lvl="1"/>
+            <a:r>
+              <a:rPr lang="en-US" dirty="0" smtClean="0">
+                <a:solidFill>
+                  <a:schemeClr val="accent5"/>
+                </a:solidFill>
+              </a:rPr>
+              <a:t>__</a:t>
+            </a:r>
+            <a:r>
+              <a:rPr lang="en-US" dirty="0" err="1">
+                <a:solidFill>
+                  <a:schemeClr val="accent5"/>
+                </a:solidFill>
+              </a:rPr>
+              <a:t>init</a:t>
+            </a:r>
+            <a:r>
+              <a:rPr lang="en-US" dirty="0">
+                <a:solidFill>
+                  <a:schemeClr val="accent5"/>
+                </a:solidFill>
+              </a:rPr>
+              <a:t>__(</a:t>
+            </a:r>
+            <a:r>
+              <a:rPr lang="en-US" dirty="0"/>
+              <a:t>self, name='', </a:t>
+            </a:r>
+            <a:r>
+              <a:rPr lang="en-US" dirty="0" err="1"/>
+              <a:t>TStype</a:t>
+            </a:r>
+            <a:r>
+              <a:rPr lang="en-US" dirty="0"/>
+              <a:t> = '', </a:t>
+            </a:r>
+            <a:r>
+              <a:rPr lang="en-US" dirty="0" err="1"/>
+              <a:t>nperiods</a:t>
+            </a:r>
+            <a:r>
+              <a:rPr lang="en-US" dirty="0"/>
+              <a:t>=1, </a:t>
+            </a:r>
+            <a:r>
+              <a:rPr lang="en-US" dirty="0" err="1"/>
+              <a:t>endline</a:t>
+            </a:r>
+            <a:r>
+              <a:rPr lang="en-US" dirty="0"/>
+              <a:t>=-2</a:t>
+            </a:r>
+            <a:r>
+              <a:rPr lang="en-US" dirty="0" smtClean="0"/>
+              <a:t>):</a:t>
+            </a:r>
+          </a:p>
+          <a:p>
+            <a:pPr lvl="1"/>
+            <a:r>
+              <a:rPr lang="en-US" dirty="0" smtClean="0">
+                <a:solidFill>
+                  <a:schemeClr val="accent5"/>
+                </a:solidFill>
+              </a:rPr>
+              <a:t>__</a:t>
+            </a:r>
+            <a:r>
+              <a:rPr lang="en-US" dirty="0" err="1">
+                <a:solidFill>
+                  <a:schemeClr val="accent5"/>
+                </a:solidFill>
+              </a:rPr>
+              <a:t>tmax</a:t>
+            </a:r>
+            <a:r>
+              <a:rPr lang="en-US" dirty="0"/>
+              <a:t>(</a:t>
+            </a:r>
+            <a:r>
+              <a:rPr lang="en-US" dirty="0" err="1"/>
+              <a:t>self,reset</a:t>
+            </a:r>
+            <a:r>
+              <a:rPr lang="en-US" dirty="0"/>
+              <a:t>=False): # subroutine of </a:t>
+            </a:r>
+            <a:r>
+              <a:rPr lang="en-US" dirty="0">
+                <a:solidFill>
+                  <a:schemeClr val="accent5"/>
+                </a:solidFill>
+              </a:rPr>
+              <a:t>__</a:t>
+            </a:r>
+            <a:r>
+              <a:rPr lang="en-US" dirty="0" err="1">
+                <a:solidFill>
+                  <a:schemeClr val="accent5"/>
+                </a:solidFill>
+              </a:rPr>
+              <a:t>make_states</a:t>
+            </a:r>
+            <a:r>
+              <a:rPr lang="en-US" dirty="0"/>
+              <a:t>()    </a:t>
+            </a:r>
+            <a:endParaRPr lang="en-US" dirty="0" smtClean="0"/>
+          </a:p>
+          <a:p>
+            <a:pPr lvl="1"/>
+            <a:r>
+              <a:rPr lang="en-US" dirty="0" smtClean="0">
+                <a:solidFill>
+                  <a:schemeClr val="accent5"/>
+                </a:solidFill>
+              </a:rPr>
+              <a:t>__</a:t>
+            </a:r>
+            <a:r>
+              <a:rPr lang="en-US" dirty="0" err="1">
+                <a:solidFill>
+                  <a:schemeClr val="accent5"/>
+                </a:solidFill>
+              </a:rPr>
+              <a:t>fill_state</a:t>
+            </a:r>
+            <a:r>
+              <a:rPr lang="en-US" dirty="0"/>
+              <a:t>(self, </a:t>
+            </a:r>
+            <a:r>
+              <a:rPr lang="en-US" dirty="0" err="1"/>
+              <a:t>boardtype</a:t>
+            </a:r>
+            <a:r>
+              <a:rPr lang="en-US" dirty="0"/>
+              <a:t>): # subroutine of </a:t>
+            </a:r>
+            <a:r>
+              <a:rPr lang="en-US" dirty="0">
+                <a:solidFill>
+                  <a:schemeClr val="accent5"/>
+                </a:solidFill>
+              </a:rPr>
+              <a:t>__</a:t>
+            </a:r>
+            <a:r>
+              <a:rPr lang="en-US" dirty="0" err="1">
+                <a:solidFill>
+                  <a:schemeClr val="accent5"/>
+                </a:solidFill>
+              </a:rPr>
+              <a:t>make_states</a:t>
+            </a:r>
+            <a:r>
+              <a:rPr lang="en-US" dirty="0"/>
+              <a:t>()    </a:t>
+            </a:r>
+            <a:endParaRPr lang="en-US" dirty="0" smtClean="0"/>
+          </a:p>
+          <a:p>
+            <a:pPr lvl="1"/>
+            <a:r>
+              <a:rPr lang="en-US" dirty="0" smtClean="0">
+                <a:solidFill>
+                  <a:schemeClr val="accent5"/>
+                </a:solidFill>
+              </a:rPr>
+              <a:t>__</a:t>
+            </a:r>
+            <a:r>
+              <a:rPr lang="en-US" dirty="0" err="1">
+                <a:solidFill>
+                  <a:schemeClr val="accent5"/>
+                </a:solidFill>
+              </a:rPr>
+              <a:t>make_states</a:t>
+            </a:r>
+            <a:r>
+              <a:rPr lang="en-US" dirty="0"/>
+              <a:t>(self):    </a:t>
+            </a:r>
+            <a:endParaRPr lang="en-US" dirty="0" smtClean="0"/>
+          </a:p>
+          <a:p>
+            <a:pPr lvl="1"/>
+            <a:r>
+              <a:rPr lang="en-US" dirty="0" smtClean="0">
+                <a:solidFill>
+                  <a:schemeClr val="accent5"/>
+                </a:solidFill>
+              </a:rPr>
+              <a:t>script</a:t>
+            </a:r>
+            <a:r>
+              <a:rPr lang="en-US" dirty="0" smtClean="0"/>
+              <a:t>(self</a:t>
+            </a:r>
+            <a:r>
+              <a:rPr lang="en-US" dirty="0"/>
+              <a:t>, </a:t>
+            </a:r>
+            <a:r>
+              <a:rPr lang="en-US" dirty="0" err="1"/>
+              <a:t>outfile</a:t>
+            </a:r>
+            <a:r>
+              <a:rPr lang="en-US" dirty="0"/>
+              <a:t>=</a:t>
+            </a:r>
+            <a:r>
+              <a:rPr lang="en-US" dirty="0" err="1"/>
+              <a:t>sys.stdout</a:t>
+            </a:r>
+            <a:r>
+              <a:rPr lang="en-US" dirty="0" smtClean="0"/>
+              <a:t>):</a:t>
+            </a:r>
+          </a:p>
+          <a:p>
+            <a:pPr lvl="2"/>
+            <a:r>
+              <a:rPr lang="en-US" dirty="0" smtClean="0"/>
+              <a:t>generates the script</a:t>
+            </a:r>
+          </a:p>
+          <a:p>
+            <a:pPr lvl="2"/>
+            <a:r>
+              <a:rPr lang="en-US" dirty="0"/>
+              <a:t>(if necessary) calls </a:t>
+            </a:r>
+            <a:r>
+              <a:rPr lang="en-US" dirty="0">
+                <a:solidFill>
+                  <a:schemeClr val="accent5"/>
+                </a:solidFill>
+              </a:rPr>
+              <a:t>__</a:t>
+            </a:r>
+            <a:r>
+              <a:rPr lang="en-US" dirty="0" err="1">
+                <a:solidFill>
+                  <a:schemeClr val="accent5"/>
+                </a:solidFill>
+              </a:rPr>
+              <a:t>make_states</a:t>
+            </a:r>
+            <a:r>
+              <a:rPr lang="en-US" dirty="0"/>
+              <a:t>() to populate the </a:t>
+            </a:r>
+            <a:r>
+              <a:rPr lang="en-US" dirty="0" err="1">
+                <a:solidFill>
+                  <a:schemeClr val="accent2"/>
+                </a:solidFill>
+              </a:rPr>
+              <a:t>UniqueStateArr</a:t>
+            </a:r>
+            <a:r>
+              <a:rPr lang="en-US" dirty="0">
+                <a:solidFill>
+                  <a:schemeClr val="accent2"/>
+                </a:solidFill>
+              </a:rPr>
+              <a:t> </a:t>
+            </a:r>
+          </a:p>
+          <a:p>
+            <a:pPr lvl="1"/>
+            <a:r>
+              <a:rPr lang="en-US" dirty="0" smtClean="0">
+                <a:solidFill>
+                  <a:schemeClr val="accent5"/>
+                </a:solidFill>
+              </a:rPr>
+              <a:t>__</a:t>
+            </a:r>
+            <a:r>
+              <a:rPr lang="en-US" dirty="0" err="1">
+                <a:solidFill>
+                  <a:schemeClr val="accent5"/>
+                </a:solidFill>
+              </a:rPr>
+              <a:t>make_waveform</a:t>
+            </a:r>
+            <a:r>
+              <a:rPr lang="en-US" dirty="0"/>
+              <a:t>(self, </a:t>
+            </a:r>
+            <a:r>
+              <a:rPr lang="en-US" dirty="0" err="1"/>
+              <a:t>initialLevel</a:t>
+            </a:r>
+            <a:r>
+              <a:rPr lang="en-US" dirty="0"/>
+              <a:t>=[]):    </a:t>
+            </a:r>
+            <a:endParaRPr lang="en-US" dirty="0" smtClean="0"/>
+          </a:p>
+          <a:p>
+            <a:pPr lvl="1"/>
+            <a:r>
+              <a:rPr lang="en-US" dirty="0" smtClean="0">
+                <a:solidFill>
+                  <a:schemeClr val="accent5"/>
+                </a:solidFill>
+              </a:rPr>
+              <a:t>plot</a:t>
+            </a:r>
+            <a:r>
+              <a:rPr lang="en-US" dirty="0" smtClean="0"/>
+              <a:t>(self</a:t>
+            </a:r>
+            <a:r>
+              <a:rPr lang="en-US" dirty="0"/>
+              <a:t>, cycles=2, </a:t>
+            </a:r>
+            <a:r>
+              <a:rPr lang="en-US" dirty="0" err="1"/>
+              <a:t>initialLevel</a:t>
+            </a:r>
+            <a:r>
+              <a:rPr lang="en-US" dirty="0" smtClean="0"/>
+              <a:t>=[]):</a:t>
+            </a:r>
+          </a:p>
+          <a:p>
+            <a:pPr lvl="2"/>
+            <a:r>
+              <a:rPr lang="en-US" dirty="0" smtClean="0"/>
+              <a:t>generates waveform plots using </a:t>
+            </a:r>
+            <a:r>
+              <a:rPr lang="en-US" dirty="0" smtClean="0">
+                <a:solidFill>
+                  <a:schemeClr val="accent5"/>
+                </a:solidFill>
+              </a:rPr>
+              <a:t>__</a:t>
+            </a:r>
+            <a:r>
+              <a:rPr lang="en-US" dirty="0" err="1" smtClean="0">
+                <a:solidFill>
+                  <a:schemeClr val="accent5"/>
+                </a:solidFill>
+              </a:rPr>
+              <a:t>make_waveform</a:t>
+            </a:r>
+            <a:r>
+              <a:rPr lang="en-US" dirty="0" smtClean="0"/>
+              <a:t>()</a:t>
+            </a:r>
+            <a:endParaRPr lang="en-US" dirty="0" smtClean="0"/>
+          </a:p>
+          <a:p>
+            <a:pPr lvl="2"/>
+            <a:r>
+              <a:rPr lang="en-US" dirty="0"/>
+              <a:t>(if necessary) calls </a:t>
+            </a:r>
+            <a:r>
+              <a:rPr lang="en-US" dirty="0">
+                <a:solidFill>
+                  <a:schemeClr val="accent5"/>
+                </a:solidFill>
+              </a:rPr>
+              <a:t>__</a:t>
+            </a:r>
+            <a:r>
+              <a:rPr lang="en-US" dirty="0" err="1">
+                <a:solidFill>
+                  <a:schemeClr val="accent5"/>
+                </a:solidFill>
+              </a:rPr>
+              <a:t>make_states</a:t>
+            </a:r>
+            <a:r>
+              <a:rPr lang="en-US" dirty="0"/>
+              <a:t>() to populate the </a:t>
+            </a:r>
+            <a:r>
+              <a:rPr lang="en-US" dirty="0" err="1" smtClean="0">
+                <a:solidFill>
+                  <a:schemeClr val="accent2"/>
+                </a:solidFill>
+              </a:rPr>
+              <a:t>UniqueStateArr</a:t>
+            </a:r>
+            <a:endParaRPr lang="en-US" dirty="0"/>
+          </a:p>
+        </p:txBody>
+      </p:sp>
+    </p:spTree>
+    <p:extLst>
+      <p:ext uri="{BB962C8B-B14F-4D97-AF65-F5344CB8AC3E}">
+        <p14:creationId xmlns:p14="http://schemas.microsoft.com/office/powerpoint/2010/main" val="1057234438"/>
       </p:ext>
     </p:extLst>
   </p:cSld>

</xml_diff>

<commit_message>
added DRVX, support for DriverX copy of DRV, but allows 12 channels dh
	modified:   Documentation_for_wavgen.pptx
	modified:   Symbols.py
	modified:   wdlParser.py
</commit_message>
<xml_diff>
--- a/Documentation_for_wavgen.pptx
+++ b/Documentation_for_wavgen.pptx
@@ -161,10 +161,9 @@
           </a:lstStyle>
           <a:p>
             <a:r>
-              <a:rPr lang="en-US" smtClean="0"/>
+              <a:rPr lang="en-US"/>
               <a:t>Click to edit Master title style</a:t>
             </a:r>
-            <a:endParaRPr lang="en-US"/>
           </a:p>
         </p:txBody>
       </p:sp>
@@ -226,10 +225,9 @@
           </a:lstStyle>
           <a:p>
             <a:r>
-              <a:rPr lang="en-US" smtClean="0"/>
+              <a:rPr lang="en-US"/>
               <a:t>Click to edit Master subtitle style</a:t>
             </a:r>
-            <a:endParaRPr lang="en-US"/>
           </a:p>
         </p:txBody>
       </p:sp>
@@ -250,7 +248,7 @@
           <a:p>
             <a:fld id="{91C03662-DB08-574B-9401-5C5FECED7763}" type="datetimeFigureOut">
               <a:rPr lang="en-US" smtClean="0"/>
-              <a:t>3/23/18</a:t>
+              <a:t>5/15/20</a:t>
             </a:fld>
             <a:endParaRPr lang="en-US"/>
           </a:p>
@@ -344,10 +342,9 @@
           <a:lstStyle/>
           <a:p>
             <a:r>
-              <a:rPr lang="en-US" smtClean="0"/>
+              <a:rPr lang="en-US"/>
               <a:t>Click to edit Master title style</a:t>
             </a:r>
-            <a:endParaRPr lang="en-US"/>
           </a:p>
         </p:txBody>
       </p:sp>
@@ -368,38 +365,37 @@
           <a:p>
             <a:pPr lvl="0"/>
             <a:r>
-              <a:rPr lang="en-US" smtClean="0"/>
+              <a:rPr lang="en-US"/>
               <a:t>Click to edit Master text styles</a:t>
             </a:r>
           </a:p>
           <a:p>
             <a:pPr lvl="1"/>
             <a:r>
-              <a:rPr lang="en-US" smtClean="0"/>
+              <a:rPr lang="en-US"/>
               <a:t>Second level</a:t>
             </a:r>
           </a:p>
           <a:p>
             <a:pPr lvl="2"/>
             <a:r>
-              <a:rPr lang="en-US" smtClean="0"/>
+              <a:rPr lang="en-US"/>
               <a:t>Third level</a:t>
             </a:r>
           </a:p>
           <a:p>
             <a:pPr lvl="3"/>
             <a:r>
-              <a:rPr lang="en-US" smtClean="0"/>
+              <a:rPr lang="en-US"/>
               <a:t>Fourth level</a:t>
             </a:r>
           </a:p>
           <a:p>
             <a:pPr lvl="4"/>
             <a:r>
-              <a:rPr lang="en-US" smtClean="0"/>
+              <a:rPr lang="en-US"/>
               <a:t>Fifth level</a:t>
             </a:r>
-            <a:endParaRPr lang="en-US"/>
           </a:p>
         </p:txBody>
       </p:sp>
@@ -420,7 +416,7 @@
           <a:p>
             <a:fld id="{91C03662-DB08-574B-9401-5C5FECED7763}" type="datetimeFigureOut">
               <a:rPr lang="en-US" smtClean="0"/>
-              <a:t>3/23/18</a:t>
+              <a:t>5/15/20</a:t>
             </a:fld>
             <a:endParaRPr lang="en-US"/>
           </a:p>
@@ -519,10 +515,9 @@
           <a:lstStyle/>
           <a:p>
             <a:r>
-              <a:rPr lang="en-US" smtClean="0"/>
+              <a:rPr lang="en-US"/>
               <a:t>Click to edit Master title style</a:t>
             </a:r>
-            <a:endParaRPr lang="en-US"/>
           </a:p>
         </p:txBody>
       </p:sp>
@@ -548,38 +543,37 @@
           <a:p>
             <a:pPr lvl="0"/>
             <a:r>
-              <a:rPr lang="en-US" smtClean="0"/>
+              <a:rPr lang="en-US"/>
               <a:t>Click to edit Master text styles</a:t>
             </a:r>
           </a:p>
           <a:p>
             <a:pPr lvl="1"/>
             <a:r>
-              <a:rPr lang="en-US" smtClean="0"/>
+              <a:rPr lang="en-US"/>
               <a:t>Second level</a:t>
             </a:r>
           </a:p>
           <a:p>
             <a:pPr lvl="2"/>
             <a:r>
-              <a:rPr lang="en-US" smtClean="0"/>
+              <a:rPr lang="en-US"/>
               <a:t>Third level</a:t>
             </a:r>
           </a:p>
           <a:p>
             <a:pPr lvl="3"/>
             <a:r>
-              <a:rPr lang="en-US" smtClean="0"/>
+              <a:rPr lang="en-US"/>
               <a:t>Fourth level</a:t>
             </a:r>
           </a:p>
           <a:p>
             <a:pPr lvl="4"/>
             <a:r>
-              <a:rPr lang="en-US" smtClean="0"/>
+              <a:rPr lang="en-US"/>
               <a:t>Fifth level</a:t>
             </a:r>
-            <a:endParaRPr lang="en-US"/>
           </a:p>
         </p:txBody>
       </p:sp>
@@ -600,7 +594,7 @@
           <a:p>
             <a:fld id="{91C03662-DB08-574B-9401-5C5FECED7763}" type="datetimeFigureOut">
               <a:rPr lang="en-US" smtClean="0"/>
-              <a:t>3/23/18</a:t>
+              <a:t>5/15/20</a:t>
             </a:fld>
             <a:endParaRPr lang="en-US"/>
           </a:p>
@@ -694,10 +688,9 @@
           <a:lstStyle/>
           <a:p>
             <a:r>
-              <a:rPr lang="en-US" smtClean="0"/>
+              <a:rPr lang="en-US"/>
               <a:t>Click to edit Master title style</a:t>
             </a:r>
-            <a:endParaRPr lang="en-US"/>
           </a:p>
         </p:txBody>
       </p:sp>
@@ -718,38 +711,37 @@
           <a:p>
             <a:pPr lvl="0"/>
             <a:r>
-              <a:rPr lang="en-US" smtClean="0"/>
+              <a:rPr lang="en-US"/>
               <a:t>Click to edit Master text styles</a:t>
             </a:r>
           </a:p>
           <a:p>
             <a:pPr lvl="1"/>
             <a:r>
-              <a:rPr lang="en-US" smtClean="0"/>
+              <a:rPr lang="en-US"/>
               <a:t>Second level</a:t>
             </a:r>
           </a:p>
           <a:p>
             <a:pPr lvl="2"/>
             <a:r>
-              <a:rPr lang="en-US" smtClean="0"/>
+              <a:rPr lang="en-US"/>
               <a:t>Third level</a:t>
             </a:r>
           </a:p>
           <a:p>
             <a:pPr lvl="3"/>
             <a:r>
-              <a:rPr lang="en-US" smtClean="0"/>
+              <a:rPr lang="en-US"/>
               <a:t>Fourth level</a:t>
             </a:r>
           </a:p>
           <a:p>
             <a:pPr lvl="4"/>
             <a:r>
-              <a:rPr lang="en-US" smtClean="0"/>
+              <a:rPr lang="en-US"/>
               <a:t>Fifth level</a:t>
             </a:r>
-            <a:endParaRPr lang="en-US"/>
           </a:p>
         </p:txBody>
       </p:sp>
@@ -770,7 +762,7 @@
           <a:p>
             <a:fld id="{91C03662-DB08-574B-9401-5C5FECED7763}" type="datetimeFigureOut">
               <a:rPr lang="en-US" smtClean="0"/>
-              <a:t>3/23/18</a:t>
+              <a:t>5/15/20</a:t>
             </a:fld>
             <a:endParaRPr lang="en-US"/>
           </a:p>
@@ -873,10 +865,9 @@
           </a:lstStyle>
           <a:p>
             <a:r>
-              <a:rPr lang="en-US" smtClean="0"/>
+              <a:rPr lang="en-US"/>
               <a:t>Click to edit Master title style</a:t>
             </a:r>
-            <a:endParaRPr lang="en-US"/>
           </a:p>
         </p:txBody>
       </p:sp>
@@ -993,7 +984,7 @@
           <a:p>
             <a:pPr lvl="0"/>
             <a:r>
-              <a:rPr lang="en-US" smtClean="0"/>
+              <a:rPr lang="en-US"/>
               <a:t>Click to edit Master text styles</a:t>
             </a:r>
           </a:p>
@@ -1016,7 +1007,7 @@
           <a:p>
             <a:fld id="{91C03662-DB08-574B-9401-5C5FECED7763}" type="datetimeFigureOut">
               <a:rPr lang="en-US" smtClean="0"/>
-              <a:t>3/23/18</a:t>
+              <a:t>5/15/20</a:t>
             </a:fld>
             <a:endParaRPr lang="en-US"/>
           </a:p>
@@ -1110,10 +1101,9 @@
           <a:lstStyle/>
           <a:p>
             <a:r>
-              <a:rPr lang="en-US" smtClean="0"/>
+              <a:rPr lang="en-US"/>
               <a:t>Click to edit Master title style</a:t>
             </a:r>
-            <a:endParaRPr lang="en-US"/>
           </a:p>
         </p:txBody>
       </p:sp>
@@ -1139,38 +1129,37 @@
           <a:p>
             <a:pPr lvl="0"/>
             <a:r>
-              <a:rPr lang="en-US" smtClean="0"/>
+              <a:rPr lang="en-US"/>
               <a:t>Click to edit Master text styles</a:t>
             </a:r>
           </a:p>
           <a:p>
             <a:pPr lvl="1"/>
             <a:r>
-              <a:rPr lang="en-US" smtClean="0"/>
+              <a:rPr lang="en-US"/>
               <a:t>Second level</a:t>
             </a:r>
           </a:p>
           <a:p>
             <a:pPr lvl="2"/>
             <a:r>
-              <a:rPr lang="en-US" smtClean="0"/>
+              <a:rPr lang="en-US"/>
               <a:t>Third level</a:t>
             </a:r>
           </a:p>
           <a:p>
             <a:pPr lvl="3"/>
             <a:r>
-              <a:rPr lang="en-US" smtClean="0"/>
+              <a:rPr lang="en-US"/>
               <a:t>Fourth level</a:t>
             </a:r>
           </a:p>
           <a:p>
             <a:pPr lvl="4"/>
             <a:r>
-              <a:rPr lang="en-US" smtClean="0"/>
+              <a:rPr lang="en-US"/>
               <a:t>Fifth level</a:t>
             </a:r>
-            <a:endParaRPr lang="en-US"/>
           </a:p>
         </p:txBody>
       </p:sp>
@@ -1196,38 +1185,37 @@
           <a:p>
             <a:pPr lvl="0"/>
             <a:r>
-              <a:rPr lang="en-US" smtClean="0"/>
+              <a:rPr lang="en-US"/>
               <a:t>Click to edit Master text styles</a:t>
             </a:r>
           </a:p>
           <a:p>
             <a:pPr lvl="1"/>
             <a:r>
-              <a:rPr lang="en-US" smtClean="0"/>
+              <a:rPr lang="en-US"/>
               <a:t>Second level</a:t>
             </a:r>
           </a:p>
           <a:p>
             <a:pPr lvl="2"/>
             <a:r>
-              <a:rPr lang="en-US" smtClean="0"/>
+              <a:rPr lang="en-US"/>
               <a:t>Third level</a:t>
             </a:r>
           </a:p>
           <a:p>
             <a:pPr lvl="3"/>
             <a:r>
-              <a:rPr lang="en-US" smtClean="0"/>
+              <a:rPr lang="en-US"/>
               <a:t>Fourth level</a:t>
             </a:r>
           </a:p>
           <a:p>
             <a:pPr lvl="4"/>
             <a:r>
-              <a:rPr lang="en-US" smtClean="0"/>
+              <a:rPr lang="en-US"/>
               <a:t>Fifth level</a:t>
             </a:r>
-            <a:endParaRPr lang="en-US"/>
           </a:p>
         </p:txBody>
       </p:sp>
@@ -1248,7 +1236,7 @@
           <a:p>
             <a:fld id="{91C03662-DB08-574B-9401-5C5FECED7763}" type="datetimeFigureOut">
               <a:rPr lang="en-US" smtClean="0"/>
-              <a:t>3/23/18</a:t>
+              <a:t>5/15/20</a:t>
             </a:fld>
             <a:endParaRPr lang="en-US"/>
           </a:p>
@@ -1347,10 +1335,9 @@
           <a:lstStyle/>
           <a:p>
             <a:r>
-              <a:rPr lang="en-US" smtClean="0"/>
+              <a:rPr lang="en-US"/>
               <a:t>Click to edit Master title style</a:t>
             </a:r>
-            <a:endParaRPr lang="en-US"/>
           </a:p>
         </p:txBody>
       </p:sp>
@@ -1413,7 +1400,7 @@
           <a:p>
             <a:pPr lvl="0"/>
             <a:r>
-              <a:rPr lang="en-US" smtClean="0"/>
+              <a:rPr lang="en-US"/>
               <a:t>Click to edit Master text styles</a:t>
             </a:r>
           </a:p>
@@ -1441,38 +1428,37 @@
           <a:p>
             <a:pPr lvl="0"/>
             <a:r>
-              <a:rPr lang="en-US" smtClean="0"/>
+              <a:rPr lang="en-US"/>
               <a:t>Click to edit Master text styles</a:t>
             </a:r>
           </a:p>
           <a:p>
             <a:pPr lvl="1"/>
             <a:r>
-              <a:rPr lang="en-US" smtClean="0"/>
+              <a:rPr lang="en-US"/>
               <a:t>Second level</a:t>
             </a:r>
           </a:p>
           <a:p>
             <a:pPr lvl="2"/>
             <a:r>
-              <a:rPr lang="en-US" smtClean="0"/>
+              <a:rPr lang="en-US"/>
               <a:t>Third level</a:t>
             </a:r>
           </a:p>
           <a:p>
             <a:pPr lvl="3"/>
             <a:r>
-              <a:rPr lang="en-US" smtClean="0"/>
+              <a:rPr lang="en-US"/>
               <a:t>Fourth level</a:t>
             </a:r>
           </a:p>
           <a:p>
             <a:pPr lvl="4"/>
             <a:r>
-              <a:rPr lang="en-US" smtClean="0"/>
+              <a:rPr lang="en-US"/>
               <a:t>Fifth level</a:t>
             </a:r>
-            <a:endParaRPr lang="en-US"/>
           </a:p>
         </p:txBody>
       </p:sp>
@@ -1535,7 +1521,7 @@
           <a:p>
             <a:pPr lvl="0"/>
             <a:r>
-              <a:rPr lang="en-US" smtClean="0"/>
+              <a:rPr lang="en-US"/>
               <a:t>Click to edit Master text styles</a:t>
             </a:r>
           </a:p>
@@ -1563,38 +1549,37 @@
           <a:p>
             <a:pPr lvl="0"/>
             <a:r>
-              <a:rPr lang="en-US" smtClean="0"/>
+              <a:rPr lang="en-US"/>
               <a:t>Click to edit Master text styles</a:t>
             </a:r>
           </a:p>
           <a:p>
             <a:pPr lvl="1"/>
             <a:r>
-              <a:rPr lang="en-US" smtClean="0"/>
+              <a:rPr lang="en-US"/>
               <a:t>Second level</a:t>
             </a:r>
           </a:p>
           <a:p>
             <a:pPr lvl="2"/>
             <a:r>
-              <a:rPr lang="en-US" smtClean="0"/>
+              <a:rPr lang="en-US"/>
               <a:t>Third level</a:t>
             </a:r>
           </a:p>
           <a:p>
             <a:pPr lvl="3"/>
             <a:r>
-              <a:rPr lang="en-US" smtClean="0"/>
+              <a:rPr lang="en-US"/>
               <a:t>Fourth level</a:t>
             </a:r>
           </a:p>
           <a:p>
             <a:pPr lvl="4"/>
             <a:r>
-              <a:rPr lang="en-US" smtClean="0"/>
+              <a:rPr lang="en-US"/>
               <a:t>Fifth level</a:t>
             </a:r>
-            <a:endParaRPr lang="en-US"/>
           </a:p>
         </p:txBody>
       </p:sp>
@@ -1615,7 +1600,7 @@
           <a:p>
             <a:fld id="{91C03662-DB08-574B-9401-5C5FECED7763}" type="datetimeFigureOut">
               <a:rPr lang="en-US" smtClean="0"/>
-              <a:t>3/23/18</a:t>
+              <a:t>5/15/20</a:t>
             </a:fld>
             <a:endParaRPr lang="en-US"/>
           </a:p>
@@ -1709,10 +1694,9 @@
           <a:lstStyle/>
           <a:p>
             <a:r>
-              <a:rPr lang="en-US" smtClean="0"/>
+              <a:rPr lang="en-US"/>
               <a:t>Click to edit Master title style</a:t>
             </a:r>
-            <a:endParaRPr lang="en-US"/>
           </a:p>
         </p:txBody>
       </p:sp>
@@ -1733,7 +1717,7 @@
           <a:p>
             <a:fld id="{91C03662-DB08-574B-9401-5C5FECED7763}" type="datetimeFigureOut">
               <a:rPr lang="en-US" smtClean="0"/>
-              <a:t>3/23/18</a:t>
+              <a:t>5/15/20</a:t>
             </a:fld>
             <a:endParaRPr lang="en-US"/>
           </a:p>
@@ -1828,7 +1812,7 @@
           <a:p>
             <a:fld id="{91C03662-DB08-574B-9401-5C5FECED7763}" type="datetimeFigureOut">
               <a:rPr lang="en-US" smtClean="0"/>
-              <a:t>3/23/18</a:t>
+              <a:t>5/15/20</a:t>
             </a:fld>
             <a:endParaRPr lang="en-US"/>
           </a:p>
@@ -1931,10 +1915,9 @@
           </a:lstStyle>
           <a:p>
             <a:r>
-              <a:rPr lang="en-US" smtClean="0"/>
+              <a:rPr lang="en-US"/>
               <a:t>Click to edit Master title style</a:t>
             </a:r>
-            <a:endParaRPr lang="en-US"/>
           </a:p>
         </p:txBody>
       </p:sp>
@@ -1988,38 +1971,37 @@
           <a:p>
             <a:pPr lvl="0"/>
             <a:r>
-              <a:rPr lang="en-US" smtClean="0"/>
+              <a:rPr lang="en-US"/>
               <a:t>Click to edit Master text styles</a:t>
             </a:r>
           </a:p>
           <a:p>
             <a:pPr lvl="1"/>
             <a:r>
-              <a:rPr lang="en-US" smtClean="0"/>
+              <a:rPr lang="en-US"/>
               <a:t>Second level</a:t>
             </a:r>
           </a:p>
           <a:p>
             <a:pPr lvl="2"/>
             <a:r>
-              <a:rPr lang="en-US" smtClean="0"/>
+              <a:rPr lang="en-US"/>
               <a:t>Third level</a:t>
             </a:r>
           </a:p>
           <a:p>
             <a:pPr lvl="3"/>
             <a:r>
-              <a:rPr lang="en-US" smtClean="0"/>
+              <a:rPr lang="en-US"/>
               <a:t>Fourth level</a:t>
             </a:r>
           </a:p>
           <a:p>
             <a:pPr lvl="4"/>
             <a:r>
-              <a:rPr lang="en-US" smtClean="0"/>
+              <a:rPr lang="en-US"/>
               <a:t>Fifth level</a:t>
             </a:r>
-            <a:endParaRPr lang="en-US"/>
           </a:p>
         </p:txBody>
       </p:sp>
@@ -2082,7 +2064,7 @@
           <a:p>
             <a:pPr lvl="0"/>
             <a:r>
-              <a:rPr lang="en-US" smtClean="0"/>
+              <a:rPr lang="en-US"/>
               <a:t>Click to edit Master text styles</a:t>
             </a:r>
           </a:p>
@@ -2105,7 +2087,7 @@
           <a:p>
             <a:fld id="{91C03662-DB08-574B-9401-5C5FECED7763}" type="datetimeFigureOut">
               <a:rPr lang="en-US" smtClean="0"/>
-              <a:t>3/23/18</a:t>
+              <a:t>5/15/20</a:t>
             </a:fld>
             <a:endParaRPr lang="en-US"/>
           </a:p>
@@ -2208,10 +2190,9 @@
           </a:lstStyle>
           <a:p>
             <a:r>
-              <a:rPr lang="en-US" smtClean="0"/>
+              <a:rPr lang="en-US"/>
               <a:t>Click to edit Master title style</a:t>
             </a:r>
-            <a:endParaRPr lang="en-US"/>
           </a:p>
         </p:txBody>
       </p:sp>
@@ -2335,7 +2316,7 @@
           <a:p>
             <a:pPr lvl="0"/>
             <a:r>
-              <a:rPr lang="en-US" smtClean="0"/>
+              <a:rPr lang="en-US"/>
               <a:t>Click to edit Master text styles</a:t>
             </a:r>
           </a:p>
@@ -2358,7 +2339,7 @@
           <a:p>
             <a:fld id="{91C03662-DB08-574B-9401-5C5FECED7763}" type="datetimeFigureOut">
               <a:rPr lang="en-US" smtClean="0"/>
-              <a:t>3/23/18</a:t>
+              <a:t>5/15/20</a:t>
             </a:fld>
             <a:endParaRPr lang="en-US"/>
           </a:p>
@@ -2467,10 +2448,9 @@
           <a:lstStyle/>
           <a:p>
             <a:r>
-              <a:rPr lang="en-US" smtClean="0"/>
+              <a:rPr lang="en-US"/>
               <a:t>Click to edit Master title style</a:t>
             </a:r>
-            <a:endParaRPr lang="en-US"/>
           </a:p>
         </p:txBody>
       </p:sp>
@@ -2501,38 +2481,37 @@
           <a:p>
             <a:pPr lvl="0"/>
             <a:r>
-              <a:rPr lang="en-US" smtClean="0"/>
+              <a:rPr lang="en-US"/>
               <a:t>Click to edit Master text styles</a:t>
             </a:r>
           </a:p>
           <a:p>
             <a:pPr lvl="1"/>
             <a:r>
-              <a:rPr lang="en-US" smtClean="0"/>
+              <a:rPr lang="en-US"/>
               <a:t>Second level</a:t>
             </a:r>
           </a:p>
           <a:p>
             <a:pPr lvl="2"/>
             <a:r>
-              <a:rPr lang="en-US" smtClean="0"/>
+              <a:rPr lang="en-US"/>
               <a:t>Third level</a:t>
             </a:r>
           </a:p>
           <a:p>
             <a:pPr lvl="3"/>
             <a:r>
-              <a:rPr lang="en-US" smtClean="0"/>
+              <a:rPr lang="en-US"/>
               <a:t>Fourth level</a:t>
             </a:r>
           </a:p>
           <a:p>
             <a:pPr lvl="4"/>
             <a:r>
-              <a:rPr lang="en-US" smtClean="0"/>
+              <a:rPr lang="en-US"/>
               <a:t>Fifth level</a:t>
             </a:r>
-            <a:endParaRPr lang="en-US"/>
           </a:p>
         </p:txBody>
       </p:sp>
@@ -2571,7 +2550,7 @@
           <a:p>
             <a:fld id="{91C03662-DB08-574B-9401-5C5FECED7763}" type="datetimeFigureOut">
               <a:rPr lang="en-US" smtClean="0"/>
-              <a:t>3/23/18</a:t>
+              <a:t>5/15/20</a:t>
             </a:fld>
             <a:endParaRPr lang="en-US"/>
           </a:p>
@@ -2994,14 +2973,9 @@
           <a:lstStyle/>
           <a:p>
             <a:r>
-              <a:rPr lang="en-US" dirty="0" err="1" smtClean="0"/>
-              <a:t>Wavgen.py</a:t>
-            </a:r>
-            <a:r>
-              <a:rPr lang="en-US" dirty="0" smtClean="0"/>
-              <a:t>: part of COO’s waveform definition language (WDL)</a:t>
-            </a:r>
-            <a:endParaRPr lang="en-US" dirty="0"/>
+              <a:rPr lang="en-US" dirty="0"/>
+              <a:t>Wavgen.py: part of COO’s waveform definition language (WDL)</a:t>
+            </a:r>
           </a:p>
         </p:txBody>
       </p:sp>
@@ -3021,10 +2995,9 @@
           <a:lstStyle/>
           <a:p>
             <a:r>
-              <a:rPr lang="en-US" dirty="0" smtClean="0"/>
+              <a:rPr lang="en-US" dirty="0"/>
               <a:t>Peter Mao</a:t>
             </a:r>
-            <a:endParaRPr lang="en-US" dirty="0"/>
           </a:p>
         </p:txBody>
       </p:sp>
@@ -3090,8 +3063,8 @@
         </p:nvSpPr>
         <p:spPr>
           <a:xfrm rot="639563">
-            <a:off x="3121667" y="2767322"/>
-            <a:ext cx="4345933" cy="689478"/>
+            <a:off x="3120919" y="2775348"/>
+            <a:ext cx="4432722" cy="689478"/>
           </a:xfrm>
           <a:prstGeom prst="rightArrow">
             <a:avLst/>
@@ -3148,14 +3121,9 @@
           <a:lstStyle/>
           <a:p>
             <a:r>
-              <a:rPr lang="en-US" dirty="0" err="1" smtClean="0"/>
-              <a:t>Wavgen.py</a:t>
-            </a:r>
-            <a:r>
-              <a:rPr lang="en-US" dirty="0" smtClean="0"/>
-              <a:t> converts waveforms defined by (time, board, channel, value) tuples into states and calls.</a:t>
-            </a:r>
-            <a:endParaRPr lang="en-US" dirty="0"/>
+              <a:rPr lang="en-US" dirty="0"/>
+              <a:t>Wavgen.py converts waveforms defined by (time, board, channel, value) tuples into states and calls.</a:t>
+            </a:r>
           </a:p>
         </p:txBody>
       </p:sp>
@@ -3199,7 +3167,7 @@
         </p:blipFill>
         <p:spPr>
           <a:xfrm>
-            <a:off x="8102600" y="1537494"/>
+            <a:off x="8354848" y="1537494"/>
             <a:ext cx="2573986" cy="1798593"/>
           </a:xfrm>
           <a:prstGeom prst="rect">
@@ -3254,44 +3222,27 @@
           <a:lstStyle/>
           <a:p>
             <a:r>
-              <a:rPr lang="en-US" dirty="0" smtClean="0"/>
-              <a:t>Given the timing information, </a:t>
-            </a:r>
-            <a:r>
-              <a:rPr lang="en-US" dirty="0" err="1" smtClean="0"/>
-              <a:t>wavgen</a:t>
-            </a:r>
-            <a:r>
-              <a:rPr lang="en-US" dirty="0" smtClean="0"/>
-              <a:t> determines the minimum set of machine states and the ACF script with which to call the states.</a:t>
-            </a:r>
-          </a:p>
-          <a:p>
-            <a:r>
-              <a:rPr lang="en-US" dirty="0" smtClean="0"/>
+              <a:rPr lang="en-US" dirty="0"/>
+              <a:t>Given the timing information, wavgen determines the minimum set of machine states and the ACF script with which to call the states.</a:t>
+            </a:r>
+          </a:p>
+          <a:p>
+            <a:r>
+              <a:rPr lang="en-US" dirty="0"/>
               <a:t>Sequences, which call waveforms or other sequences are also parsed.</a:t>
             </a:r>
           </a:p>
           <a:p>
             <a:r>
-              <a:rPr lang="en-US" dirty="0" smtClean="0"/>
+              <a:rPr lang="en-US" dirty="0"/>
               <a:t>For reasons lost to time, ACF parameters are also carried along.</a:t>
             </a:r>
           </a:p>
           <a:p>
             <a:r>
-              <a:rPr lang="en-US" dirty="0" smtClean="0"/>
-              <a:t>The output of </a:t>
-            </a:r>
-            <a:r>
-              <a:rPr lang="en-US" dirty="0" err="1" smtClean="0"/>
-              <a:t>wavgen</a:t>
-            </a:r>
-            <a:r>
-              <a:rPr lang="en-US" dirty="0" smtClean="0"/>
-              <a:t> is ALMOST ACF-ready, with only the enumeration of tags missing.</a:t>
-            </a:r>
-            <a:endParaRPr lang="en-US" dirty="0"/>
+              <a:rPr lang="en-US" dirty="0"/>
+              <a:t>The output of wavgen is ALMOST ACF-ready, with only the enumeration of tags missing.</a:t>
+            </a:r>
           </a:p>
         </p:txBody>
       </p:sp>
@@ -3304,7 +3255,7 @@
         <p:spPr>
           <a:xfrm>
             <a:off x="3173457" y="1944710"/>
-            <a:ext cx="4929143" cy="689478"/>
+            <a:ext cx="5161246" cy="689478"/>
           </a:xfrm>
           <a:prstGeom prst="rightArrow">
             <a:avLst/>
@@ -3339,7 +3290,46 @@
           <a:lstStyle/>
           <a:p>
             <a:pPr algn="ctr"/>
-            <a:endParaRPr lang="en-US"/>
+            <a:endParaRPr lang="en-US" dirty="0"/>
+          </a:p>
+        </p:txBody>
+      </p:sp>
+      <p:sp>
+        <p:nvSpPr>
+          <p:cNvPr id="3" name="TextBox 2">
+            <a:extLst>
+              <a:ext uri="{FF2B5EF4-FFF2-40B4-BE49-F238E27FC236}">
+                <a16:creationId xmlns:a16="http://schemas.microsoft.com/office/drawing/2014/main" id="{EB9EC6E5-9CEE-3640-88C4-D547F96F2979}"/>
+              </a:ext>
+            </a:extLst>
+          </p:cNvPr>
+          <p:cNvSpPr txBox="1"/>
+          <p:nvPr/>
+        </p:nvSpPr>
+        <p:spPr>
+          <a:xfrm>
+            <a:off x="32047" y="1387997"/>
+            <a:ext cx="1612305" cy="369332"/>
+          </a:xfrm>
+          <a:prstGeom prst="rect">
+            <a:avLst/>
+          </a:prstGeom>
+          <a:noFill/>
+        </p:spPr>
+        <p:txBody>
+          <a:bodyPr wrap="square" rtlCol="0">
+            <a:spAutoFit/>
+          </a:bodyPr>
+          <a:lstStyle/>
+          <a:p>
+            <a:r>
+              <a:rPr lang="en-US" dirty="0">
+                <a:solidFill>
+                  <a:srgbClr val="FF0000"/>
+                </a:solidFill>
+              </a:rPr>
+              <a:t>file_TMP.wdl</a:t>
+            </a:r>
           </a:p>
         </p:txBody>
       </p:sp>
@@ -3353,13 +3343,6 @@
   <p:clrMapOvr>
     <a:masterClrMapping/>
   </p:clrMapOvr>
-  <p:timing>
-    <p:tnLst>
-      <p:par>
-        <p:cTn id="1" dur="indefinite" restart="never" nodeType="tmRoot"/>
-      </p:par>
-    </p:tnLst>
-  </p:timing>
 </p:sld>
 </file>
 
@@ -3396,26 +3379,9 @@
           <a:lstStyle/>
           <a:p>
             <a:r>
-              <a:rPr lang="en-US" dirty="0" smtClean="0"/>
-              <a:t>Global variables and “</a:t>
-            </a:r>
-            <a:r>
-              <a:rPr lang="en-US" dirty="0" err="1" smtClean="0"/>
-              <a:t>def</a:t>
-            </a:r>
-            <a:r>
-              <a:rPr lang="en-US" dirty="0" smtClean="0"/>
-              <a:t>” and “class” definitions in </a:t>
-            </a:r>
-            <a:r>
-              <a:rPr lang="en-US" dirty="0" err="1" smtClean="0"/>
-              <a:t>wavgen.py</a:t>
-            </a:r>
-            <a:r>
-              <a:rPr lang="en-US" dirty="0" smtClean="0"/>
-              <a:t>.</a:t>
-            </a:r>
-            <a:endParaRPr lang="en-US" dirty="0"/>
+              <a:rPr lang="en-US" dirty="0"/>
+              <a:t>Global variables and “def” and “class” definitions in wavgen.py.</a:t>
+            </a:r>
           </a:p>
         </p:txBody>
       </p:sp>
@@ -3442,37 +3408,29 @@
           <a:lstStyle/>
           <a:p>
             <a:r>
-              <a:rPr lang="en-US" dirty="0" smtClean="0"/>
+              <a:rPr lang="en-US" dirty="0"/>
               <a:t>A user only needs to know how to call </a:t>
             </a:r>
             <a:r>
-              <a:rPr lang="en-US" dirty="0" err="1" smtClean="0">
+              <a:rPr lang="en-US" dirty="0">
                 <a:solidFill>
                   <a:schemeClr val="accent1"/>
                 </a:solidFill>
               </a:rPr>
-              <a:t>loadWDL</a:t>
-            </a:r>
-            <a:r>
-              <a:rPr lang="en-US" dirty="0" smtClean="0">
-                <a:solidFill>
-                  <a:schemeClr val="accent1"/>
-                </a:solidFill>
-              </a:rPr>
-              <a:t>()</a:t>
-            </a:r>
-            <a:r>
-              <a:rPr lang="en-US" dirty="0" smtClean="0"/>
+              <a:t>loadWDL()</a:t>
+            </a:r>
+            <a:r>
+              <a:rPr lang="en-US" dirty="0"/>
               <a:t>.</a:t>
             </a:r>
           </a:p>
           <a:p>
             <a:r>
-              <a:rPr lang="en-US" dirty="0" smtClean="0"/>
+              <a:rPr lang="en-US" dirty="0"/>
               <a:t>The important global variables are </a:t>
             </a:r>
             <a:r>
-              <a:rPr lang="en-US" dirty="0" err="1" smtClean="0">
+              <a:rPr lang="en-US" dirty="0">
                 <a:solidFill>
                   <a:schemeClr val="accent2"/>
                 </a:solidFill>
@@ -3480,11 +3438,11 @@
               <a:t>UniqueStateArr</a:t>
             </a:r>
             <a:r>
-              <a:rPr lang="en-US" dirty="0" smtClean="0"/>
+              <a:rPr lang="en-US" dirty="0"/>
               <a:t> and </a:t>
             </a:r>
             <a:r>
-              <a:rPr lang="en-US" dirty="0" smtClean="0">
+              <a:rPr lang="en-US" dirty="0">
                 <a:solidFill>
                   <a:schemeClr val="accent2"/>
                 </a:solidFill>
@@ -3494,7 +3452,7 @@
           </a:p>
           <a:p>
             <a:r>
-              <a:rPr lang="en-US" dirty="0" err="1" smtClean="0">
+              <a:rPr lang="en-US" dirty="0">
                 <a:solidFill>
                   <a:schemeClr val="accent2"/>
                 </a:solidFill>
@@ -3502,13 +3460,13 @@
               <a:t>UniqueStateArr</a:t>
             </a:r>
             <a:r>
-              <a:rPr lang="en-US" dirty="0" smtClean="0"/>
+              <a:rPr lang="en-US" dirty="0"/>
               <a:t> is an (# states)x(# channels) array, where each row is a unique state that the controller takes on.</a:t>
             </a:r>
           </a:p>
           <a:p>
             <a:r>
-              <a:rPr lang="en-US" dirty="0" smtClean="0">
+              <a:rPr lang="en-US" dirty="0">
                 <a:solidFill>
                   <a:schemeClr val="accent2"/>
                 </a:solidFill>
@@ -3516,11 +3474,95 @@
               <a:t>Catalog</a:t>
             </a:r>
             <a:r>
-              <a:rPr lang="en-US" dirty="0" smtClean="0"/>
+              <a:rPr lang="en-US" dirty="0"/>
               <a:t> is a python list of </a:t>
             </a:r>
             <a:r>
-              <a:rPr lang="en-US" dirty="0" err="1" smtClean="0">
+              <a:rPr lang="en-US" dirty="0">
+                <a:solidFill>
+                  <a:schemeClr val="accent6"/>
+                </a:solidFill>
+              </a:rPr>
+              <a:t>TimingSegment </a:t>
+            </a:r>
+            <a:r>
+              <a:rPr lang="en-US" dirty="0"/>
+              <a:t>objects</a:t>
+            </a:r>
+          </a:p>
+          <a:p>
+            <a:r>
+              <a:rPr lang="en-US" dirty="0"/>
+              <a:t>After a </a:t>
+            </a:r>
+            <a:r>
+              <a:rPr lang="en-US" dirty="0">
+                <a:solidFill>
+                  <a:schemeClr val="accent6"/>
+                </a:solidFill>
+              </a:rPr>
+              <a:t>TimingSegment </a:t>
+            </a:r>
+            <a:r>
+              <a:rPr lang="en-US" dirty="0"/>
+              <a:t>is initialized (for example, as TS), and its events are defined, a call to TS.</a:t>
+            </a:r>
+            <a:r>
+              <a:rPr lang="en-US" dirty="0">
+                <a:solidFill>
+                  <a:schemeClr val="accent1"/>
+                </a:solidFill>
+              </a:rPr>
+              <a:t>script</a:t>
+            </a:r>
+            <a:r>
+              <a:rPr lang="en-US" dirty="0"/>
+              <a:t>() or TS.</a:t>
+            </a:r>
+            <a:r>
+              <a:rPr lang="en-US" dirty="0">
+                <a:solidFill>
+                  <a:schemeClr val="accent1"/>
+                </a:solidFill>
+              </a:rPr>
+              <a:t>plot</a:t>
+            </a:r>
+            <a:r>
+              <a:rPr lang="en-US" dirty="0"/>
+              <a:t>() generates an internal call to TS</a:t>
+            </a:r>
+            <a:r>
+              <a:rPr lang="en-US" dirty="0">
+                <a:solidFill>
+                  <a:schemeClr val="accent1"/>
+                </a:solidFill>
+              </a:rPr>
+              <a:t>.__make_states</a:t>
+            </a:r>
+            <a:r>
+              <a:rPr lang="en-US" dirty="0"/>
+              <a:t>(), which determines unique controller states and adds them to </a:t>
+            </a:r>
+            <a:r>
+              <a:rPr lang="en-US" dirty="0">
+                <a:solidFill>
+                  <a:schemeClr val="accent2"/>
+                </a:solidFill>
+              </a:rPr>
+              <a:t>UniqueStateArr</a:t>
+            </a:r>
+            <a:r>
+              <a:rPr lang="en-US" dirty="0"/>
+              <a:t>.</a:t>
+            </a:r>
+          </a:p>
+          <a:p>
+            <a:r>
+              <a:rPr lang="en-US" dirty="0"/>
+              <a:t>After all </a:t>
+            </a:r>
+            <a:r>
+              <a:rPr lang="en-US" dirty="0">
                 <a:solidFill>
                   <a:schemeClr val="accent6"/>
                 </a:solidFill>
@@ -3528,49 +3570,23 @@
               <a:t>TimingSegment</a:t>
             </a:r>
             <a:r>
-              <a:rPr lang="en-US" dirty="0" smtClean="0">
-                <a:solidFill>
-                  <a:schemeClr val="accent6"/>
+              <a:rPr lang="en-US" dirty="0"/>
+              <a:t>s are defined, the functions </a:t>
+            </a:r>
+            <a:r>
+              <a:rPr lang="en-US" dirty="0">
+                <a:solidFill>
+                  <a:schemeClr val="accent1"/>
                 </a:solidFill>
               </a:rPr>
-              <a:t> </a:t>
-            </a:r>
-            <a:r>
-              <a:rPr lang="en-US" dirty="0" smtClean="0"/>
-              <a:t>objects</a:t>
-            </a:r>
-          </a:p>
-          <a:p>
-            <a:r>
-              <a:rPr lang="en-US" dirty="0" smtClean="0"/>
-              <a:t>After a </a:t>
-            </a:r>
-            <a:r>
-              <a:rPr lang="en-US" dirty="0" err="1" smtClean="0">
-                <a:solidFill>
-                  <a:schemeClr val="accent6"/>
-                </a:solidFill>
-              </a:rPr>
-              <a:t>TimingSegment</a:t>
+              <a:t>state</a:t>
+            </a:r>
+            <a:r>
+              <a:rPr lang="en-US" dirty="0"/>
+              <a:t>() and </a:t>
             </a:r>
             <a:r>
               <a:rPr lang="en-US" dirty="0">
-                <a:solidFill>
-                  <a:schemeClr val="accent6"/>
-                </a:solidFill>
-              </a:rPr>
-              <a:t> </a:t>
-            </a:r>
-            <a:r>
-              <a:rPr lang="en-US" dirty="0" smtClean="0"/>
-              <a:t>is initialized (for example, as TS), and its events are defined, a call to </a:t>
-            </a:r>
-            <a:r>
-              <a:rPr lang="en-US" dirty="0" err="1" smtClean="0"/>
-              <a:t>TS.</a:t>
-            </a:r>
-            <a:r>
-              <a:rPr lang="en-US" dirty="0" err="1" smtClean="0">
                 <a:solidFill>
                   <a:schemeClr val="accent1"/>
                 </a:solidFill>
@@ -3578,112 +3594,9 @@
               <a:t>script</a:t>
             </a:r>
             <a:r>
-              <a:rPr lang="en-US" dirty="0" smtClean="0"/>
-              <a:t>() or </a:t>
-            </a:r>
-            <a:r>
-              <a:rPr lang="en-US" dirty="0" err="1" smtClean="0"/>
-              <a:t>TS.</a:t>
-            </a:r>
-            <a:r>
-              <a:rPr lang="en-US" dirty="0" err="1" smtClean="0">
-                <a:solidFill>
-                  <a:schemeClr val="accent1"/>
-                </a:solidFill>
-              </a:rPr>
-              <a:t>plot</a:t>
-            </a:r>
-            <a:r>
-              <a:rPr lang="en-US" dirty="0" smtClean="0"/>
-              <a:t>() generates an </a:t>
-            </a:r>
-            <a:r>
-              <a:rPr lang="en-US" dirty="0" err="1" smtClean="0"/>
-              <a:t>interal</a:t>
-            </a:r>
-            <a:r>
-              <a:rPr lang="en-US" dirty="0" smtClean="0"/>
-              <a:t> call to TS</a:t>
-            </a:r>
-            <a:r>
-              <a:rPr lang="en-US" dirty="0" smtClean="0">
-                <a:solidFill>
-                  <a:schemeClr val="accent1"/>
-                </a:solidFill>
-              </a:rPr>
-              <a:t>.__</a:t>
-            </a:r>
-            <a:r>
-              <a:rPr lang="en-US" dirty="0" err="1" smtClean="0">
-                <a:solidFill>
-                  <a:schemeClr val="accent1"/>
-                </a:solidFill>
-              </a:rPr>
-              <a:t>make_states</a:t>
-            </a:r>
-            <a:r>
-              <a:rPr lang="en-US" dirty="0" smtClean="0"/>
-              <a:t>(), which determines unique controller states and adds them to </a:t>
-            </a:r>
-            <a:r>
-              <a:rPr lang="en-US" dirty="0" err="1" smtClean="0">
-                <a:solidFill>
-                  <a:schemeClr val="accent2"/>
-                </a:solidFill>
-              </a:rPr>
-              <a:t>UniqueStateArr</a:t>
-            </a:r>
-            <a:r>
-              <a:rPr lang="en-US" dirty="0" smtClean="0"/>
-              <a:t>.</a:t>
-            </a:r>
-          </a:p>
-          <a:p>
-            <a:r>
-              <a:rPr lang="en-US" dirty="0" smtClean="0"/>
-              <a:t>After all </a:t>
-            </a:r>
-            <a:r>
-              <a:rPr lang="en-US" dirty="0" err="1" smtClean="0">
-                <a:solidFill>
-                  <a:schemeClr val="accent6"/>
-                </a:solidFill>
-              </a:rPr>
-              <a:t>TimingSegment</a:t>
-            </a:r>
-            <a:r>
-              <a:rPr lang="en-US" dirty="0" err="1" smtClean="0"/>
-              <a:t>s</a:t>
-            </a:r>
-            <a:r>
-              <a:rPr lang="en-US" dirty="0" smtClean="0"/>
-              <a:t> are defined, the functions </a:t>
-            </a:r>
-            <a:r>
-              <a:rPr lang="en-US" dirty="0" smtClean="0">
-                <a:solidFill>
-                  <a:schemeClr val="accent1"/>
-                </a:solidFill>
-              </a:rPr>
-              <a:t>state</a:t>
-            </a:r>
-            <a:r>
-              <a:rPr lang="en-US" dirty="0" smtClean="0"/>
-              <a:t>() and </a:t>
-            </a:r>
-            <a:r>
-              <a:rPr lang="en-US" dirty="0" smtClean="0">
-                <a:solidFill>
-                  <a:schemeClr val="accent1"/>
-                </a:solidFill>
-              </a:rPr>
-              <a:t>script</a:t>
-            </a:r>
-            <a:r>
-              <a:rPr lang="en-US" dirty="0" smtClean="0"/>
+              <a:rPr lang="en-US" dirty="0"/>
               <a:t>() are used to generate the proto-ACF texts.</a:t>
             </a:r>
-            <a:endParaRPr lang="en-US" dirty="0"/>
           </a:p>
         </p:txBody>
       </p:sp>
@@ -3745,13 +3658,6 @@
   <p:clrMapOvr>
     <a:masterClrMapping/>
   </p:clrMapOvr>
-  <p:timing>
-    <p:tnLst>
-      <p:par>
-        <p:cTn id="1" dur="indefinite" restart="never" nodeType="tmRoot"/>
-      </p:par>
-    </p:tnLst>
-  </p:timing>
 </p:sld>
 </file>
 
@@ -3793,22 +3699,9 @@
           <a:lstStyle/>
           <a:p>
             <a:r>
-              <a:rPr lang="en-US" dirty="0" err="1" smtClean="0"/>
-              <a:t>loadWDL</a:t>
-            </a:r>
-            <a:r>
-              <a:rPr lang="en-US" dirty="0" smtClean="0"/>
-              <a:t>(</a:t>
-            </a:r>
-            <a:r>
-              <a:rPr lang="en-US" dirty="0" err="1" smtClean="0"/>
-              <a:t>infile.wdl</a:t>
-            </a:r>
-            <a:r>
-              <a:rPr lang="en-US" dirty="0" smtClean="0"/>
-              <a:t>)</a:t>
-            </a:r>
-            <a:endParaRPr lang="en-US" dirty="0"/>
+              <a:rPr lang="en-US" dirty="0"/>
+              <a:t>loadWDL(infile.wdl)</a:t>
+            </a:r>
           </a:p>
         </p:txBody>
       </p:sp>
@@ -3849,19 +3742,11 @@
           <a:p>
             <a:pPr algn="ctr"/>
             <a:r>
-              <a:rPr lang="en-US" dirty="0" smtClean="0"/>
-              <a:t>Get .mod file from </a:t>
-            </a:r>
-            <a:r>
-              <a:rPr lang="en-US" dirty="0" err="1" smtClean="0"/>
-              <a:t>infile.wdl</a:t>
-            </a:r>
-            <a:r>
-              <a:rPr lang="en-US" dirty="0" smtClean="0"/>
-              <a:t> to fill </a:t>
-            </a:r>
-            <a:r>
-              <a:rPr lang="en-US" dirty="0" smtClean="0">
+              <a:rPr lang="en-US" dirty="0"/>
+              <a:t>Get .mod file from infile.wdl to fill </a:t>
+            </a:r>
+            <a:r>
+              <a:rPr lang="en-US" dirty="0">
                 <a:solidFill>
                   <a:schemeClr val="accent4"/>
                 </a:solidFill>
@@ -3869,10 +3754,9 @@
               <a:t>slot</a:t>
             </a:r>
             <a:r>
-              <a:rPr lang="en-US" dirty="0" smtClean="0"/>
+              <a:rPr lang="en-US" dirty="0"/>
               <a:t> (arrangement of boards in controller)</a:t>
             </a:r>
-            <a:endParaRPr lang="en-US" dirty="0"/>
           </a:p>
         </p:txBody>
       </p:sp>
@@ -3913,18 +3797,9 @@
           <a:p>
             <a:pPr algn="ctr"/>
             <a:r>
-              <a:rPr lang="en-US" dirty="0" smtClean="0"/>
-              <a:t>Read in </a:t>
-            </a:r>
-            <a:r>
-              <a:rPr lang="en-US" dirty="0" err="1" smtClean="0"/>
-              <a:t>infile.wdl</a:t>
-            </a:r>
-            <a:r>
-              <a:rPr lang="en-US" dirty="0" smtClean="0"/>
-              <a:t> line-by-line</a:t>
-            </a:r>
-            <a:endParaRPr lang="en-US" dirty="0"/>
+              <a:rPr lang="en-US" dirty="0"/>
+              <a:t>Read in infile.wdl line-by-line</a:t>
+            </a:r>
           </a:p>
         </p:txBody>
       </p:sp>
@@ -4000,7 +3875,7 @@
           <a:lstStyle/>
           <a:p>
             <a:r>
-              <a:rPr lang="en-US" dirty="0" smtClean="0"/>
+              <a:rPr lang="en-US" dirty="0"/>
               <a:t>Comment, blank or .mod file</a:t>
             </a:r>
           </a:p>
@@ -4042,7 +3917,7 @@
           <a:lstStyle/>
           <a:p>
             <a:r>
-              <a:rPr lang="en-US" dirty="0" smtClean="0"/>
+              <a:rPr lang="en-US" dirty="0"/>
               <a:t>Signals filename</a:t>
             </a:r>
           </a:p>
@@ -4084,7 +3959,7 @@
           <a:lstStyle/>
           <a:p>
             <a:r>
-              <a:rPr lang="en-US" dirty="0" smtClean="0">
+              <a:rPr lang="en-US" dirty="0">
                 <a:solidFill>
                   <a:schemeClr val="accent4"/>
                 </a:solidFill>
@@ -4092,11 +3967,11 @@
               <a:t>Parameters</a:t>
             </a:r>
             <a:r>
-              <a:rPr lang="en-US" dirty="0" smtClean="0"/>
+              <a:rPr lang="en-US" dirty="0"/>
               <a:t> or </a:t>
             </a:r>
             <a:r>
-              <a:rPr lang="en-US" dirty="0" smtClean="0">
+              <a:rPr lang="en-US" dirty="0">
                 <a:solidFill>
                   <a:schemeClr val="accent4"/>
                 </a:solidFill>
@@ -4142,10 +4017,10 @@
           <a:lstStyle/>
           <a:p>
             <a:r>
-              <a:rPr lang="en-US" smtClean="0"/>
+              <a:rPr lang="en-US"/>
               <a:t>SEQUENCE or WAVEFORM</a:t>
             </a:r>
-            <a:endParaRPr lang="en-US" dirty="0" smtClean="0"/>
+            <a:endParaRPr lang="en-US" dirty="0"/>
           </a:p>
         </p:txBody>
       </p:sp>
@@ -4185,7 +4060,7 @@
           <a:lstStyle/>
           <a:p>
             <a:r>
-              <a:rPr lang="en-US" sz="1600" dirty="0" smtClean="0"/>
+              <a:rPr lang="en-US" sz="1600" dirty="0"/>
               <a:t>Sequence or waveform body line (all other lines)</a:t>
             </a:r>
           </a:p>
@@ -4303,10 +4178,9 @@
           <a:p>
             <a:pPr algn="ctr"/>
             <a:r>
-              <a:rPr lang="en-US" dirty="0" smtClean="0"/>
+              <a:rPr lang="en-US" dirty="0"/>
               <a:t>Store signal filename</a:t>
             </a:r>
-            <a:endParaRPr lang="en-US" dirty="0"/>
           </a:p>
         </p:txBody>
       </p:sp>
@@ -4499,11 +4373,11 @@
           <a:p>
             <a:pPr algn="ctr"/>
             <a:r>
-              <a:rPr lang="en-US" dirty="0" smtClean="0"/>
+              <a:rPr lang="en-US" dirty="0"/>
               <a:t>Store name and value in </a:t>
             </a:r>
             <a:r>
-              <a:rPr lang="en-US" smtClean="0"/>
+              <a:rPr lang="en-US"/>
               <a:t>corresponding variable</a:t>
             </a:r>
             <a:endParaRPr lang="en-US" dirty="0"/>
@@ -4662,11 +4536,11 @@
           <a:p>
             <a:pPr algn="ctr"/>
             <a:r>
-              <a:rPr lang="en-US" sz="1600" dirty="0" smtClean="0"/>
+              <a:rPr lang="en-US" sz="1600" dirty="0"/>
               <a:t>Initialize a </a:t>
             </a:r>
             <a:r>
-              <a:rPr lang="en-US" sz="1600" dirty="0" err="1" smtClean="0">
+              <a:rPr lang="en-US" sz="1600" dirty="0">
                 <a:solidFill>
                   <a:schemeClr val="accent6">
                     <a:lumMod val="40000"/>
@@ -4674,21 +4548,10 @@
                   </a:schemeClr>
                 </a:solidFill>
               </a:rPr>
-              <a:t>TimingSegment</a:t>
+              <a:t>TimingSegment </a:t>
             </a:r>
             <a:r>
               <a:rPr lang="en-US" sz="1600" dirty="0">
-                <a:solidFill>
-                  <a:schemeClr val="accent6">
-                    <a:lumMod val="40000"/>
-                    <a:lumOff val="60000"/>
-                  </a:schemeClr>
-                </a:solidFill>
-              </a:rPr>
-              <a:t> </a:t>
-            </a:r>
-            <a:r>
-              <a:rPr lang="en-US" sz="1600" dirty="0" smtClean="0">
                 <a:solidFill>
                   <a:schemeClr val="bg1"/>
                 </a:solidFill>
@@ -4696,7 +4559,7 @@
               <a:t>and set </a:t>
             </a:r>
             <a:r>
-              <a:rPr lang="en-US" sz="1600" dirty="0" err="1" smtClean="0">
+              <a:rPr lang="en-US" sz="1600" dirty="0">
                 <a:solidFill>
                   <a:schemeClr val="accent4"/>
                 </a:solidFill>
@@ -4704,34 +4567,17 @@
               <a:t>TStype</a:t>
             </a:r>
             <a:r>
-              <a:rPr lang="en-US" sz="1600" dirty="0" smtClean="0">
+              <a:rPr lang="en-US" sz="1600" dirty="0">
                 <a:solidFill>
                   <a:schemeClr val="bg1"/>
                 </a:solidFill>
               </a:rPr>
-              <a:t> (local </a:t>
-            </a:r>
-            <a:r>
-              <a:rPr lang="en-US" sz="1600" dirty="0" err="1" smtClean="0">
-                <a:solidFill>
-                  <a:schemeClr val="bg1"/>
-                </a:solidFill>
-              </a:rPr>
-              <a:t>var</a:t>
-            </a:r>
-            <a:r>
-              <a:rPr lang="en-US" sz="1600" dirty="0" smtClean="0">
-                <a:solidFill>
-                  <a:schemeClr val="bg1"/>
-                </a:solidFill>
-              </a:rPr>
-              <a:t>) to ”sequence” or “waveform”</a:t>
-            </a:r>
-            <a:r>
-              <a:rPr lang="en-US" sz="1600" dirty="0" smtClean="0"/>
+              <a:t> (local var) to ”sequence” or “waveform”</a:t>
+            </a:r>
+            <a:r>
+              <a:rPr lang="en-US" sz="1600" dirty="0"/>
               <a:t> </a:t>
             </a:r>
-            <a:endParaRPr lang="en-US" sz="1600" dirty="0"/>
           </a:p>
         </p:txBody>
       </p:sp>
@@ -4810,10 +4656,9 @@
           <a:p>
             <a:pPr algn="ctr"/>
             <a:r>
-              <a:rPr lang="en-US" sz="1000" dirty="0" smtClean="0"/>
+              <a:rPr lang="en-US" sz="1000" dirty="0"/>
               <a:t>Python command?</a:t>
             </a:r>
-            <a:endParaRPr lang="en-US" sz="1000" dirty="0"/>
           </a:p>
         </p:txBody>
       </p:sp>
@@ -4917,10 +4762,9 @@
           <a:lstStyle/>
           <a:p>
             <a:r>
-              <a:rPr lang="en-US" smtClean="0"/>
+              <a:rPr lang="en-US"/>
               <a:t>no</a:t>
             </a:r>
-            <a:endParaRPr lang="en-US"/>
           </a:p>
         </p:txBody>
       </p:sp>
@@ -4947,10 +4791,9 @@
           <a:lstStyle/>
           <a:p>
             <a:r>
-              <a:rPr lang="en-US" smtClean="0"/>
+              <a:rPr lang="en-US"/>
               <a:t>yes</a:t>
             </a:r>
-            <a:endParaRPr lang="en-US"/>
           </a:p>
         </p:txBody>
       </p:sp>
@@ -4991,38 +4834,21 @@
           <a:p>
             <a:pPr algn="ctr"/>
             <a:r>
-              <a:rPr lang="en-US" sz="1600" dirty="0" smtClean="0"/>
+              <a:rPr lang="en-US" sz="1600" dirty="0"/>
               <a:t>Store python call in </a:t>
             </a:r>
             <a:r>
-              <a:rPr lang="en-US" sz="1600" dirty="0" err="1" smtClean="0">
+              <a:rPr lang="en-US" sz="1600" dirty="0">
                 <a:solidFill>
                   <a:schemeClr val="accent4"/>
                 </a:solidFill>
               </a:rPr>
-              <a:t>usercommands</a:t>
-            </a:r>
-            <a:r>
-              <a:rPr lang="en-US" sz="1600" dirty="0" smtClean="0">
-                <a:solidFill>
-                  <a:schemeClr val="accent4"/>
-                </a:solidFill>
-              </a:rPr>
-              <a:t> </a:t>
-            </a:r>
-            <a:r>
-              <a:rPr lang="en-US" sz="1600" dirty="0" smtClean="0"/>
-              <a:t>(local </a:t>
-            </a:r>
-            <a:r>
-              <a:rPr lang="en-US" sz="1600" dirty="0" err="1" smtClean="0"/>
-              <a:t>var</a:t>
-            </a:r>
-            <a:r>
-              <a:rPr lang="en-US" sz="1600" dirty="0" smtClean="0"/>
-              <a:t>)</a:t>
-            </a:r>
-            <a:endParaRPr lang="en-US" sz="1600" dirty="0"/>
+              <a:t>user commands </a:t>
+            </a:r>
+            <a:r>
+              <a:rPr lang="en-US" sz="1600" dirty="0"/>
+              <a:t>(local var)</a:t>
+            </a:r>
           </a:p>
         </p:txBody>
       </p:sp>
@@ -5177,23 +5003,15 @@
           <a:lstStyle/>
           <a:p>
             <a:r>
-              <a:rPr lang="en-US" sz="1600" dirty="0" err="1" smtClean="0">
+              <a:rPr lang="en-US" sz="1600" dirty="0">
                 <a:solidFill>
                   <a:schemeClr val="accent4"/>
                 </a:solidFill>
               </a:rPr>
-              <a:t>TStype</a:t>
-            </a:r>
-            <a:r>
-              <a:rPr lang="en-US" sz="1600" dirty="0" smtClean="0">
-                <a:solidFill>
-                  <a:schemeClr val="accent4"/>
-                </a:solidFill>
-              </a:rPr>
-              <a:t> </a:t>
-            </a:r>
-            <a:r>
-              <a:rPr lang="en-US" sz="1600" dirty="0" smtClean="0"/>
+              <a:t>TStype </a:t>
+            </a:r>
+            <a:r>
+              <a:rPr lang="en-US" sz="1600" dirty="0"/>
               <a:t>= “waveform”</a:t>
             </a:r>
           </a:p>
@@ -5235,23 +5053,15 @@
           <a:lstStyle/>
           <a:p>
             <a:r>
-              <a:rPr lang="en-US" sz="1600" dirty="0" err="1" smtClean="0">
+              <a:rPr lang="en-US" sz="1600" dirty="0">
                 <a:solidFill>
                   <a:schemeClr val="accent4"/>
                 </a:solidFill>
               </a:rPr>
-              <a:t>TStype</a:t>
-            </a:r>
-            <a:r>
-              <a:rPr lang="en-US" sz="1600" dirty="0" smtClean="0">
-                <a:solidFill>
-                  <a:schemeClr val="accent4"/>
-                </a:solidFill>
-              </a:rPr>
-              <a:t> </a:t>
-            </a:r>
-            <a:r>
-              <a:rPr lang="en-US" sz="1600" dirty="0" smtClean="0"/>
+              <a:t>TStype </a:t>
+            </a:r>
+            <a:r>
+              <a:rPr lang="en-US" sz="1600" dirty="0"/>
               <a:t>= “sequence”</a:t>
             </a:r>
           </a:p>
@@ -5368,22 +5178,17 @@
           <a:p>
             <a:pPr algn="ctr"/>
             <a:r>
-              <a:rPr lang="en-US" sz="1600" dirty="0" smtClean="0"/>
+              <a:rPr lang="en-US" sz="1600" dirty="0"/>
               <a:t>Store sequence call in </a:t>
             </a:r>
             <a:r>
-              <a:rPr lang="en-US" sz="1600" dirty="0" err="1" smtClean="0">
+              <a:rPr lang="en-US" sz="1600" dirty="0">
                 <a:solidFill>
                   <a:schemeClr val="accent4"/>
                 </a:solidFill>
               </a:rPr>
               <a:t>thisTS.sequenceDef</a:t>
             </a:r>
-            <a:endParaRPr lang="en-US" sz="1600" dirty="0">
-              <a:solidFill>
-                <a:schemeClr val="accent4"/>
-              </a:solidFill>
-            </a:endParaRPr>
           </a:p>
         </p:txBody>
       </p:sp>
@@ -5500,10 +5305,9 @@
           <a:lstStyle/>
           <a:p>
             <a:r>
-              <a:rPr lang="en-US" sz="1400" dirty="0" err="1" smtClean="0"/>
+              <a:rPr lang="en-US" sz="1400" dirty="0"/>
               <a:t>Time,board,chan,value</a:t>
             </a:r>
-            <a:endParaRPr lang="en-US" sz="1400" dirty="0" smtClean="0"/>
           </a:p>
         </p:txBody>
       </p:sp>
@@ -5543,7 +5347,7 @@
           <a:lstStyle/>
           <a:p>
             <a:r>
-              <a:rPr lang="en-US" sz="1600" dirty="0" smtClean="0">
+              <a:rPr lang="en-US" sz="1600" dirty="0">
                 <a:solidFill>
                   <a:schemeClr val="bg1"/>
                 </a:solidFill>
@@ -5590,11 +5394,11 @@
           <a:p>
             <a:pPr algn="ctr"/>
             <a:r>
-              <a:rPr lang="en-US" sz="1600" dirty="0" smtClean="0"/>
+              <a:rPr lang="en-US" sz="1600" dirty="0"/>
               <a:t>Store time in </a:t>
             </a:r>
             <a:r>
-              <a:rPr lang="en-US" sz="1600" dirty="0" err="1" smtClean="0">
+              <a:rPr lang="en-US" sz="1600" dirty="0" err="1">
                 <a:solidFill>
                   <a:schemeClr val="accent4"/>
                 </a:solidFill>
@@ -5800,19 +5604,11 @@
           <a:p>
             <a:pPr algn="ctr"/>
             <a:r>
-              <a:rPr lang="en-US" sz="1600" dirty="0" smtClean="0"/>
-              <a:t>Store (</a:t>
-            </a:r>
-            <a:r>
-              <a:rPr lang="en-US" sz="1600" dirty="0" err="1" smtClean="0"/>
-              <a:t>time,value</a:t>
-            </a:r>
-            <a:r>
-              <a:rPr lang="en-US" sz="1600" dirty="0" smtClean="0"/>
-              <a:t>) in </a:t>
-            </a:r>
-            <a:r>
-              <a:rPr lang="en-US" sz="1600" dirty="0" err="1" smtClean="0">
+              <a:rPr lang="en-US" sz="1600" dirty="0"/>
+              <a:t>Store (time,value) in </a:t>
+            </a:r>
+            <a:r>
+              <a:rPr lang="en-US" sz="1600" dirty="0" err="1">
                 <a:solidFill>
                   <a:schemeClr val="accent4"/>
                 </a:solidFill>
@@ -5820,7 +5616,7 @@
               <a:t>thisTS.events</a:t>
             </a:r>
             <a:r>
-              <a:rPr lang="en-US" sz="1600" dirty="0" smtClean="0">
+              <a:rPr lang="en-US" sz="1600" dirty="0">
                 <a:solidFill>
                   <a:schemeClr val="accent4"/>
                 </a:solidFill>
@@ -5828,7 +5624,7 @@
               <a:t>[board][</a:t>
             </a:r>
             <a:r>
-              <a:rPr lang="en-US" sz="1600" dirty="0" err="1" smtClean="0">
+              <a:rPr lang="en-US" sz="1600" dirty="0" err="1">
                 <a:solidFill>
                   <a:schemeClr val="accent4"/>
                 </a:solidFill>
@@ -5836,18 +5632,13 @@
               <a:t>chan</a:t>
             </a:r>
             <a:r>
-              <a:rPr lang="en-US" sz="1600" dirty="0" smtClean="0">
+              <a:rPr lang="en-US" sz="1600" dirty="0">
                 <a:solidFill>
                   <a:schemeClr val="accent4"/>
                 </a:solidFill>
               </a:rPr>
               <a:t>]</a:t>
             </a:r>
-            <a:endParaRPr lang="en-US" sz="1600" dirty="0">
-              <a:solidFill>
-                <a:schemeClr val="accent4"/>
-              </a:solidFill>
-            </a:endParaRPr>
           </a:p>
         </p:txBody>
       </p:sp>
@@ -5964,10 +5755,9 @@
           <a:p>
             <a:pPr algn="ctr"/>
             <a:r>
-              <a:rPr lang="en-US" sz="1200" dirty="0" smtClean="0"/>
+              <a:rPr lang="en-US" sz="1200" dirty="0"/>
               <a:t>Continued on next page</a:t>
             </a:r>
-            <a:endParaRPr lang="en-US" sz="1200" dirty="0"/>
           </a:p>
         </p:txBody>
       </p:sp>
@@ -6032,10 +5822,9 @@
           <a:lstStyle/>
           <a:p>
             <a:r>
-              <a:rPr lang="en-US" smtClean="0"/>
+              <a:rPr lang="en-US"/>
               <a:t>EOF</a:t>
             </a:r>
-            <a:endParaRPr lang="en-US"/>
           </a:p>
         </p:txBody>
       </p:sp>
@@ -6049,13 +5838,6 @@
   <p:clrMapOvr>
     <a:masterClrMapping/>
   </p:clrMapOvr>
-  <p:timing>
-    <p:tnLst>
-      <p:par>
-        <p:cTn id="1" dur="indefinite" restart="never" nodeType="tmRoot"/>
-      </p:par>
-    </p:tnLst>
-  </p:timing>
 </p:sld>
 </file>
 
@@ -6116,7 +5898,7 @@
           <a:p>
             <a:pPr algn="ctr"/>
             <a:r>
-              <a:rPr lang="en-US" dirty="0" smtClean="0">
+              <a:rPr lang="en-US" dirty="0">
                 <a:solidFill>
                   <a:schemeClr val="tx1"/>
                 </a:solidFill>
@@ -6124,7 +5906,7 @@
               <a:t>Output may be /dev/null, </a:t>
             </a:r>
             <a:r>
-              <a:rPr lang="en-US" dirty="0" err="1" smtClean="0">
+              <a:rPr lang="en-US" dirty="0" err="1">
                 <a:solidFill>
                   <a:schemeClr val="tx1"/>
                 </a:solidFill>
@@ -6132,7 +5914,7 @@
               <a:t>stdout</a:t>
             </a:r>
             <a:r>
-              <a:rPr lang="en-US" dirty="0" smtClean="0">
+              <a:rPr lang="en-US" dirty="0">
                 <a:solidFill>
                   <a:schemeClr val="tx1"/>
                 </a:solidFill>
@@ -6143,18 +5925,13 @@
           <a:p>
             <a:pPr algn="ctr"/>
             <a:r>
-              <a:rPr lang="en-US" dirty="0" smtClean="0">
+              <a:rPr lang="en-US" dirty="0">
                 <a:solidFill>
                   <a:schemeClr val="tx1"/>
                 </a:solidFill>
               </a:rPr>
               <a:t>or a user-specified file</a:t>
             </a:r>
-            <a:endParaRPr lang="en-US" dirty="0">
-              <a:solidFill>
-                <a:schemeClr val="tx1"/>
-              </a:solidFill>
-            </a:endParaRPr>
           </a:p>
         </p:txBody>
       </p:sp>
@@ -6179,22 +5956,9 @@
           <a:lstStyle/>
           <a:p>
             <a:r>
-              <a:rPr lang="en-US" dirty="0" err="1" smtClean="0"/>
-              <a:t>loadWDL</a:t>
-            </a:r>
-            <a:r>
-              <a:rPr lang="en-US" dirty="0" smtClean="0"/>
-              <a:t>(</a:t>
-            </a:r>
-            <a:r>
-              <a:rPr lang="en-US" dirty="0" err="1" smtClean="0"/>
-              <a:t>infile.wdl</a:t>
-            </a:r>
-            <a:r>
-              <a:rPr lang="en-US" dirty="0" smtClean="0"/>
-              <a:t>)</a:t>
-            </a:r>
-            <a:endParaRPr lang="en-US" dirty="0"/>
+              <a:rPr lang="en-US" dirty="0"/>
+              <a:t>loadWDL(infile.wdl)</a:t>
+            </a:r>
           </a:p>
         </p:txBody>
       </p:sp>
@@ -6235,26 +5999,25 @@
           <a:p>
             <a:pPr algn="ctr"/>
             <a:r>
-              <a:rPr lang="en-US" sz="1400" dirty="0" smtClean="0"/>
+              <a:rPr lang="en-US" sz="1400" dirty="0"/>
               <a:t>Load information from the </a:t>
             </a:r>
             <a:r>
-              <a:rPr lang="en-US" sz="1400" dirty="0" err="1" smtClean="0"/>
+              <a:rPr lang="en-US" sz="1400" dirty="0" err="1"/>
               <a:t>SignalFile</a:t>
             </a:r>
             <a:r>
-              <a:rPr lang="en-US" sz="1400" dirty="0" smtClean="0"/>
+              <a:rPr lang="en-US" sz="1400" dirty="0"/>
               <a:t> [relates (</a:t>
             </a:r>
             <a:r>
-              <a:rPr lang="en-US" sz="1400" dirty="0" err="1" smtClean="0"/>
+              <a:rPr lang="en-US" sz="1400" dirty="0" err="1"/>
               <a:t>board,chan</a:t>
             </a:r>
             <a:r>
-              <a:rPr lang="en-US" sz="1400" dirty="0" smtClean="0"/>
+              <a:rPr lang="en-US" sz="1400" dirty="0"/>
               <a:t>) pairs to human-readable names]</a:t>
             </a:r>
-            <a:endParaRPr lang="en-US" sz="1400" dirty="0"/>
           </a:p>
         </p:txBody>
       </p:sp>
@@ -6295,11 +6058,11 @@
           <a:p>
             <a:pPr algn="ctr"/>
             <a:r>
-              <a:rPr lang="en-US" dirty="0" smtClean="0"/>
+              <a:rPr lang="en-US" dirty="0"/>
               <a:t>Call </a:t>
             </a:r>
             <a:r>
-              <a:rPr lang="en-US" dirty="0" err="1" smtClean="0">
+              <a:rPr lang="en-US" dirty="0" err="1">
                 <a:solidFill>
                   <a:schemeClr val="tx1"/>
                 </a:solidFill>
@@ -6307,10 +6070,9 @@
               <a:t>wavgen.script</a:t>
             </a:r>
             <a:r>
-              <a:rPr lang="en-US" dirty="0" smtClean="0"/>
+              <a:rPr lang="en-US" dirty="0"/>
               <a:t>()</a:t>
             </a:r>
-            <a:endParaRPr lang="en-US" dirty="0"/>
           </a:p>
         </p:txBody>
       </p:sp>
@@ -6373,10 +6135,9 @@
           <a:lstStyle/>
           <a:p>
             <a:r>
-              <a:rPr lang="en-US" smtClean="0"/>
+              <a:rPr lang="en-US"/>
               <a:t>EOF</a:t>
             </a:r>
-            <a:endParaRPr lang="en-US"/>
           </a:p>
         </p:txBody>
       </p:sp>
@@ -6457,11 +6218,11 @@
           <a:p>
             <a:pPr algn="ctr"/>
             <a:r>
-              <a:rPr lang="en-US" dirty="0" smtClean="0"/>
+              <a:rPr lang="en-US" dirty="0"/>
               <a:t>Call </a:t>
             </a:r>
             <a:r>
-              <a:rPr lang="en-US" dirty="0" err="1" smtClean="0">
+              <a:rPr lang="en-US" dirty="0" err="1">
                 <a:solidFill>
                   <a:schemeClr val="tx1"/>
                 </a:solidFill>
@@ -6469,10 +6230,9 @@
               <a:t>wavgen.state</a:t>
             </a:r>
             <a:r>
-              <a:rPr lang="en-US" dirty="0" smtClean="0"/>
+              <a:rPr lang="en-US" dirty="0"/>
               <a:t>()</a:t>
             </a:r>
-            <a:endParaRPr lang="en-US" dirty="0"/>
           </a:p>
         </p:txBody>
       </p:sp>
@@ -6549,19 +6309,19 @@
           <a:p>
             <a:pPr algn="ctr"/>
             <a:r>
-              <a:rPr lang="en-US" sz="1600" dirty="0" smtClean="0"/>
+              <a:rPr lang="en-US" sz="1600" dirty="0"/>
               <a:t>Print catalog info to </a:t>
             </a:r>
             <a:r>
-              <a:rPr lang="en-US" sz="1600" dirty="0" err="1" smtClean="0"/>
+              <a:rPr lang="en-US" sz="1600" dirty="0" err="1"/>
               <a:t>stdout</a:t>
             </a:r>
             <a:r>
-              <a:rPr lang="en-US" sz="1600" dirty="0" smtClean="0"/>
+              <a:rPr lang="en-US" sz="1600" dirty="0"/>
               <a:t> with </a:t>
             </a:r>
             <a:r>
-              <a:rPr lang="en-US" sz="1600" dirty="0" err="1" smtClean="0">
+              <a:rPr lang="en-US" sz="1600" dirty="0" err="1">
                 <a:solidFill>
                   <a:schemeClr val="tx1"/>
                 </a:solidFill>
@@ -6569,10 +6329,9 @@
               <a:t>wavgen.catalog</a:t>
             </a:r>
             <a:r>
-              <a:rPr lang="en-US" sz="1600" dirty="0" smtClean="0"/>
+              <a:rPr lang="en-US" sz="1600" dirty="0"/>
               <a:t>()</a:t>
             </a:r>
-            <a:endParaRPr lang="en-US" sz="1600" dirty="0"/>
           </a:p>
         </p:txBody>
       </p:sp>
@@ -6649,11 +6408,11 @@
           <a:p>
             <a:pPr algn="ctr"/>
             <a:r>
-              <a:rPr lang="en-US" sz="1600" dirty="0" smtClean="0"/>
+              <a:rPr lang="en-US" sz="1600" dirty="0"/>
               <a:t>Run user-specified python commands from </a:t>
             </a:r>
             <a:r>
-              <a:rPr lang="en-US" sz="1600" dirty="0" err="1" smtClean="0">
+              <a:rPr lang="en-US" sz="1600" dirty="0" err="1">
                 <a:solidFill>
                   <a:schemeClr val="accent4"/>
                 </a:solidFill>
@@ -6705,7 +6464,7 @@
           <a:p>
             <a:pPr algn="ctr"/>
             <a:r>
-              <a:rPr lang="en-US" sz="1600" dirty="0" smtClean="0"/>
+              <a:rPr lang="en-US" sz="1600" dirty="0"/>
               <a:t>Generate figures</a:t>
             </a:r>
             <a:endParaRPr lang="en-US" sz="1600" dirty="0">
@@ -6798,13 +6557,6 @@
   <p:clrMapOvr>
     <a:masterClrMapping/>
   </p:clrMapOvr>
-  <p:timing>
-    <p:tnLst>
-      <p:par>
-        <p:cTn id="1" dur="indefinite" restart="never" nodeType="tmRoot"/>
-      </p:par>
-    </p:tnLst>
-  </p:timing>
 </p:sld>
 </file>
 
@@ -6841,10 +6593,9 @@
           <a:lstStyle/>
           <a:p>
             <a:r>
-              <a:rPr lang="en-US" dirty="0" err="1" smtClean="0"/>
+              <a:rPr lang="en-US" dirty="0"/>
               <a:t>UniqueStateArr</a:t>
             </a:r>
-            <a:endParaRPr lang="en-US" dirty="0"/>
           </a:p>
         </p:txBody>
       </p:sp>
@@ -6866,29 +6617,29 @@
         </p:spPr>
         <p:txBody>
           <a:bodyPr>
-            <a:normAutofit fontScale="77500" lnSpcReduction="20000"/>
+            <a:normAutofit fontScale="70000" lnSpcReduction="20000"/>
           </a:bodyPr>
           <a:lstStyle/>
           <a:p>
             <a:r>
-              <a:rPr lang="en-US" dirty="0" smtClean="0"/>
+              <a:rPr lang="en-US" dirty="0"/>
               <a:t>2D array of floats (# states) x (2 x # channels)</a:t>
             </a:r>
           </a:p>
           <a:p>
             <a:r>
-              <a:rPr lang="en-US" dirty="0" smtClean="0"/>
+              <a:rPr lang="en-US" dirty="0"/>
               <a:t>For everything EXCEPT the DRIVER board, each DAC channel is represented by 2 columns of the USA.</a:t>
             </a:r>
           </a:p>
           <a:p>
             <a:pPr lvl="1"/>
             <a:r>
-              <a:rPr lang="en-US" dirty="0" smtClean="0"/>
+              <a:rPr lang="en-US" dirty="0"/>
               <a:t>Even columns represent </a:t>
             </a:r>
             <a:r>
-              <a:rPr lang="en-US" dirty="0" smtClean="0">
+              <a:rPr lang="en-US" dirty="0">
                 <a:solidFill>
                   <a:srgbClr val="FF0000"/>
                 </a:solidFill>
@@ -6899,11 +6650,11 @@
           <a:p>
             <a:pPr lvl="1"/>
             <a:r>
-              <a:rPr lang="en-US" dirty="0" smtClean="0"/>
+              <a:rPr lang="en-US" dirty="0"/>
               <a:t>The +1 odd column represents the </a:t>
             </a:r>
             <a:r>
-              <a:rPr lang="en-US" dirty="0" smtClean="0">
+              <a:rPr lang="en-US" dirty="0">
                 <a:solidFill>
                   <a:srgbClr val="FF0000"/>
                 </a:solidFill>
@@ -6913,18 +6664,18 @@
           </a:p>
           <a:p>
             <a:r>
-              <a:rPr lang="en-US" dirty="0" smtClean="0"/>
+              <a:rPr lang="en-US" dirty="0"/>
               <a:t>For the DRIVER board, each DAC channel is represented by 4 columns of the USA:</a:t>
             </a:r>
           </a:p>
           <a:p>
             <a:pPr lvl="1"/>
             <a:r>
-              <a:rPr lang="en-US" dirty="0" smtClean="0"/>
+              <a:rPr lang="en-US" dirty="0"/>
               <a:t>(mod 4) = 0 columns represent the </a:t>
             </a:r>
             <a:r>
-              <a:rPr lang="en-US" dirty="0" smtClean="0">
+              <a:rPr lang="en-US" dirty="0">
                 <a:solidFill>
                   <a:srgbClr val="FF0000"/>
                 </a:solidFill>
@@ -6935,11 +6686,11 @@
           <a:p>
             <a:pPr lvl="1"/>
             <a:r>
-              <a:rPr lang="en-US" dirty="0" smtClean="0"/>
+              <a:rPr lang="en-US" dirty="0"/>
               <a:t>The +1 and +3 odd columns represent the </a:t>
             </a:r>
             <a:r>
-              <a:rPr lang="en-US" dirty="0" smtClean="0">
+              <a:rPr lang="en-US" dirty="0">
                 <a:solidFill>
                   <a:srgbClr val="FF0000"/>
                 </a:solidFill>
@@ -6950,11 +6701,11 @@
           <a:p>
             <a:pPr lvl="1"/>
             <a:r>
-              <a:rPr lang="en-US" dirty="0" smtClean="0"/>
+              <a:rPr lang="en-US" dirty="0"/>
               <a:t>The +2 even column represents the </a:t>
             </a:r>
             <a:r>
-              <a:rPr lang="en-US" dirty="0" smtClean="0">
+              <a:rPr lang="en-US" dirty="0">
                 <a:solidFill>
                   <a:srgbClr val="FF0000"/>
                 </a:solidFill>
@@ -6964,51 +6715,35 @@
           </a:p>
           <a:p>
             <a:r>
-              <a:rPr lang="en-US" dirty="0" smtClean="0"/>
+              <a:rPr lang="en-US" dirty="0"/>
               <a:t>STA Archon driver boards have 8 DACs </a:t>
             </a:r>
             <a:r>
-              <a:rPr lang="mr-IN" dirty="0" smtClean="0"/>
+              <a:rPr lang="mr-IN" dirty="0"/>
               <a:t>–</a:t>
             </a:r>
             <a:r>
-              <a:rPr lang="en-US" dirty="0" smtClean="0"/>
-              <a:t> in </a:t>
-            </a:r>
-            <a:r>
-              <a:rPr lang="en-US" dirty="0" err="1" smtClean="0"/>
-              <a:t>wavgen</a:t>
-            </a:r>
-            <a:r>
-              <a:rPr lang="en-US" dirty="0" smtClean="0"/>
-              <a:t>, they are represented as having 16 channels, with the even channels being DACS and the +1 odd channels being the corresponding FAST/SLOW flags.</a:t>
-            </a:r>
-          </a:p>
-          <a:p>
-            <a:r>
-              <a:rPr lang="en-US" dirty="0" smtClean="0"/>
-              <a:t>Most of the work of filling the USA happens in </a:t>
-            </a:r>
-            <a:r>
-              <a:rPr lang="en-US" dirty="0" err="1" smtClean="0"/>
-              <a:t>TimingSegment</a:t>
-            </a:r>
-            <a:r>
-              <a:rPr lang="en-US" dirty="0" smtClean="0"/>
-              <a:t>.__</a:t>
-            </a:r>
-            <a:r>
-              <a:rPr lang="en-US" dirty="0" err="1" smtClean="0"/>
+              <a:rPr lang="en-US" dirty="0"/>
+              <a:t> in wavgen, they are represented as having 16 channels, with the even channels being DACS and the +1 odd channels being the corresponding FAST/SLOW flags.</a:t>
+            </a:r>
+          </a:p>
+          <a:p>
+            <a:r>
+              <a:rPr lang="en-US" dirty="0"/>
+              <a:t>Most of the work of filling the USA happens in TimingSegment.__</a:t>
+            </a:r>
+            <a:r>
+              <a:rPr lang="en-US" dirty="0" err="1"/>
               <a:t>make_states</a:t>
             </a:r>
             <a:r>
-              <a:rPr lang="en-US" dirty="0" smtClean="0"/>
+              <a:rPr lang="en-US" dirty="0"/>
               <a:t>().</a:t>
             </a:r>
           </a:p>
           <a:p>
             <a:r>
-              <a:rPr lang="en-US" dirty="0" smtClean="0"/>
+              <a:rPr lang="en-US" dirty="0"/>
               <a:t>State000, the top row of the USA is the “do nothing” state. </a:t>
             </a:r>
           </a:p>
@@ -7039,17 +6774,83 @@
                 <a:tableStyleId>{5C22544A-7EE6-4342-B048-85BDC9FD1C3A}</a:tableStyleId>
               </a:tblPr>
               <a:tblGrid>
-                <a:gridCol w="584481"/>
-                <a:gridCol w="381335"/>
-                <a:gridCol w="381335"/>
-                <a:gridCol w="381335"/>
-                <a:gridCol w="381335"/>
-                <a:gridCol w="381335"/>
-                <a:gridCol w="381335"/>
-                <a:gridCol w="381335"/>
-                <a:gridCol w="381335"/>
-                <a:gridCol w="381335"/>
-                <a:gridCol w="381335"/>
+                <a:gridCol w="584481">
+                  <a:extLst>
+                    <a:ext uri="{9D8B030D-6E8A-4147-A177-3AD203B41FA5}">
+                      <a16:colId xmlns:a16="http://schemas.microsoft.com/office/drawing/2014/main" val="20000"/>
+                    </a:ext>
+                  </a:extLst>
+                </a:gridCol>
+                <a:gridCol w="381335">
+                  <a:extLst>
+                    <a:ext uri="{9D8B030D-6E8A-4147-A177-3AD203B41FA5}">
+                      <a16:colId xmlns:a16="http://schemas.microsoft.com/office/drawing/2014/main" val="20001"/>
+                    </a:ext>
+                  </a:extLst>
+                </a:gridCol>
+                <a:gridCol w="381335">
+                  <a:extLst>
+                    <a:ext uri="{9D8B030D-6E8A-4147-A177-3AD203B41FA5}">
+                      <a16:colId xmlns:a16="http://schemas.microsoft.com/office/drawing/2014/main" val="20002"/>
+                    </a:ext>
+                  </a:extLst>
+                </a:gridCol>
+                <a:gridCol w="381335">
+                  <a:extLst>
+                    <a:ext uri="{9D8B030D-6E8A-4147-A177-3AD203B41FA5}">
+                      <a16:colId xmlns:a16="http://schemas.microsoft.com/office/drawing/2014/main" val="20003"/>
+                    </a:ext>
+                  </a:extLst>
+                </a:gridCol>
+                <a:gridCol w="381335">
+                  <a:extLst>
+                    <a:ext uri="{9D8B030D-6E8A-4147-A177-3AD203B41FA5}">
+                      <a16:colId xmlns:a16="http://schemas.microsoft.com/office/drawing/2014/main" val="20004"/>
+                    </a:ext>
+                  </a:extLst>
+                </a:gridCol>
+                <a:gridCol w="381335">
+                  <a:extLst>
+                    <a:ext uri="{9D8B030D-6E8A-4147-A177-3AD203B41FA5}">
+                      <a16:colId xmlns:a16="http://schemas.microsoft.com/office/drawing/2014/main" val="20005"/>
+                    </a:ext>
+                  </a:extLst>
+                </a:gridCol>
+                <a:gridCol w="381335">
+                  <a:extLst>
+                    <a:ext uri="{9D8B030D-6E8A-4147-A177-3AD203B41FA5}">
+                      <a16:colId xmlns:a16="http://schemas.microsoft.com/office/drawing/2014/main" val="20006"/>
+                    </a:ext>
+                  </a:extLst>
+                </a:gridCol>
+                <a:gridCol w="381335">
+                  <a:extLst>
+                    <a:ext uri="{9D8B030D-6E8A-4147-A177-3AD203B41FA5}">
+                      <a16:colId xmlns:a16="http://schemas.microsoft.com/office/drawing/2014/main" val="20007"/>
+                    </a:ext>
+                  </a:extLst>
+                </a:gridCol>
+                <a:gridCol w="381335">
+                  <a:extLst>
+                    <a:ext uri="{9D8B030D-6E8A-4147-A177-3AD203B41FA5}">
+                      <a16:colId xmlns:a16="http://schemas.microsoft.com/office/drawing/2014/main" val="20008"/>
+                    </a:ext>
+                  </a:extLst>
+                </a:gridCol>
+                <a:gridCol w="381335">
+                  <a:extLst>
+                    <a:ext uri="{9D8B030D-6E8A-4147-A177-3AD203B41FA5}">
+                      <a16:colId xmlns:a16="http://schemas.microsoft.com/office/drawing/2014/main" val="20009"/>
+                    </a:ext>
+                  </a:extLst>
+                </a:gridCol>
+                <a:gridCol w="381335">
+                  <a:extLst>
+                    <a:ext uri="{9D8B030D-6E8A-4147-A177-3AD203B41FA5}">
+                      <a16:colId xmlns:a16="http://schemas.microsoft.com/office/drawing/2014/main" val="20010"/>
+                    </a:ext>
+                  </a:extLst>
+                </a:gridCol>
               </a:tblGrid>
               <a:tr h="361369">
                 <a:tc>
@@ -7058,10 +6859,9 @@
                     <a:lstStyle/>
                     <a:p>
                       <a:r>
-                        <a:rPr lang="en-US" dirty="0" smtClean="0"/>
+                        <a:rPr lang="en-US" dirty="0"/>
                         <a:t>000</a:t>
                       </a:r>
-                      <a:endParaRPr lang="en-US" dirty="0"/>
                     </a:p>
                   </a:txBody>
                   <a:tcPr/>
@@ -7072,10 +6872,9 @@
                     <a:lstStyle/>
                     <a:p>
                       <a:r>
-                        <a:rPr lang="en-US" sz="1050" dirty="0" smtClean="0"/>
+                        <a:rPr lang="en-US" sz="1050" dirty="0"/>
                         <a:t>0</a:t>
                       </a:r>
-                      <a:endParaRPr lang="en-US" sz="1050" dirty="0"/>
                     </a:p>
                   </a:txBody>
                   <a:tcPr/>
@@ -7086,10 +6885,9 @@
                     <a:lstStyle/>
                     <a:p>
                       <a:r>
-                        <a:rPr lang="en-US" sz="1050" dirty="0" smtClean="0"/>
+                        <a:rPr lang="en-US" sz="1050" dirty="0"/>
                         <a:t>0</a:t>
                       </a:r>
-                      <a:endParaRPr lang="en-US" sz="1050" dirty="0"/>
                     </a:p>
                   </a:txBody>
                   <a:tcPr/>
@@ -7100,10 +6898,9 @@
                     <a:lstStyle/>
                     <a:p>
                       <a:r>
-                        <a:rPr lang="en-US" sz="1050" dirty="0" smtClean="0"/>
+                        <a:rPr lang="en-US" sz="1050" dirty="0"/>
                         <a:t>0</a:t>
                       </a:r>
-                      <a:endParaRPr lang="en-US" sz="1050" dirty="0"/>
                     </a:p>
                   </a:txBody>
                   <a:tcPr/>
@@ -7114,10 +6911,9 @@
                     <a:lstStyle/>
                     <a:p>
                       <a:r>
-                        <a:rPr lang="en-US" sz="1050" dirty="0" smtClean="0"/>
+                        <a:rPr lang="en-US" sz="1050" dirty="0"/>
                         <a:t>0</a:t>
                       </a:r>
-                      <a:endParaRPr lang="en-US" sz="1050" dirty="0"/>
                     </a:p>
                   </a:txBody>
                   <a:tcPr/>
@@ -7128,10 +6924,9 @@
                     <a:lstStyle/>
                     <a:p>
                       <a:r>
-                        <a:rPr lang="en-US" sz="1050" dirty="0" smtClean="0"/>
+                        <a:rPr lang="en-US" sz="1050" dirty="0"/>
                         <a:t>0</a:t>
                       </a:r>
-                      <a:endParaRPr lang="en-US" sz="1050" dirty="0"/>
                     </a:p>
                   </a:txBody>
                   <a:tcPr/>
@@ -7142,10 +6937,9 @@
                     <a:lstStyle/>
                     <a:p>
                       <a:r>
-                        <a:rPr lang="en-US" sz="1050" dirty="0" smtClean="0"/>
+                        <a:rPr lang="en-US" sz="1050" dirty="0"/>
                         <a:t>0</a:t>
                       </a:r>
-                      <a:endParaRPr lang="en-US" sz="1050" dirty="0"/>
                     </a:p>
                   </a:txBody>
                   <a:tcPr/>
@@ -7156,10 +6950,9 @@
                     <a:lstStyle/>
                     <a:p>
                       <a:r>
-                        <a:rPr lang="en-US" sz="1050" dirty="0" smtClean="0"/>
+                        <a:rPr lang="en-US" sz="1050" dirty="0"/>
                         <a:t>0</a:t>
                       </a:r>
-                      <a:endParaRPr lang="en-US" sz="1050" dirty="0"/>
                     </a:p>
                   </a:txBody>
                   <a:tcPr/>
@@ -7170,10 +6963,9 @@
                     <a:lstStyle/>
                     <a:p>
                       <a:r>
-                        <a:rPr lang="en-US" sz="1050" dirty="0" smtClean="0"/>
+                        <a:rPr lang="en-US" sz="1050" dirty="0"/>
                         <a:t>0</a:t>
                       </a:r>
-                      <a:endParaRPr lang="en-US" sz="1050" dirty="0"/>
                     </a:p>
                   </a:txBody>
                   <a:tcPr/>
@@ -7184,10 +6976,9 @@
                     <a:lstStyle/>
                     <a:p>
                       <a:r>
-                        <a:rPr lang="en-US" sz="1050" dirty="0" smtClean="0"/>
+                        <a:rPr lang="en-US" sz="1050" dirty="0"/>
                         <a:t>0</a:t>
                       </a:r>
-                      <a:endParaRPr lang="en-US" sz="1050" dirty="0"/>
                     </a:p>
                   </a:txBody>
                   <a:tcPr/>
@@ -7198,14 +6989,18 @@
                     <a:lstStyle/>
                     <a:p>
                       <a:r>
-                        <a:rPr lang="en-US" sz="1050" dirty="0" smtClean="0"/>
+                        <a:rPr lang="en-US" sz="1050" dirty="0"/>
                         <a:t>0</a:t>
                       </a:r>
-                      <a:endParaRPr lang="en-US" sz="1050" dirty="0"/>
                     </a:p>
                   </a:txBody>
                   <a:tcPr/>
                 </a:tc>
+                <a:extLst>
+                  <a:ext uri="{0D108BD9-81ED-4DB2-BD59-A6C34878D82A}">
+                    <a16:rowId xmlns:a16="http://schemas.microsoft.com/office/drawing/2014/main" val="10000"/>
+                  </a:ext>
+                </a:extLst>
               </a:tr>
               <a:tr h="361369">
                 <a:tc>
@@ -7214,7 +7009,7 @@
                     <a:lstStyle/>
                     <a:p>
                       <a:r>
-                        <a:rPr lang="en-US" dirty="0" smtClean="0"/>
+                        <a:rPr lang="en-US" dirty="0"/>
                         <a:t>001</a:t>
                       </a:r>
                     </a:p>
@@ -7227,10 +7022,9 @@
                     <a:lstStyle/>
                     <a:p>
                       <a:r>
-                        <a:rPr lang="en-US" sz="1050" dirty="0" smtClean="0"/>
+                        <a:rPr lang="en-US" sz="1050" dirty="0"/>
                         <a:t>1</a:t>
                       </a:r>
-                      <a:endParaRPr lang="en-US" sz="1050" dirty="0"/>
                     </a:p>
                   </a:txBody>
                   <a:tcPr/>
@@ -7241,10 +7035,9 @@
                     <a:lstStyle/>
                     <a:p>
                       <a:r>
-                        <a:rPr lang="en-US" sz="1050" dirty="0" smtClean="0"/>
+                        <a:rPr lang="en-US" sz="1050" dirty="0"/>
                         <a:t>1</a:t>
                       </a:r>
-                      <a:endParaRPr lang="en-US" sz="1050" dirty="0"/>
                     </a:p>
                   </a:txBody>
                   <a:tcPr/>
@@ -7255,10 +7048,9 @@
                     <a:lstStyle/>
                     <a:p>
                       <a:r>
-                        <a:rPr lang="en-US" sz="1050" dirty="0" smtClean="0"/>
+                        <a:rPr lang="en-US" sz="1050" dirty="0"/>
                         <a:t>0</a:t>
                       </a:r>
-                      <a:endParaRPr lang="en-US" sz="1050" dirty="0"/>
                     </a:p>
                   </a:txBody>
                   <a:tcPr/>
@@ -7269,10 +7061,9 @@
                     <a:lstStyle/>
                     <a:p>
                       <a:r>
-                        <a:rPr lang="en-US" sz="1050" dirty="0" smtClean="0"/>
+                        <a:rPr lang="en-US" sz="1050" dirty="0"/>
                         <a:t>1</a:t>
                       </a:r>
-                      <a:endParaRPr lang="en-US" sz="1050" dirty="0"/>
                     </a:p>
                   </a:txBody>
                   <a:tcPr/>
@@ -7283,10 +7074,9 @@
                     <a:lstStyle/>
                     <a:p>
                       <a:r>
-                        <a:rPr lang="en-US" sz="1050" dirty="0" smtClean="0"/>
+                        <a:rPr lang="en-US" sz="1050" dirty="0"/>
                         <a:t>0</a:t>
                       </a:r>
-                      <a:endParaRPr lang="en-US" sz="1050" dirty="0"/>
                     </a:p>
                   </a:txBody>
                   <a:tcPr/>
@@ -7297,10 +7087,9 @@
                     <a:lstStyle/>
                     <a:p>
                       <a:r>
-                        <a:rPr lang="en-US" sz="1050" dirty="0" smtClean="0"/>
+                        <a:rPr lang="en-US" sz="1050" dirty="0"/>
                         <a:t>0</a:t>
                       </a:r>
-                      <a:endParaRPr lang="en-US" sz="1050" dirty="0"/>
                     </a:p>
                   </a:txBody>
                   <a:tcPr/>
@@ -7311,10 +7100,9 @@
                     <a:lstStyle/>
                     <a:p>
                       <a:r>
-                        <a:rPr lang="en-US" sz="1050" dirty="0" smtClean="0"/>
+                        <a:rPr lang="en-US" sz="1050" dirty="0"/>
                         <a:t>0</a:t>
                       </a:r>
-                      <a:endParaRPr lang="en-US" sz="1050" dirty="0"/>
                     </a:p>
                   </a:txBody>
                   <a:tcPr/>
@@ -7325,10 +7113,9 @@
                     <a:lstStyle/>
                     <a:p>
                       <a:r>
-                        <a:rPr lang="en-US" sz="1050" dirty="0" smtClean="0"/>
+                        <a:rPr lang="en-US" sz="1050" dirty="0"/>
                         <a:t>0</a:t>
                       </a:r>
-                      <a:endParaRPr lang="en-US" sz="1050" dirty="0"/>
                     </a:p>
                   </a:txBody>
                   <a:tcPr/>
@@ -7339,10 +7126,9 @@
                     <a:lstStyle/>
                     <a:p>
                       <a:r>
-                        <a:rPr lang="en-US" sz="1050" dirty="0" smtClean="0"/>
+                        <a:rPr lang="en-US" sz="1050" dirty="0"/>
                         <a:t>2.3</a:t>
                       </a:r>
-                      <a:endParaRPr lang="en-US" sz="1050" dirty="0"/>
                     </a:p>
                   </a:txBody>
                   <a:tcPr/>
@@ -7353,14 +7139,18 @@
                     <a:lstStyle/>
                     <a:p>
                       <a:r>
-                        <a:rPr lang="en-US" sz="1050" dirty="0" smtClean="0"/>
+                        <a:rPr lang="en-US" sz="1050" dirty="0"/>
                         <a:t>1</a:t>
                       </a:r>
-                      <a:endParaRPr lang="en-US" sz="1050" dirty="0"/>
                     </a:p>
                   </a:txBody>
                   <a:tcPr/>
                 </a:tc>
+                <a:extLst>
+                  <a:ext uri="{0D108BD9-81ED-4DB2-BD59-A6C34878D82A}">
+                    <a16:rowId xmlns:a16="http://schemas.microsoft.com/office/drawing/2014/main" val="10001"/>
+                  </a:ext>
+                </a:extLst>
               </a:tr>
               <a:tr h="361369">
                 <a:tc>
@@ -7369,7 +7159,7 @@
                     <a:lstStyle/>
                     <a:p>
                       <a:r>
-                        <a:rPr lang="en-US" dirty="0" smtClean="0"/>
+                        <a:rPr lang="en-US" dirty="0"/>
                         <a:t>002</a:t>
                       </a:r>
                     </a:p>
@@ -7382,10 +7172,9 @@
                     <a:lstStyle/>
                     <a:p>
                       <a:r>
-                        <a:rPr lang="en-US" sz="1050" dirty="0" smtClean="0"/>
+                        <a:rPr lang="en-US" sz="1050" dirty="0"/>
                         <a:t>0</a:t>
                       </a:r>
-                      <a:endParaRPr lang="en-US" sz="1050" dirty="0"/>
                     </a:p>
                   </a:txBody>
                   <a:tcPr/>
@@ -7396,10 +7185,9 @@
                     <a:lstStyle/>
                     <a:p>
                       <a:r>
-                        <a:rPr lang="en-US" sz="1050" dirty="0" smtClean="0"/>
+                        <a:rPr lang="en-US" sz="1050" dirty="0"/>
                         <a:t>1</a:t>
                       </a:r>
-                      <a:endParaRPr lang="en-US" sz="1050" dirty="0"/>
                     </a:p>
                   </a:txBody>
                   <a:tcPr/>
@@ -7410,10 +7198,9 @@
                     <a:lstStyle/>
                     <a:p>
                       <a:r>
-                        <a:rPr lang="en-US" sz="1050" dirty="0" smtClean="0"/>
+                        <a:rPr lang="en-US" sz="1050" dirty="0"/>
                         <a:t>1</a:t>
                       </a:r>
-                      <a:endParaRPr lang="en-US" sz="1050" dirty="0"/>
                     </a:p>
                   </a:txBody>
                   <a:tcPr/>
@@ -7424,10 +7211,9 @@
                     <a:lstStyle/>
                     <a:p>
                       <a:r>
-                        <a:rPr lang="en-US" sz="1050" dirty="0" smtClean="0"/>
+                        <a:rPr lang="en-US" sz="1050" dirty="0"/>
                         <a:t>1</a:t>
                       </a:r>
-                      <a:endParaRPr lang="en-US" sz="1050" dirty="0"/>
                     </a:p>
                   </a:txBody>
                   <a:tcPr/>
@@ -7438,10 +7224,9 @@
                     <a:lstStyle/>
                     <a:p>
                       <a:r>
-                        <a:rPr lang="en-US" sz="1050" dirty="0" smtClean="0"/>
+                        <a:rPr lang="en-US" sz="1050" dirty="0"/>
                         <a:t>0</a:t>
                       </a:r>
-                      <a:endParaRPr lang="en-US" sz="1050" dirty="0"/>
                     </a:p>
                   </a:txBody>
                   <a:tcPr/>
@@ -7452,10 +7237,9 @@
                     <a:lstStyle/>
                     <a:p>
                       <a:r>
-                        <a:rPr lang="en-US" sz="1050" dirty="0" smtClean="0"/>
+                        <a:rPr lang="en-US" sz="1050" dirty="0"/>
                         <a:t>0</a:t>
                       </a:r>
-                      <a:endParaRPr lang="en-US" sz="1050" dirty="0"/>
                     </a:p>
                   </a:txBody>
                   <a:tcPr/>
@@ -7466,10 +7250,9 @@
                     <a:lstStyle/>
                     <a:p>
                       <a:r>
-                        <a:rPr lang="en-US" sz="1050" dirty="0" smtClean="0"/>
+                        <a:rPr lang="en-US" sz="1050" dirty="0"/>
                         <a:t>0</a:t>
                       </a:r>
-                      <a:endParaRPr lang="en-US" sz="1050" dirty="0"/>
                     </a:p>
                   </a:txBody>
                   <a:tcPr/>
@@ -7480,10 +7263,9 @@
                     <a:lstStyle/>
                     <a:p>
                       <a:r>
-                        <a:rPr lang="en-US" sz="1050" dirty="0" smtClean="0"/>
+                        <a:rPr lang="en-US" sz="1050" dirty="0"/>
                         <a:t>0</a:t>
                       </a:r>
-                      <a:endParaRPr lang="en-US" sz="1050" dirty="0"/>
                     </a:p>
                   </a:txBody>
                   <a:tcPr/>
@@ -7494,10 +7276,9 @@
                     <a:lstStyle/>
                     <a:p>
                       <a:r>
-                        <a:rPr lang="en-US" sz="1050" dirty="0" smtClean="0"/>
+                        <a:rPr lang="en-US" sz="1050" dirty="0"/>
                         <a:t>0</a:t>
                       </a:r>
-                      <a:endParaRPr lang="en-US" sz="1050" dirty="0"/>
                     </a:p>
                   </a:txBody>
                   <a:tcPr/>
@@ -7508,14 +7289,18 @@
                     <a:lstStyle/>
                     <a:p>
                       <a:r>
-                        <a:rPr lang="en-US" sz="1050" dirty="0" smtClean="0"/>
+                        <a:rPr lang="en-US" sz="1050" dirty="0"/>
                         <a:t>1</a:t>
                       </a:r>
-                      <a:endParaRPr lang="en-US" sz="1050" dirty="0"/>
                     </a:p>
                   </a:txBody>
                   <a:tcPr/>
                 </a:tc>
+                <a:extLst>
+                  <a:ext uri="{0D108BD9-81ED-4DB2-BD59-A6C34878D82A}">
+                    <a16:rowId xmlns:a16="http://schemas.microsoft.com/office/drawing/2014/main" val="10002"/>
+                  </a:ext>
+                </a:extLst>
               </a:tr>
               <a:tr h="361369">
                 <a:tc>
@@ -7524,10 +7309,9 @@
                     <a:lstStyle/>
                     <a:p>
                       <a:r>
-                        <a:rPr lang="en-US" dirty="0" smtClean="0"/>
+                        <a:rPr lang="en-US" dirty="0"/>
                         <a:t>003</a:t>
                       </a:r>
-                      <a:endParaRPr lang="en-US" dirty="0"/>
                     </a:p>
                   </a:txBody>
                   <a:tcPr/>
@@ -7632,6 +7416,11 @@
                   </a:txBody>
                   <a:tcPr/>
                 </a:tc>
+                <a:extLst>
+                  <a:ext uri="{0D108BD9-81ED-4DB2-BD59-A6C34878D82A}">
+                    <a16:rowId xmlns:a16="http://schemas.microsoft.com/office/drawing/2014/main" val="10003"/>
+                  </a:ext>
+                </a:extLst>
               </a:tr>
               <a:tr h="361369">
                 <a:tc>
@@ -7640,10 +7429,9 @@
                     <a:lstStyle/>
                     <a:p>
                       <a:r>
-                        <a:rPr lang="en-US" dirty="0" smtClean="0"/>
+                        <a:rPr lang="en-US" dirty="0"/>
                         <a:t>004</a:t>
                       </a:r>
-                      <a:endParaRPr lang="en-US" dirty="0"/>
                     </a:p>
                   </a:txBody>
                   <a:tcPr/>
@@ -7748,6 +7536,11 @@
                   </a:txBody>
                   <a:tcPr/>
                 </a:tc>
+                <a:extLst>
+                  <a:ext uri="{0D108BD9-81ED-4DB2-BD59-A6C34878D82A}">
+                    <a16:rowId xmlns:a16="http://schemas.microsoft.com/office/drawing/2014/main" val="10004"/>
+                  </a:ext>
+                </a:extLst>
               </a:tr>
               <a:tr h="361369">
                 <a:tc>
@@ -7756,10 +7549,9 @@
                     <a:lstStyle/>
                     <a:p>
                       <a:r>
-                        <a:rPr lang="en-US" dirty="0" smtClean="0"/>
+                        <a:rPr lang="en-US" dirty="0"/>
                         <a:t>005</a:t>
                       </a:r>
-                      <a:endParaRPr lang="en-US" dirty="0"/>
                     </a:p>
                   </a:txBody>
                   <a:tcPr/>
@@ -7864,6 +7656,11 @@
                   </a:txBody>
                   <a:tcPr/>
                 </a:tc>
+                <a:extLst>
+                  <a:ext uri="{0D108BD9-81ED-4DB2-BD59-A6C34878D82A}">
+                    <a16:rowId xmlns:a16="http://schemas.microsoft.com/office/drawing/2014/main" val="10005"/>
+                  </a:ext>
+                </a:extLst>
               </a:tr>
               <a:tr h="361369">
                 <a:tc>
@@ -7872,10 +7669,9 @@
                     <a:lstStyle/>
                     <a:p>
                       <a:r>
-                        <a:rPr lang="en-US" dirty="0" smtClean="0"/>
+                        <a:rPr lang="en-US" dirty="0"/>
                         <a:t>006</a:t>
                       </a:r>
-                      <a:endParaRPr lang="en-US" dirty="0"/>
                     </a:p>
                   </a:txBody>
                   <a:tcPr/>
@@ -7980,6 +7776,11 @@
                   </a:txBody>
                   <a:tcPr/>
                 </a:tc>
+                <a:extLst>
+                  <a:ext uri="{0D108BD9-81ED-4DB2-BD59-A6C34878D82A}">
+                    <a16:rowId xmlns:a16="http://schemas.microsoft.com/office/drawing/2014/main" val="10006"/>
+                  </a:ext>
+                </a:extLst>
               </a:tr>
               <a:tr h="361369">
                 <a:tc>
@@ -7988,7 +7789,7 @@
                     <a:lstStyle/>
                     <a:p>
                       <a:r>
-                        <a:rPr lang="en-US" dirty="0" err="1" smtClean="0"/>
+                        <a:rPr lang="en-US" dirty="0" err="1"/>
                         <a:t>etc</a:t>
                       </a:r>
                       <a:endParaRPr lang="en-US" dirty="0"/>
@@ -8096,6 +7897,11 @@
                   </a:txBody>
                   <a:tcPr/>
                 </a:tc>
+                <a:extLst>
+                  <a:ext uri="{0D108BD9-81ED-4DB2-BD59-A6C34878D82A}">
+                    <a16:rowId xmlns:a16="http://schemas.microsoft.com/office/drawing/2014/main" val="10007"/>
+                  </a:ext>
+                </a:extLst>
               </a:tr>
             </a:tbl>
           </a:graphicData>
@@ -8124,10 +7930,9 @@
           <a:lstStyle/>
           <a:p>
             <a:r>
-              <a:rPr lang="en-US" smtClean="0"/>
+              <a:rPr lang="en-US"/>
               <a:t>driver DAC</a:t>
             </a:r>
-            <a:endParaRPr lang="en-US"/>
           </a:p>
         </p:txBody>
       </p:sp>
@@ -8154,10 +7959,9 @@
           <a:lstStyle/>
           <a:p>
             <a:r>
-              <a:rPr lang="en-US" smtClean="0"/>
+              <a:rPr lang="en-US"/>
               <a:t>driver DAC</a:t>
             </a:r>
-            <a:endParaRPr lang="en-US"/>
           </a:p>
         </p:txBody>
       </p:sp>
@@ -8184,10 +7988,9 @@
           <a:lstStyle/>
           <a:p>
             <a:r>
-              <a:rPr lang="en-US" smtClean="0"/>
+              <a:rPr lang="en-US"/>
               <a:t>DAC</a:t>
             </a:r>
-            <a:endParaRPr lang="en-US"/>
           </a:p>
         </p:txBody>
       </p:sp>
@@ -8214,10 +8017,9 @@
           <a:lstStyle/>
           <a:p>
             <a:r>
-              <a:rPr lang="en-US" dirty="0" smtClean="0"/>
+              <a:rPr lang="en-US" dirty="0"/>
               <a:t>change flag</a:t>
             </a:r>
-            <a:endParaRPr lang="en-US" dirty="0"/>
           </a:p>
         </p:txBody>
       </p:sp>
@@ -8244,10 +8046,9 @@
           <a:lstStyle/>
           <a:p>
             <a:r>
-              <a:rPr lang="en-US" dirty="0" smtClean="0"/>
+              <a:rPr lang="en-US" dirty="0"/>
               <a:t>value</a:t>
             </a:r>
-            <a:endParaRPr lang="en-US" dirty="0"/>
           </a:p>
         </p:txBody>
       </p:sp>
@@ -8274,10 +8075,9 @@
           <a:lstStyle/>
           <a:p>
             <a:r>
-              <a:rPr lang="en-US" dirty="0" smtClean="0"/>
+              <a:rPr lang="en-US" dirty="0"/>
               <a:t>“fast” flag</a:t>
             </a:r>
-            <a:endParaRPr lang="en-US" dirty="0"/>
           </a:p>
         </p:txBody>
       </p:sp>
@@ -8304,10 +8104,9 @@
           <a:lstStyle/>
           <a:p>
             <a:r>
-              <a:rPr lang="en-US" dirty="0" smtClean="0"/>
+              <a:rPr lang="en-US" dirty="0"/>
               <a:t>value</a:t>
             </a:r>
-            <a:endParaRPr lang="en-US" dirty="0"/>
           </a:p>
         </p:txBody>
       </p:sp>
@@ -8334,10 +8133,9 @@
           <a:lstStyle/>
           <a:p>
             <a:r>
-              <a:rPr lang="en-US" dirty="0" smtClean="0"/>
+              <a:rPr lang="en-US" dirty="0"/>
               <a:t>value</a:t>
             </a:r>
-            <a:endParaRPr lang="en-US" dirty="0"/>
           </a:p>
         </p:txBody>
       </p:sp>
@@ -8364,10 +8162,9 @@
           <a:lstStyle/>
           <a:p>
             <a:r>
-              <a:rPr lang="en-US" dirty="0" smtClean="0"/>
+              <a:rPr lang="en-US" dirty="0"/>
               <a:t>change flag</a:t>
             </a:r>
-            <a:endParaRPr lang="en-US" dirty="0"/>
           </a:p>
         </p:txBody>
       </p:sp>
@@ -8394,10 +8191,9 @@
           <a:lstStyle/>
           <a:p>
             <a:r>
-              <a:rPr lang="en-US" dirty="0" smtClean="0"/>
+              <a:rPr lang="en-US" dirty="0"/>
               <a:t>change flag</a:t>
             </a:r>
-            <a:endParaRPr lang="en-US" dirty="0"/>
           </a:p>
         </p:txBody>
       </p:sp>
@@ -8424,10 +8220,9 @@
           <a:lstStyle/>
           <a:p>
             <a:r>
-              <a:rPr lang="en-US" dirty="0" smtClean="0"/>
+              <a:rPr lang="en-US" dirty="0"/>
               <a:t>change flag</a:t>
             </a:r>
-            <a:endParaRPr lang="en-US" dirty="0"/>
           </a:p>
         </p:txBody>
       </p:sp>
@@ -8454,10 +8249,9 @@
           <a:lstStyle/>
           <a:p>
             <a:r>
-              <a:rPr lang="en-US" dirty="0" smtClean="0"/>
+              <a:rPr lang="en-US" dirty="0"/>
               <a:t>change flag</a:t>
             </a:r>
-            <a:endParaRPr lang="en-US" dirty="0"/>
           </a:p>
         </p:txBody>
       </p:sp>
@@ -8484,10 +8278,9 @@
           <a:lstStyle/>
           <a:p>
             <a:r>
-              <a:rPr lang="en-US" dirty="0" smtClean="0"/>
+              <a:rPr lang="en-US" dirty="0"/>
               <a:t>“fast” flag</a:t>
             </a:r>
-            <a:endParaRPr lang="en-US" dirty="0"/>
           </a:p>
         </p:txBody>
       </p:sp>
@@ -8564,10 +8357,9 @@
           </a:lstStyle>
           <a:p>
             <a:r>
-              <a:rPr lang="en-US" smtClean="0"/>
+              <a:rPr lang="en-US" dirty="0"/>
               <a:t>UniqueStateArr</a:t>
             </a:r>
-            <a:endParaRPr lang="en-US" dirty="0"/>
           </a:p>
         </p:txBody>
       </p:sp>
@@ -8633,6 +8425,41 @@
           </a:fontRef>
         </p:style>
       </p:cxnSp>
+      <p:sp>
+        <p:nvSpPr>
+          <p:cNvPr id="11" name="TextBox 10">
+            <a:extLst>
+              <a:ext uri="{FF2B5EF4-FFF2-40B4-BE49-F238E27FC236}">
+                <a16:creationId xmlns:a16="http://schemas.microsoft.com/office/drawing/2014/main" id="{5A9E6B21-FBCB-2F4C-8E11-AEA05EFD60B8}"/>
+              </a:ext>
+            </a:extLst>
+          </p:cNvPr>
+          <p:cNvSpPr txBox="1"/>
+          <p:nvPr/>
+        </p:nvSpPr>
+        <p:spPr>
+          <a:xfrm>
+            <a:off x="7252138" y="4193628"/>
+            <a:ext cx="4304132" cy="646331"/>
+          </a:xfrm>
+          <a:prstGeom prst="rect">
+            <a:avLst/>
+          </a:prstGeom>
+          <a:noFill/>
+        </p:spPr>
+        <p:txBody>
+          <a:bodyPr wrap="square" rtlCol="0">
+            <a:spAutoFit/>
+          </a:bodyPr>
+          <a:lstStyle/>
+          <a:p>
+            <a:r>
+              <a:rPr lang="en-US" dirty="0"/>
+              <a:t>The information here is duplicated for ease of programming.</a:t>
+            </a:r>
+          </a:p>
+        </p:txBody>
+      </p:sp>
     </p:spTree>
     <p:extLst>
       <p:ext uri="{BB962C8B-B14F-4D97-AF65-F5344CB8AC3E}">
@@ -8643,13 +8470,6 @@
   <p:clrMapOvr>
     <a:masterClrMapping/>
   </p:clrMapOvr>
-  <p:timing>
-    <p:tnLst>
-      <p:par>
-        <p:cTn id="1" dur="indefinite" restart="never" nodeType="tmRoot"/>
-      </p:par>
-    </p:tnLst>
-  </p:timing>
 </p:sld>
 </file>
 
@@ -8692,17 +8512,8 @@
           <a:p>
             <a:r>
               <a:rPr lang="en-US" dirty="0"/>
-              <a:t>c</a:t>
-            </a:r>
-            <a:r>
-              <a:rPr lang="en-US" smtClean="0"/>
-              <a:t>lass </a:t>
-            </a:r>
-            <a:r>
-              <a:rPr lang="en-US" dirty="0" err="1" smtClean="0"/>
-              <a:t>TimingSegment</a:t>
-            </a:r>
-            <a:endParaRPr lang="en-US" dirty="0"/>
+              <a:t>class TimingSegment</a:t>
+            </a:r>
           </a:p>
         </p:txBody>
       </p:sp>
@@ -8729,18 +8540,18 @@
           <a:lstStyle/>
           <a:p>
             <a:r>
-              <a:rPr lang="en-US" dirty="0" smtClean="0"/>
+              <a:rPr lang="en-US" dirty="0"/>
               <a:t>Variables:</a:t>
             </a:r>
           </a:p>
           <a:p>
             <a:pPr lvl="1"/>
             <a:r>
-              <a:rPr lang="en-US" dirty="0" smtClean="0"/>
+              <a:rPr lang="en-US" dirty="0"/>
               <a:t>Defined in self.</a:t>
             </a:r>
             <a:r>
-              <a:rPr lang="en-US" dirty="0" smtClean="0">
+              <a:rPr lang="en-US" dirty="0">
                 <a:solidFill>
                   <a:schemeClr val="accent5"/>
                 </a:solidFill>
@@ -8748,7 +8559,7 @@
               <a:t>__</a:t>
             </a:r>
             <a:r>
-              <a:rPr lang="en-US" dirty="0" err="1" smtClean="0">
+              <a:rPr lang="en-US" dirty="0" err="1">
                 <a:solidFill>
                   <a:schemeClr val="accent5"/>
                 </a:solidFill>
@@ -8756,7 +8567,7 @@
               <a:t>init</a:t>
             </a:r>
             <a:r>
-              <a:rPr lang="en-US" dirty="0" smtClean="0">
+              <a:rPr lang="en-US" dirty="0">
                 <a:solidFill>
                   <a:schemeClr val="accent5"/>
                 </a:solidFill>
@@ -8764,46 +8575,41 @@
               <a:t>__</a:t>
             </a:r>
             <a:r>
-              <a:rPr lang="en-US" dirty="0" smtClean="0"/>
+              <a:rPr lang="en-US" dirty="0"/>
               <a:t>():</a:t>
             </a:r>
           </a:p>
           <a:p>
             <a:pPr lvl="2"/>
             <a:r>
-              <a:rPr lang="en-US" b="1" dirty="0" err="1" smtClean="0"/>
+              <a:rPr lang="en-US" b="1" dirty="0" err="1"/>
               <a:t>endline</a:t>
             </a:r>
             <a:r>
-              <a:rPr lang="en-US" dirty="0" smtClean="0"/>
+              <a:rPr lang="en-US" dirty="0"/>
               <a:t>: integer indicating what to do at the end of this </a:t>
             </a:r>
             <a:r>
-              <a:rPr lang="en-US" dirty="0" err="1" smtClean="0">
+              <a:rPr lang="en-US" dirty="0">
                 <a:solidFill>
                   <a:schemeClr val="accent6"/>
                 </a:solidFill>
               </a:rPr>
               <a:t>TimingSegment</a:t>
             </a:r>
-            <a:endParaRPr lang="en-US" dirty="0" smtClean="0">
-              <a:solidFill>
-                <a:schemeClr val="accent6"/>
-              </a:solidFill>
-            </a:endParaRPr>
           </a:p>
           <a:p>
             <a:pPr lvl="2"/>
             <a:r>
-              <a:rPr lang="en-US" b="1" dirty="0" smtClean="0"/>
+              <a:rPr lang="en-US" b="1" dirty="0"/>
               <a:t>label</a:t>
             </a:r>
             <a:r>
-              <a:rPr lang="en-US" dirty="0" smtClean="0"/>
+              <a:rPr lang="en-US" dirty="0"/>
               <a:t>: integer index location of this </a:t>
             </a:r>
             <a:r>
-              <a:rPr lang="en-US" dirty="0" err="1" smtClean="0">
+              <a:rPr lang="en-US" dirty="0">
                 <a:solidFill>
                   <a:schemeClr val="accent6"/>
                 </a:solidFill>
@@ -8811,11 +8617,11 @@
               <a:t>TimingSegment</a:t>
             </a:r>
             <a:r>
-              <a:rPr lang="en-US" dirty="0" smtClean="0"/>
+              <a:rPr lang="en-US" dirty="0"/>
               <a:t> in </a:t>
             </a:r>
             <a:r>
-              <a:rPr lang="en-US" dirty="0" smtClean="0">
+              <a:rPr lang="en-US" dirty="0">
                 <a:solidFill>
                   <a:schemeClr val="accent4"/>
                 </a:solidFill>
@@ -8823,11 +8629,11 @@
               <a:t>Catalog</a:t>
             </a:r>
             <a:r>
-              <a:rPr lang="en-US" dirty="0" smtClean="0"/>
+              <a:rPr lang="en-US" dirty="0"/>
               <a:t>.  defined to be the current value of the global variable </a:t>
             </a:r>
             <a:r>
-              <a:rPr lang="en-US" dirty="0" smtClean="0">
+              <a:rPr lang="en-US" dirty="0">
                 <a:solidFill>
                   <a:schemeClr val="accent4"/>
                 </a:solidFill>
@@ -8835,7 +8641,7 @@
               <a:t>__</a:t>
             </a:r>
             <a:r>
-              <a:rPr lang="en-US" dirty="0" err="1" smtClean="0">
+              <a:rPr lang="en-US" dirty="0" err="1">
                 <a:solidFill>
                   <a:schemeClr val="accent4"/>
                 </a:solidFill>
@@ -8843,7 +8649,7 @@
               <a:t>seq_ID</a:t>
             </a:r>
             <a:r>
-              <a:rPr lang="en-US" dirty="0" smtClean="0">
+              <a:rPr lang="en-US" dirty="0">
                 <a:solidFill>
                   <a:schemeClr val="accent4"/>
                 </a:solidFill>
@@ -8854,15 +8660,15 @@
           <a:p>
             <a:pPr lvl="2"/>
             <a:r>
-              <a:rPr lang="en-US" b="1" dirty="0" smtClean="0"/>
+              <a:rPr lang="en-US" b="1" dirty="0"/>
               <a:t>name</a:t>
             </a:r>
             <a:r>
-              <a:rPr lang="en-US" dirty="0" smtClean="0"/>
+              <a:rPr lang="en-US" dirty="0"/>
               <a:t>:  This is unique in the </a:t>
             </a:r>
             <a:r>
-              <a:rPr lang="en-US" dirty="0" smtClean="0">
+              <a:rPr lang="en-US" dirty="0">
                 <a:solidFill>
                   <a:schemeClr val="accent4"/>
                 </a:solidFill>
@@ -8870,52 +8676,44 @@
               <a:t>Catalog</a:t>
             </a:r>
             <a:r>
-              <a:rPr lang="en-US" dirty="0" smtClean="0"/>
-              <a:t>.  </a:t>
-            </a:r>
-            <a:r>
-              <a:rPr lang="en-US" dirty="0" err="1" smtClean="0"/>
-              <a:t>wavgen</a:t>
-            </a:r>
-            <a:r>
-              <a:rPr lang="en-US" dirty="0" smtClean="0"/>
-              <a:t> will overwrite Catalog entries without complaining.</a:t>
+              <a:rPr lang="en-US" dirty="0"/>
+              <a:t>.  wavgen will overwrite Catalog entries without complaining.</a:t>
             </a:r>
           </a:p>
           <a:p>
             <a:pPr lvl="2"/>
             <a:r>
-              <a:rPr lang="en-US" b="1" dirty="0" err="1" smtClean="0"/>
+              <a:rPr lang="en-US" b="1" dirty="0" err="1"/>
               <a:t>tstype</a:t>
             </a:r>
             <a:r>
-              <a:rPr lang="en-US" dirty="0" smtClean="0"/>
+              <a:rPr lang="en-US" dirty="0"/>
               <a:t>: ‘’, ‘sequence’ or ‘waveform’</a:t>
             </a:r>
           </a:p>
           <a:p>
             <a:pPr lvl="2"/>
             <a:r>
-              <a:rPr lang="en-US" b="1" dirty="0" err="1" smtClean="0"/>
+              <a:rPr lang="en-US" b="1" dirty="0" err="1"/>
               <a:t>nperiods</a:t>
             </a:r>
             <a:r>
-              <a:rPr lang="en-US" dirty="0" smtClean="0"/>
+              <a:rPr lang="en-US" dirty="0"/>
               <a:t>: # clock cycles assuming every call is one clock cycle.</a:t>
             </a:r>
           </a:p>
           <a:p>
             <a:pPr lvl="2"/>
             <a:r>
-              <a:rPr lang="en-US" b="1" dirty="0" err="1" smtClean="0"/>
+              <a:rPr lang="en-US" b="1" dirty="0" err="1"/>
               <a:t>sequenceDef</a:t>
             </a:r>
             <a:r>
-              <a:rPr lang="en-US" dirty="0" smtClean="0"/>
+              <a:rPr lang="en-US" dirty="0"/>
               <a:t>: sequence events (t, call). Filled by </a:t>
             </a:r>
             <a:r>
-              <a:rPr lang="en-US" dirty="0" err="1" smtClean="0">
+              <a:rPr lang="en-US" dirty="0">
                 <a:solidFill>
                   <a:schemeClr val="accent5"/>
                 </a:solidFill>
@@ -8923,30 +8721,30 @@
               <a:t>loadWDL</a:t>
             </a:r>
             <a:r>
-              <a:rPr lang="en-US" dirty="0" smtClean="0"/>
+              <a:rPr lang="en-US" dirty="0"/>
               <a:t>.</a:t>
             </a:r>
           </a:p>
           <a:p>
             <a:pPr lvl="2"/>
             <a:r>
-              <a:rPr lang="en-US" b="1" dirty="0" smtClean="0"/>
+              <a:rPr lang="en-US" b="1" dirty="0"/>
               <a:t>events</a:t>
             </a:r>
             <a:r>
-              <a:rPr lang="en-US" dirty="0" smtClean="0"/>
+              <a:rPr lang="en-US" dirty="0"/>
               <a:t>: waveform events (</a:t>
             </a:r>
             <a:r>
-              <a:rPr lang="en-US" dirty="0" err="1" smtClean="0"/>
+              <a:rPr lang="en-US" dirty="0" err="1"/>
               <a:t>t,board,chan,value</a:t>
             </a:r>
             <a:r>
-              <a:rPr lang="en-US" dirty="0" smtClean="0"/>
+              <a:rPr lang="en-US" dirty="0"/>
               <a:t>). Filled by </a:t>
             </a:r>
             <a:r>
-              <a:rPr lang="en-US" dirty="0" err="1" smtClean="0">
+              <a:rPr lang="en-US" dirty="0">
                 <a:solidFill>
                   <a:schemeClr val="accent5"/>
                 </a:solidFill>
@@ -8954,29 +8752,29 @@
               <a:t>loadWDL</a:t>
             </a:r>
             <a:r>
-              <a:rPr lang="en-US" dirty="0" smtClean="0"/>
+              <a:rPr lang="en-US" dirty="0"/>
               <a:t>.</a:t>
             </a:r>
           </a:p>
           <a:p>
             <a:pPr lvl="2"/>
             <a:r>
-              <a:rPr lang="en-US" b="1" dirty="0" err="1" smtClean="0"/>
+              <a:rPr lang="en-US" b="1" dirty="0" err="1"/>
               <a:t>Consts</a:t>
             </a:r>
             <a:r>
-              <a:rPr lang="en-US" dirty="0" smtClean="0"/>
+              <a:rPr lang="en-US" dirty="0"/>
               <a:t>: empty placeholder.</a:t>
             </a:r>
           </a:p>
           <a:p>
             <a:pPr lvl="1"/>
             <a:r>
-              <a:rPr lang="en-US" dirty="0" smtClean="0"/>
+              <a:rPr lang="en-US" dirty="0"/>
               <a:t>Defined in self.</a:t>
             </a:r>
             <a:r>
-              <a:rPr lang="en-US" dirty="0" smtClean="0">
+              <a:rPr lang="en-US" dirty="0">
                 <a:solidFill>
                   <a:schemeClr val="accent5"/>
                 </a:solidFill>
@@ -8984,7 +8782,7 @@
               <a:t>__</a:t>
             </a:r>
             <a:r>
-              <a:rPr lang="en-US" dirty="0" err="1" smtClean="0">
+              <a:rPr lang="en-US" dirty="0" err="1">
                 <a:solidFill>
                   <a:schemeClr val="accent5"/>
                 </a:solidFill>
@@ -8992,22 +8790,22 @@
               <a:t>make_states</a:t>
             </a:r>
             <a:r>
-              <a:rPr lang="en-US" dirty="0" smtClean="0"/>
+              <a:rPr lang="en-US" dirty="0"/>
               <a:t>():</a:t>
             </a:r>
           </a:p>
           <a:p>
             <a:pPr lvl="2"/>
             <a:r>
-              <a:rPr lang="en-US" b="1" dirty="0" err="1" smtClean="0"/>
+              <a:rPr lang="en-US" b="1" dirty="0" err="1"/>
               <a:t>do_anything_tt</a:t>
             </a:r>
             <a:r>
-              <a:rPr lang="en-US" dirty="0" smtClean="0"/>
+              <a:rPr lang="en-US" dirty="0"/>
               <a:t>: integer time when any event happens, including the start of the </a:t>
             </a:r>
             <a:r>
-              <a:rPr lang="en-US" dirty="0" err="1" smtClean="0">
+              <a:rPr lang="en-US" dirty="0">
                 <a:solidFill>
                   <a:schemeClr val="accent6"/>
                 </a:solidFill>
@@ -9015,30 +8813,42 @@
               <a:t>TimingSegment</a:t>
             </a:r>
             <a:r>
-              <a:rPr lang="en-US" dirty="0" smtClean="0"/>
+              <a:rPr lang="en-US" dirty="0"/>
               <a:t>.</a:t>
             </a:r>
           </a:p>
           <a:p>
             <a:pPr lvl="2"/>
             <a:r>
-              <a:rPr lang="en-US" b="1" dirty="0" err="1" smtClean="0"/>
+              <a:rPr lang="en-US" b="1" dirty="0" err="1"/>
               <a:t>do_anything_dt</a:t>
             </a:r>
             <a:r>
-              <a:rPr lang="en-US" dirty="0" smtClean="0"/>
+              <a:rPr lang="en-US" dirty="0"/>
               <a:t>: diff of </a:t>
             </a:r>
             <a:r>
-              <a:rPr lang="en-US" b="1" dirty="0" err="1" smtClean="0"/>
+              <a:rPr lang="en-US" b="1" dirty="0" err="1"/>
               <a:t>do_anything_tt</a:t>
             </a:r>
             <a:r>
-              <a:rPr lang="en-US" dirty="0" smtClean="0"/>
+              <a:rPr lang="en-US" dirty="0"/>
               <a:t> with a 0 at the end (zero time between the end of the </a:t>
             </a:r>
             <a:r>
-              <a:rPr lang="en-US" dirty="0" err="1" smtClean="0">
+              <a:rPr lang="en-US" dirty="0">
+                <a:solidFill>
+                  <a:schemeClr val="accent6"/>
+                </a:solidFill>
+              </a:rPr>
+              <a:t>TimingSegment </a:t>
+            </a:r>
+            <a:r>
+              <a:rPr lang="en-US" dirty="0"/>
+              <a:t>and the end of the </a:t>
+            </a:r>
+            <a:r>
+              <a:rPr lang="en-US" dirty="0">
                 <a:solidFill>
                   <a:schemeClr val="accent6"/>
                 </a:solidFill>
@@ -9046,72 +8856,52 @@
               <a:t>TimingSegment</a:t>
             </a:r>
             <a:r>
-              <a:rPr lang="en-US" dirty="0" smtClean="0">
-                <a:solidFill>
-                  <a:schemeClr val="accent6"/>
-                </a:solidFill>
-              </a:rPr>
-              <a:t> </a:t>
-            </a:r>
-            <a:r>
-              <a:rPr lang="en-US" dirty="0" smtClean="0"/>
-              <a:t>and the end of the </a:t>
-            </a:r>
-            <a:r>
-              <a:rPr lang="en-US" dirty="0" err="1" smtClean="0">
-                <a:solidFill>
-                  <a:schemeClr val="accent6"/>
-                </a:solidFill>
-              </a:rPr>
-              <a:t>TimingSegment</a:t>
-            </a:r>
-            <a:r>
-              <a:rPr lang="en-US" dirty="0" smtClean="0"/>
+              <a:rPr lang="en-US" dirty="0"/>
               <a:t>.)</a:t>
             </a:r>
           </a:p>
           <a:p>
             <a:pPr lvl="2"/>
             <a:r>
-              <a:rPr lang="en-US" b="1" dirty="0" err="1" smtClean="0"/>
+              <a:rPr lang="en-US" b="1" dirty="0" err="1"/>
               <a:t>unique_state_ID</a:t>
             </a:r>
             <a:r>
-              <a:rPr lang="en-US" dirty="0" smtClean="0"/>
+              <a:rPr lang="en-US" dirty="0"/>
               <a:t>:  1x</a:t>
             </a:r>
             <a:r>
-              <a:rPr lang="en-US" b="1" dirty="0" smtClean="0"/>
+              <a:rPr lang="en-US" b="1" dirty="0"/>
               <a:t>nperiods</a:t>
             </a:r>
             <a:r>
-              <a:rPr lang="en-US" dirty="0" smtClean="0"/>
+              <a:rPr lang="en-US" dirty="0"/>
               <a:t> sparse array specifying the state of the system at every time point.</a:t>
             </a:r>
           </a:p>
           <a:p>
             <a:pPr lvl="2"/>
             <a:r>
-              <a:rPr lang="en-US" b="1" dirty="0" err="1" smtClean="0"/>
+              <a:rPr lang="en-US" b="1" dirty="0" err="1"/>
               <a:t>sequence_times</a:t>
             </a:r>
             <a:r>
-              <a:rPr lang="en-US" dirty="0" smtClean="0"/>
+              <a:rPr lang="en-US" dirty="0"/>
               <a:t>: (for sequences) 1x#calls array indicating times at which call are made.</a:t>
             </a:r>
           </a:p>
           <a:p>
             <a:pPr lvl="1"/>
             <a:r>
-              <a:rPr lang="en-US" dirty="0" smtClean="0"/>
+              <a:rPr lang="en-US" dirty="0"/>
               <a:t>Defined in </a:t>
             </a:r>
             <a:r>
-              <a:rPr lang="en-US" dirty="0" err="1" smtClean="0"/>
+              <a:rPr lang="en-US" dirty="0" err="1"/>
               <a:t>self.</a:t>
             </a:r>
             <a:r>
-              <a:rPr lang="en-US" dirty="0" err="1" smtClean="0">
+              <a:rPr lang="en-US" dirty="0" err="1">
                 <a:solidFill>
                   <a:schemeClr val="accent5"/>
                 </a:solidFill>
@@ -9119,76 +8909,68 @@
               <a:t>script</a:t>
             </a:r>
             <a:r>
-              <a:rPr lang="en-US" dirty="0" smtClean="0"/>
+              <a:rPr lang="en-US" dirty="0"/>
               <a:t>():</a:t>
             </a:r>
           </a:p>
           <a:p>
             <a:pPr lvl="2"/>
             <a:r>
-              <a:rPr lang="en-US" b="1" dirty="0" smtClean="0"/>
+              <a:rPr lang="en-US" b="1" dirty="0"/>
               <a:t>time</a:t>
             </a:r>
             <a:r>
-              <a:rPr lang="en-US" dirty="0" smtClean="0"/>
+              <a:rPr lang="en-US" dirty="0"/>
               <a:t>: # clock cycles to complete this </a:t>
             </a:r>
             <a:r>
-              <a:rPr lang="en-US" dirty="0" err="1" smtClean="0">
+              <a:rPr lang="en-US" dirty="0">
                 <a:solidFill>
                   <a:schemeClr val="accent6"/>
                 </a:solidFill>
               </a:rPr>
-              <a:t>TimingSegment</a:t>
-            </a:r>
-            <a:r>
-              <a:rPr lang="en-US" dirty="0" smtClean="0">
-                <a:solidFill>
-                  <a:schemeClr val="accent6"/>
-                </a:solidFill>
-              </a:rPr>
-              <a:t>.</a:t>
+              <a:t>TimingSegment.</a:t>
             </a:r>
           </a:p>
           <a:p>
             <a:pPr lvl="2"/>
             <a:r>
-              <a:rPr lang="en-US" b="1" dirty="0" err="1" smtClean="0"/>
+              <a:rPr lang="en-US" b="1" dirty="0" err="1"/>
               <a:t>Params</a:t>
             </a:r>
             <a:r>
-              <a:rPr lang="en-US" dirty="0" smtClean="0"/>
+              <a:rPr lang="en-US" dirty="0"/>
               <a:t>: </a:t>
             </a:r>
             <a:r>
-              <a:rPr lang="en-US" dirty="0" err="1" smtClean="0"/>
+              <a:rPr lang="en-US" dirty="0" err="1"/>
               <a:t>Dict</a:t>
             </a:r>
             <a:r>
-              <a:rPr lang="en-US" dirty="0" smtClean="0"/>
+              <a:rPr lang="en-US" dirty="0"/>
               <a:t> of </a:t>
             </a:r>
             <a:r>
-              <a:rPr lang="en-US" dirty="0" err="1" smtClean="0"/>
+              <a:rPr lang="en-US" dirty="0" err="1"/>
               <a:t>params</a:t>
             </a:r>
             <a:r>
-              <a:rPr lang="en-US" dirty="0" smtClean="0"/>
+              <a:rPr lang="en-US" dirty="0"/>
               <a:t> and values.  Used to track decrementing counters for time calculations and plotting</a:t>
             </a:r>
           </a:p>
           <a:p>
             <a:pPr lvl="2"/>
             <a:r>
-              <a:rPr lang="en-US" b="1" dirty="0" err="1" smtClean="0"/>
+              <a:rPr lang="en-US" b="1" dirty="0" err="1"/>
               <a:t>ExitState</a:t>
             </a:r>
             <a:r>
-              <a:rPr lang="en-US" dirty="0" smtClean="0"/>
+              <a:rPr lang="en-US" dirty="0"/>
               <a:t>: Initialized to state000 in </a:t>
             </a:r>
             <a:r>
-              <a:rPr lang="en-US" dirty="0" smtClean="0">
+              <a:rPr lang="en-US" dirty="0">
                 <a:solidFill>
                   <a:schemeClr val="accent5"/>
                 </a:solidFill>
@@ -9196,7 +8978,7 @@
               <a:t>__</a:t>
             </a:r>
             <a:r>
-              <a:rPr lang="en-US" dirty="0" err="1" smtClean="0">
+              <a:rPr lang="en-US" dirty="0" err="1">
                 <a:solidFill>
                   <a:schemeClr val="accent5"/>
                 </a:solidFill>
@@ -9204,7 +8986,7 @@
               <a:t>init</a:t>
             </a:r>
             <a:r>
-              <a:rPr lang="en-US" dirty="0" smtClean="0">
+              <a:rPr lang="en-US" dirty="0">
                 <a:solidFill>
                   <a:schemeClr val="accent5"/>
                 </a:solidFill>
@@ -9212,22 +8994,22 @@
               <a:t>__</a:t>
             </a:r>
             <a:r>
-              <a:rPr lang="en-US" dirty="0" smtClean="0"/>
+              <a:rPr lang="en-US" dirty="0"/>
               <a:t>(), set to the last state called in waveform or sequence.</a:t>
             </a:r>
           </a:p>
           <a:p>
             <a:pPr lvl="2"/>
             <a:r>
-              <a:rPr lang="en-US" b="1" dirty="0" err="1" smtClean="0"/>
+              <a:rPr lang="en-US" b="1" dirty="0" err="1"/>
               <a:t>ExitLevel</a:t>
             </a:r>
             <a:r>
-              <a:rPr lang="en-US" dirty="0" smtClean="0"/>
+              <a:rPr lang="en-US" dirty="0"/>
               <a:t>: Initialized to state000’s levels in </a:t>
             </a:r>
             <a:r>
-              <a:rPr lang="en-US" dirty="0" smtClean="0">
+              <a:rPr lang="en-US" dirty="0">
                 <a:solidFill>
                   <a:schemeClr val="accent5"/>
                 </a:solidFill>
@@ -9235,7 +9017,7 @@
               <a:t>__</a:t>
             </a:r>
             <a:r>
-              <a:rPr lang="en-US" dirty="0" err="1" smtClean="0">
+              <a:rPr lang="en-US" dirty="0" err="1">
                 <a:solidFill>
                   <a:schemeClr val="accent5"/>
                 </a:solidFill>
@@ -9243,7 +9025,7 @@
               <a:t>init</a:t>
             </a:r>
             <a:r>
-              <a:rPr lang="en-US" dirty="0" smtClean="0">
+              <a:rPr lang="en-US" dirty="0">
                 <a:solidFill>
                   <a:schemeClr val="accent5"/>
                 </a:solidFill>
@@ -9251,30 +9033,22 @@
               <a:t>__</a:t>
             </a:r>
             <a:r>
-              <a:rPr lang="en-US" dirty="0" smtClean="0"/>
+              <a:rPr lang="en-US" dirty="0"/>
               <a:t>(), set to the levels defined after two passes through the </a:t>
             </a:r>
             <a:r>
-              <a:rPr lang="en-US" dirty="0" err="1" smtClean="0">
+              <a:rPr lang="en-US" dirty="0">
                 <a:solidFill>
                   <a:schemeClr val="accent6"/>
                 </a:solidFill>
               </a:rPr>
-              <a:t>TimingSegment</a:t>
-            </a:r>
-            <a:r>
-              <a:rPr lang="en-US" dirty="0" smtClean="0">
-                <a:solidFill>
-                  <a:schemeClr val="accent6"/>
-                </a:solidFill>
-              </a:rPr>
-              <a:t>.</a:t>
-            </a:r>
-            <a:endParaRPr lang="en-US" dirty="0" smtClean="0"/>
+              <a:t>TimingSegment.</a:t>
+            </a:r>
+            <a:endParaRPr lang="en-US" dirty="0"/>
           </a:p>
           <a:p>
             <a:pPr lvl="2"/>
-            <a:endParaRPr lang="en-US" dirty="0" smtClean="0"/>
+            <a:endParaRPr lang="en-US" dirty="0"/>
           </a:p>
         </p:txBody>
       </p:sp>
@@ -9288,13 +9062,6 @@
   <p:clrMapOvr>
     <a:masterClrMapping/>
   </p:clrMapOvr>
-  <p:timing>
-    <p:tnLst>
-      <p:par>
-        <p:cTn id="1" dur="indefinite" restart="never" nodeType="tmRoot"/>
-      </p:par>
-    </p:tnLst>
-  </p:timing>
 </p:sld>
 </file>
 
@@ -9337,17 +9104,8 @@
           <a:p>
             <a:r>
               <a:rPr lang="en-US" dirty="0"/>
-              <a:t>c</a:t>
-            </a:r>
-            <a:r>
-              <a:rPr lang="en-US" smtClean="0"/>
-              <a:t>lass </a:t>
-            </a:r>
-            <a:r>
-              <a:rPr lang="en-US" dirty="0" err="1" smtClean="0"/>
-              <a:t>TimingSegment</a:t>
-            </a:r>
-            <a:endParaRPr lang="en-US" dirty="0"/>
+              <a:t>class TimingSegment</a:t>
+            </a:r>
           </a:p>
         </p:txBody>
       </p:sp>
@@ -9374,18 +9132,14 @@
           <a:lstStyle/>
           <a:p>
             <a:r>
-              <a:rPr lang="en-US" dirty="0" smtClean="0"/>
-              <a:t>Methods</a:t>
-            </a:r>
-            <a:r>
-              <a:rPr lang="en-US" dirty="0" smtClean="0"/>
-              <a:t>:</a:t>
+              <a:rPr lang="en-US" dirty="0"/>
+              <a:t>Methods:</a:t>
             </a:r>
           </a:p>
           <a:p>
             <a:pPr lvl="1"/>
             <a:r>
-              <a:rPr lang="en-US" dirty="0" smtClean="0">
+              <a:rPr lang="en-US" dirty="0">
                 <a:solidFill>
                   <a:schemeClr val="accent5"/>
                 </a:solidFill>
@@ -9410,15 +9164,7 @@
             </a:r>
             <a:r>
               <a:rPr lang="en-US" dirty="0"/>
-              <a:t>self, name='', </a:t>
-            </a:r>
-            <a:r>
-              <a:rPr lang="en-US" dirty="0" err="1"/>
-              <a:t>TStype</a:t>
-            </a:r>
-            <a:r>
-              <a:rPr lang="en-US" dirty="0"/>
-              <a:t> = '', </a:t>
+              <a:t>self, name='', TStype = '', </a:t>
             </a:r>
             <a:r>
               <a:rPr lang="en-US" dirty="0" err="1"/>
@@ -9434,17 +9180,13 @@
             </a:r>
             <a:r>
               <a:rPr lang="en-US" dirty="0"/>
-              <a:t>=-2</a:t>
-            </a:r>
-            <a:r>
-              <a:rPr lang="en-US" dirty="0" smtClean="0"/>
-              <a:t>):</a:t>
+              <a:t>=-2):</a:t>
             </a:r>
           </a:p>
           <a:p>
             <a:pPr lvl="1"/>
             <a:r>
-              <a:rPr lang="en-US" dirty="0" smtClean="0">
+              <a:rPr lang="en-US" dirty="0">
                 <a:solidFill>
                   <a:schemeClr val="accent5"/>
                 </a:solidFill>
@@ -9491,12 +9233,11 @@
               <a:rPr lang="en-US" dirty="0"/>
               <a:t>()    </a:t>
             </a:r>
-            <a:endParaRPr lang="en-US" dirty="0" smtClean="0"/>
           </a:p>
           <a:p>
             <a:pPr lvl="1"/>
             <a:r>
-              <a:rPr lang="en-US" dirty="0" smtClean="0">
+              <a:rPr lang="en-US" dirty="0">
                 <a:solidFill>
                   <a:schemeClr val="accent5"/>
                 </a:solidFill>
@@ -9543,12 +9284,11 @@
               <a:rPr lang="en-US" dirty="0"/>
               <a:t>()    </a:t>
             </a:r>
-            <a:endParaRPr lang="en-US" dirty="0" smtClean="0"/>
           </a:p>
           <a:p>
             <a:pPr lvl="1"/>
             <a:r>
-              <a:rPr lang="en-US" dirty="0" smtClean="0">
+              <a:rPr lang="en-US" dirty="0">
                 <a:solidFill>
                   <a:schemeClr val="accent5"/>
                 </a:solidFill>
@@ -9567,12 +9307,11 @@
               <a:rPr lang="en-US" dirty="0"/>
               <a:t>(self):    </a:t>
             </a:r>
-            <a:endParaRPr lang="en-US" dirty="0" smtClean="0"/>
           </a:p>
           <a:p>
             <a:pPr lvl="1"/>
             <a:r>
-              <a:rPr lang="en-US" dirty="0" smtClean="0">
+              <a:rPr lang="en-US" dirty="0">
                 <a:solidFill>
                   <a:schemeClr val="accent5"/>
                 </a:solidFill>
@@ -9580,12 +9319,8 @@
               <a:t>script</a:t>
             </a:r>
             <a:r>
-              <a:rPr lang="en-US" dirty="0" smtClean="0"/>
-              <a:t>(self</a:t>
-            </a:r>
-            <a:r>
-              <a:rPr lang="en-US" dirty="0"/>
-              <a:t>, </a:t>
+              <a:rPr lang="en-US" dirty="0"/>
+              <a:t>(self, </a:t>
             </a:r>
             <a:r>
               <a:rPr lang="en-US" dirty="0" err="1"/>
@@ -9600,14 +9335,14 @@
               <a:t>sys.stdout</a:t>
             </a:r>
             <a:r>
-              <a:rPr lang="en-US" dirty="0" smtClean="0"/>
+              <a:rPr lang="en-US" dirty="0"/>
               <a:t>):</a:t>
             </a:r>
           </a:p>
           <a:p>
             <a:pPr lvl="2"/>
             <a:r>
-              <a:rPr lang="en-US" dirty="0" smtClean="0"/>
+              <a:rPr lang="en-US" dirty="0"/>
               <a:t>generates the script</a:t>
             </a:r>
           </a:p>
@@ -9638,26 +9373,18 @@
               <a:t>() to populate the </a:t>
             </a:r>
             <a:r>
-              <a:rPr lang="en-US" dirty="0" err="1">
+              <a:rPr lang="en-US" dirty="0">
                 <a:solidFill>
                   <a:schemeClr val="accent2"/>
                 </a:solidFill>
               </a:rPr>
-              <a:t>UniqueStateArr</a:t>
-            </a:r>
+              <a:t>UniqueStateArr </a:t>
+            </a:r>
+          </a:p>
+          <a:p>
+            <a:pPr lvl="1"/>
             <a:r>
               <a:rPr lang="en-US" dirty="0">
-                <a:solidFill>
-                  <a:schemeClr val="accent2"/>
-                </a:solidFill>
-              </a:rPr>
-              <a:t> </a:t>
-            </a:r>
-          </a:p>
-          <a:p>
-            <a:pPr lvl="1"/>
-            <a:r>
-              <a:rPr lang="en-US" dirty="0" smtClean="0">
                 <a:solidFill>
                   <a:schemeClr val="accent5"/>
                 </a:solidFill>
@@ -9684,12 +9411,11 @@
               <a:rPr lang="en-US" dirty="0"/>
               <a:t>=[]):    </a:t>
             </a:r>
-            <a:endParaRPr lang="en-US" dirty="0" smtClean="0"/>
           </a:p>
           <a:p>
             <a:pPr lvl="1"/>
             <a:r>
-              <a:rPr lang="en-US" dirty="0" smtClean="0">
+              <a:rPr lang="en-US" dirty="0">
                 <a:solidFill>
                   <a:schemeClr val="accent5"/>
                 </a:solidFill>
@@ -9697,30 +9423,26 @@
               <a:t>plot</a:t>
             </a:r>
             <a:r>
-              <a:rPr lang="en-US" dirty="0" smtClean="0"/>
-              <a:t>(self</a:t>
-            </a:r>
-            <a:r>
-              <a:rPr lang="en-US" dirty="0"/>
-              <a:t>, cycles=2, </a:t>
+              <a:rPr lang="en-US" dirty="0"/>
+              <a:t>(self, cycles=2, </a:t>
             </a:r>
             <a:r>
               <a:rPr lang="en-US" dirty="0" err="1"/>
               <a:t>initialLevel</a:t>
             </a:r>
             <a:r>
-              <a:rPr lang="en-US" dirty="0" smtClean="0"/>
+              <a:rPr lang="en-US" dirty="0"/>
               <a:t>=[]):</a:t>
             </a:r>
           </a:p>
           <a:p>
             <a:pPr lvl="2"/>
             <a:r>
-              <a:rPr lang="en-US" dirty="0" smtClean="0"/>
+              <a:rPr lang="en-US" dirty="0"/>
               <a:t>generates waveform plots using </a:t>
             </a:r>
             <a:r>
-              <a:rPr lang="en-US" dirty="0" smtClean="0">
+              <a:rPr lang="en-US" dirty="0">
                 <a:solidFill>
                   <a:schemeClr val="accent5"/>
                 </a:solidFill>
@@ -9728,7 +9450,7 @@
               <a:t>__</a:t>
             </a:r>
             <a:r>
-              <a:rPr lang="en-US" dirty="0" err="1" smtClean="0">
+              <a:rPr lang="en-US" dirty="0" err="1">
                 <a:solidFill>
                   <a:schemeClr val="accent5"/>
                 </a:solidFill>
@@ -9736,10 +9458,9 @@
               <a:t>make_waveform</a:t>
             </a:r>
             <a:r>
-              <a:rPr lang="en-US" dirty="0" smtClean="0"/>
+              <a:rPr lang="en-US" dirty="0"/>
               <a:t>()</a:t>
             </a:r>
-            <a:endParaRPr lang="en-US" dirty="0" smtClean="0"/>
           </a:p>
           <a:p>
             <a:pPr lvl="2"/>
@@ -9768,7 +9489,7 @@
               <a:t>() to populate the </a:t>
             </a:r>
             <a:r>
-              <a:rPr lang="en-US" dirty="0" err="1" smtClean="0">
+              <a:rPr lang="en-US" dirty="0">
                 <a:solidFill>
                   <a:schemeClr val="accent2"/>
                 </a:solidFill>
@@ -9789,13 +9510,6 @@
   <p:clrMapOvr>
     <a:masterClrMapping/>
   </p:clrMapOvr>
-  <p:timing>
-    <p:tnLst>
-      <p:par>
-        <p:cTn id="1" dur="indefinite" restart="never" nodeType="tmRoot"/>
-      </p:par>
-    </p:tnLst>
-  </p:timing>
 </p:sld>
 </file>
 

</xml_diff>